<commit_message>
JS Codes added for 22nd oct
</commit_message>
<xml_diff>
--- a/JS.pptx
+++ b/JS.pptx
@@ -12,6 +12,14 @@
     <p:sldId id="383" r:id="rId6"/>
     <p:sldId id="384" r:id="rId7"/>
     <p:sldId id="386" r:id="rId8"/>
+    <p:sldId id="387" r:id="rId9"/>
+    <p:sldId id="388" r:id="rId10"/>
+    <p:sldId id="389" r:id="rId11"/>
+    <p:sldId id="390" r:id="rId12"/>
+    <p:sldId id="392" r:id="rId13"/>
+    <p:sldId id="391" r:id="rId14"/>
+    <p:sldId id="393" r:id="rId15"/>
+    <p:sldId id="394" r:id="rId16"/>
   </p:sldIdLst>
   <p:sldSz cx="12192000" cy="6858000"/>
   <p:notesSz cx="12192000" cy="6858000"/>
@@ -268,7 +276,7 @@
           <a:p>
             <a:fld id="{1D8BD707-D9CF-40AE-B4C6-C98DA3205C09}" type="datetimeFigureOut">
               <a:rPr lang="en-US"/>
-              <a:t>10/8/2023</a:t>
+              <a:t>10/12/2023</a:t>
             </a:fld>
             <a:endParaRPr lang="en-US"/>
           </a:p>
@@ -445,7 +453,7 @@
           <a:p>
             <a:fld id="{1D8BD707-D9CF-40AE-B4C6-C98DA3205C09}" type="datetimeFigureOut">
               <a:rPr lang="en-US"/>
-              <a:t>10/8/2023</a:t>
+              <a:t>10/12/2023</a:t>
             </a:fld>
             <a:endParaRPr lang="en-US"/>
           </a:p>
@@ -659,7 +667,7 @@
           <a:p>
             <a:fld id="{1D8BD707-D9CF-40AE-B4C6-C98DA3205C09}" type="datetimeFigureOut">
               <a:rPr lang="en-US"/>
-              <a:t>10/8/2023</a:t>
+              <a:t>10/12/2023</a:t>
             </a:fld>
             <a:endParaRPr lang="en-US"/>
           </a:p>
@@ -807,7 +815,7 @@
           <a:p>
             <a:fld id="{1D8BD707-D9CF-40AE-B4C6-C98DA3205C09}" type="datetimeFigureOut">
               <a:rPr lang="en-US"/>
-              <a:t>10/8/2023</a:t>
+              <a:t>10/12/2023</a:t>
             </a:fld>
             <a:endParaRPr lang="en-US"/>
           </a:p>
@@ -934,7 +942,7 @@
           <a:p>
             <a:fld id="{1D8BD707-D9CF-40AE-B4C6-C98DA3205C09}" type="datetimeFigureOut">
               <a:rPr lang="en-US"/>
-              <a:t>10/8/2023</a:t>
+              <a:t>10/12/2023</a:t>
             </a:fld>
             <a:endParaRPr lang="en-US"/>
           </a:p>
@@ -1188,7 +1196,7 @@
           <a:p>
             <a:fld id="{1D8BD707-D9CF-40AE-B4C6-C98DA3205C09}" type="datetimeFigureOut">
               <a:rPr lang="en-US"/>
-              <a:t>10/8/2023</a:t>
+              <a:t>10/12/2023</a:t>
             </a:fld>
             <a:endParaRPr lang="en-US"/>
           </a:p>
@@ -1552,7 +1560,7 @@
         <p:spPr>
           <a:xfrm>
             <a:off x="1828800" y="2743200"/>
-            <a:ext cx="9027122" cy="1938992"/>
+            <a:ext cx="10287000" cy="3785652"/>
           </a:xfrm>
           <a:prstGeom prst="rect">
             <a:avLst/>
@@ -1575,12 +1583,2896 @@
               <a:t>Full Stack-Web Development - JS</a:t>
             </a:r>
           </a:p>
+          <a:p>
+            <a:endParaRPr lang="en-IN" sz="6000" dirty="0">
+              <a:solidFill>
+                <a:schemeClr val="bg2"/>
+              </a:solidFill>
+              <a:latin typeface="Amasis MT Pro Black" panose="020B0604020202020204" pitchFamily="18" charset="0"/>
+            </a:endParaRPr>
+          </a:p>
+          <a:p>
+            <a:r>
+              <a:rPr lang="en-IN" sz="6000" dirty="0">
+                <a:solidFill>
+                  <a:schemeClr val="bg2"/>
+                </a:solidFill>
+                <a:latin typeface="Amasis MT Pro Black" panose="020B0604020202020204" pitchFamily="18" charset="0"/>
+              </a:rPr>
+              <a:t>							</a:t>
+            </a:r>
+            <a:r>
+              <a:rPr lang="en-IN" sz="2000" dirty="0">
+                <a:solidFill>
+                  <a:schemeClr val="bg2"/>
+                </a:solidFill>
+                <a:latin typeface="Amasis MT Pro Black" panose="020B0604020202020204" pitchFamily="18" charset="0"/>
+              </a:rPr>
+              <a:t>	-by Sachin </a:t>
+            </a:r>
+            <a:r>
+              <a:rPr lang="en-IN" sz="2000" dirty="0" err="1">
+                <a:solidFill>
+                  <a:schemeClr val="bg2"/>
+                </a:solidFill>
+                <a:latin typeface="Amasis MT Pro Black" panose="020B0604020202020204" pitchFamily="18" charset="0"/>
+              </a:rPr>
+              <a:t>Barpanda</a:t>
+            </a:r>
+            <a:endParaRPr lang="en-IN" sz="6000" dirty="0">
+              <a:solidFill>
+                <a:schemeClr val="bg2"/>
+              </a:solidFill>
+              <a:latin typeface="Amasis MT Pro Black" panose="020B0604020202020204" pitchFamily="18" charset="0"/>
+            </a:endParaRPr>
+          </a:p>
         </p:txBody>
       </p:sp>
     </p:spTree>
     <p:extLst>
       <p:ext uri="{BB962C8B-B14F-4D97-AF65-F5344CB8AC3E}">
         <p14:creationId xmlns:p14="http://schemas.microsoft.com/office/powerpoint/2010/main" val="3921176882"/>
+      </p:ext>
+    </p:extLst>
+  </p:cSld>
+  <p:clrMapOvr>
+    <a:masterClrMapping/>
+  </p:clrMapOvr>
+</p:sld>
+</file>
+
+<file path=ppt/slides/slide10.xml><?xml version="1.0" encoding="utf-8"?>
+<p:sld xmlns:a="http://schemas.openxmlformats.org/drawingml/2006/main" xmlns:r="http://schemas.openxmlformats.org/officeDocument/2006/relationships" xmlns:p="http://schemas.openxmlformats.org/presentationml/2006/main">
+  <p:cSld>
+    <p:spTree>
+      <p:nvGrpSpPr>
+        <p:cNvPr id="1" name=""/>
+        <p:cNvGrpSpPr/>
+        <p:nvPr/>
+      </p:nvGrpSpPr>
+      <p:grpSpPr>
+        <a:xfrm>
+          <a:off x="0" y="0"/>
+          <a:ext cx="0" cy="0"/>
+          <a:chOff x="0" y="0"/>
+          <a:chExt cx="0" cy="0"/>
+        </a:xfrm>
+      </p:grpSpPr>
+      <p:sp>
+        <p:nvSpPr>
+          <p:cNvPr id="2" name="object 2"/>
+          <p:cNvSpPr/>
+          <p:nvPr/>
+        </p:nvSpPr>
+        <p:spPr>
+          <a:xfrm>
+            <a:off x="1" y="44199"/>
+            <a:ext cx="12191999" cy="7118601"/>
+          </a:xfrm>
+          <a:prstGeom prst="rect">
+            <a:avLst/>
+          </a:prstGeom>
+          <a:blipFill>
+            <a:blip r:embed="rId2" cstate="print"/>
+            <a:stretch>
+              <a:fillRect/>
+            </a:stretch>
+          </a:blipFill>
+        </p:spPr>
+        <p:txBody>
+          <a:bodyPr wrap="square" lIns="0" tIns="0" rIns="0" bIns="0" rtlCol="0"/>
+          <a:lstStyle/>
+          <a:p>
+            <a:endParaRPr b="1" dirty="0">
+              <a:ln w="13462">
+                <a:solidFill>
+                  <a:schemeClr val="bg1"/>
+                </a:solidFill>
+                <a:prstDash val="solid"/>
+              </a:ln>
+              <a:solidFill>
+                <a:schemeClr val="tx1">
+                  <a:lumMod val="85000"/>
+                  <a:lumOff val="15000"/>
+                </a:schemeClr>
+              </a:solidFill>
+              <a:effectLst>
+                <a:outerShdw dist="38100" dir="2700000" algn="bl" rotWithShape="0">
+                  <a:schemeClr val="accent5"/>
+                </a:outerShdw>
+              </a:effectLst>
+            </a:endParaRPr>
+          </a:p>
+        </p:txBody>
+      </p:sp>
+      <p:sp>
+        <p:nvSpPr>
+          <p:cNvPr id="3" name="object 3"/>
+          <p:cNvSpPr txBox="1">
+            <a:spLocks noGrp="1"/>
+          </p:cNvSpPr>
+          <p:nvPr>
+            <p:ph type="title"/>
+          </p:nvPr>
+        </p:nvSpPr>
+        <p:spPr>
+          <a:xfrm>
+            <a:off x="786485" y="457200"/>
+            <a:ext cx="8967115" cy="535403"/>
+          </a:xfrm>
+          <a:prstGeom prst="rect">
+            <a:avLst/>
+          </a:prstGeom>
+        </p:spPr>
+        <p:txBody>
+          <a:bodyPr vert="horz" wrap="square" lIns="0" tIns="12065" rIns="0" bIns="0" rtlCol="0">
+            <a:spAutoFit/>
+          </a:bodyPr>
+          <a:lstStyle/>
+          <a:p>
+            <a:pPr marL="12700">
+              <a:lnSpc>
+                <a:spcPct val="100000"/>
+              </a:lnSpc>
+              <a:spcBef>
+                <a:spcPts val="95"/>
+              </a:spcBef>
+            </a:pPr>
+            <a:r>
+              <a:rPr lang="en-US" sz="3400" dirty="0">
+                <a:latin typeface="Carlito"/>
+                <a:cs typeface="Carlito"/>
+              </a:rPr>
+              <a:t>More Number Game</a:t>
+            </a:r>
+            <a:endParaRPr sz="3400" dirty="0">
+              <a:latin typeface="Carlito"/>
+              <a:cs typeface="Carlito"/>
+            </a:endParaRPr>
+          </a:p>
+        </p:txBody>
+      </p:sp>
+      <p:sp>
+        <p:nvSpPr>
+          <p:cNvPr id="5" name="object 5"/>
+          <p:cNvSpPr/>
+          <p:nvPr/>
+        </p:nvSpPr>
+        <p:spPr>
+          <a:xfrm>
+            <a:off x="9816083" y="262127"/>
+            <a:ext cx="1976627" cy="822960"/>
+          </a:xfrm>
+          <a:prstGeom prst="rect">
+            <a:avLst/>
+          </a:prstGeom>
+          <a:blipFill>
+            <a:blip r:embed="rId3" cstate="print"/>
+            <a:stretch>
+              <a:fillRect/>
+            </a:stretch>
+          </a:blipFill>
+        </p:spPr>
+        <p:txBody>
+          <a:bodyPr wrap="square" lIns="0" tIns="0" rIns="0" bIns="0" rtlCol="0"/>
+          <a:lstStyle/>
+          <a:p>
+            <a:endParaRPr/>
+          </a:p>
+        </p:txBody>
+      </p:sp>
+      <p:sp>
+        <p:nvSpPr>
+          <p:cNvPr id="4" name="object 3">
+            <a:extLst>
+              <a:ext uri="{FF2B5EF4-FFF2-40B4-BE49-F238E27FC236}">
+                <a16:creationId xmlns:a16="http://schemas.microsoft.com/office/drawing/2014/main" id="{1ED9D45B-4B0D-FC76-3A8C-E89F6CD72254}"/>
+              </a:ext>
+            </a:extLst>
+          </p:cNvPr>
+          <p:cNvSpPr txBox="1">
+            <a:spLocks/>
+          </p:cNvSpPr>
+          <p:nvPr/>
+        </p:nvSpPr>
+        <p:spPr>
+          <a:xfrm>
+            <a:off x="762000" y="1143000"/>
+            <a:ext cx="11283579" cy="5052024"/>
+          </a:xfrm>
+          <a:prstGeom prst="rect">
+            <a:avLst/>
+          </a:prstGeom>
+        </p:spPr>
+        <p:txBody>
+          <a:bodyPr vert="horz" wrap="square" lIns="0" tIns="12065" rIns="0" bIns="0" rtlCol="0">
+            <a:spAutoFit/>
+          </a:bodyPr>
+          <a:lstStyle>
+            <a:lvl1pPr>
+              <a:defRPr sz="6000" b="0" i="0">
+                <a:solidFill>
+                  <a:srgbClr val="E7E6E6"/>
+                </a:solidFill>
+                <a:latin typeface="Trebuchet MS"/>
+                <a:ea typeface="+mj-ea"/>
+                <a:cs typeface="Trebuchet MS"/>
+              </a:defRPr>
+            </a:lvl1pPr>
+          </a:lstStyle>
+          <a:p>
+            <a:pPr marL="12700">
+              <a:spcBef>
+                <a:spcPts val="95"/>
+              </a:spcBef>
+            </a:pPr>
+            <a:r>
+              <a:rPr lang="en-US" sz="3200" kern="0" dirty="0" err="1">
+                <a:latin typeface="Carlito"/>
+                <a:cs typeface="Carlito"/>
+                <a:sym typeface="Wingdings" panose="05000000000000000000" pitchFamily="2" charset="2"/>
+              </a:rPr>
+              <a:t>typeof</a:t>
+            </a:r>
+            <a:r>
+              <a:rPr lang="en-US" sz="3200" kern="0" dirty="0">
+                <a:latin typeface="Carlito"/>
+                <a:cs typeface="Carlito"/>
+                <a:sym typeface="Wingdings" panose="05000000000000000000" pitchFamily="2" charset="2"/>
+              </a:rPr>
+              <a:t> : console.log(</a:t>
+            </a:r>
+            <a:r>
+              <a:rPr lang="en-US" sz="3200" kern="0" dirty="0" err="1">
+                <a:latin typeface="Carlito"/>
+                <a:cs typeface="Carlito"/>
+                <a:sym typeface="Wingdings" panose="05000000000000000000" pitchFamily="2" charset="2"/>
+              </a:rPr>
+              <a:t>typeof</a:t>
+            </a:r>
+            <a:r>
+              <a:rPr lang="en-US" sz="3200" kern="0" dirty="0">
+                <a:latin typeface="Carlito"/>
+                <a:cs typeface="Carlito"/>
+                <a:sym typeface="Wingdings" panose="05000000000000000000" pitchFamily="2" charset="2"/>
+              </a:rPr>
+              <a:t> 2) ;</a:t>
+            </a:r>
+          </a:p>
+          <a:p>
+            <a:pPr marL="12700">
+              <a:spcBef>
+                <a:spcPts val="95"/>
+              </a:spcBef>
+            </a:pPr>
+            <a:r>
+              <a:rPr lang="en-US" sz="3200" kern="0" dirty="0">
+                <a:latin typeface="Carlito"/>
+                <a:cs typeface="Carlito"/>
+                <a:sym typeface="Wingdings" panose="05000000000000000000" pitchFamily="2" charset="2"/>
+              </a:rPr>
+              <a:t>Ques : 1. 10/0=&gt;Infinity -10/0=&gt;?</a:t>
+            </a:r>
+          </a:p>
+          <a:p>
+            <a:pPr marL="12700">
+              <a:spcBef>
+                <a:spcPts val="95"/>
+              </a:spcBef>
+            </a:pPr>
+            <a:r>
+              <a:rPr lang="en-US" sz="3200" kern="0" dirty="0">
+                <a:latin typeface="Carlito"/>
+                <a:cs typeface="Carlito"/>
+                <a:sym typeface="Wingdings" panose="05000000000000000000" pitchFamily="2" charset="2"/>
+              </a:rPr>
+              <a:t>	2. 0/0 =&gt; ? </a:t>
+            </a:r>
+          </a:p>
+          <a:p>
+            <a:pPr marL="12700">
+              <a:spcBef>
+                <a:spcPts val="95"/>
+              </a:spcBef>
+            </a:pPr>
+            <a:r>
+              <a:rPr lang="en-US" sz="3200" kern="0" dirty="0">
+                <a:latin typeface="Carlito"/>
+                <a:cs typeface="Carlito"/>
+                <a:sym typeface="Wingdings" panose="05000000000000000000" pitchFamily="2" charset="2"/>
+              </a:rPr>
+              <a:t>	3. </a:t>
+            </a:r>
+            <a:r>
+              <a:rPr lang="en-US" sz="3200" kern="0" dirty="0" err="1">
+                <a:latin typeface="Carlito"/>
+                <a:cs typeface="Carlito"/>
+                <a:sym typeface="Wingdings" panose="05000000000000000000" pitchFamily="2" charset="2"/>
+              </a:rPr>
+              <a:t>typeof</a:t>
+            </a:r>
+            <a:r>
+              <a:rPr lang="en-US" sz="3200" kern="0" dirty="0">
+                <a:latin typeface="Carlito"/>
+                <a:cs typeface="Carlito"/>
+                <a:sym typeface="Wingdings" panose="05000000000000000000" pitchFamily="2" charset="2"/>
+              </a:rPr>
+              <a:t>(</a:t>
+            </a:r>
+            <a:r>
+              <a:rPr lang="en-US" sz="3200" kern="0" dirty="0" err="1">
+                <a:latin typeface="Carlito"/>
+                <a:cs typeface="Carlito"/>
+                <a:sym typeface="Wingdings" panose="05000000000000000000" pitchFamily="2" charset="2"/>
+              </a:rPr>
+              <a:t>NaN</a:t>
+            </a:r>
+            <a:r>
+              <a:rPr lang="en-US" sz="3200" kern="0" dirty="0">
+                <a:latin typeface="Carlito"/>
+                <a:cs typeface="Carlito"/>
+                <a:sym typeface="Wingdings" panose="05000000000000000000" pitchFamily="2" charset="2"/>
+              </a:rPr>
+              <a:t>) =&gt; ?</a:t>
+            </a:r>
+          </a:p>
+          <a:p>
+            <a:pPr marL="12700">
+              <a:spcBef>
+                <a:spcPts val="95"/>
+              </a:spcBef>
+            </a:pPr>
+            <a:endParaRPr lang="en-US" sz="3200" kern="0" dirty="0">
+              <a:latin typeface="Carlito"/>
+              <a:cs typeface="Carlito"/>
+              <a:sym typeface="Wingdings" panose="05000000000000000000" pitchFamily="2" charset="2"/>
+            </a:endParaRPr>
+          </a:p>
+          <a:p>
+            <a:pPr marL="12700">
+              <a:spcBef>
+                <a:spcPts val="95"/>
+              </a:spcBef>
+            </a:pPr>
+            <a:r>
+              <a:rPr lang="en-US" sz="3200" u="sng" kern="0" dirty="0">
+                <a:latin typeface="Carlito"/>
+                <a:cs typeface="Carlito"/>
+                <a:sym typeface="Wingdings" panose="05000000000000000000" pitchFamily="2" charset="2"/>
+              </a:rPr>
+              <a:t>Math Functions :</a:t>
+            </a:r>
+            <a:r>
+              <a:rPr lang="en-US" sz="3200" kern="0" dirty="0">
+                <a:latin typeface="Carlito"/>
+                <a:cs typeface="Carlito"/>
+                <a:sym typeface="Wingdings" panose="05000000000000000000" pitchFamily="2" charset="2"/>
+              </a:rPr>
+              <a:t> PI , E , .sqrt(25) , .min(3,4,1) , .max(4,6,1) ,</a:t>
+            </a:r>
+          </a:p>
+          <a:p>
+            <a:pPr marL="12700">
+              <a:spcBef>
+                <a:spcPts val="95"/>
+              </a:spcBef>
+            </a:pPr>
+            <a:r>
+              <a:rPr lang="en-US" sz="3200" kern="0" dirty="0">
+                <a:latin typeface="Carlito"/>
+                <a:cs typeface="Carlito"/>
+                <a:sym typeface="Wingdings" panose="05000000000000000000" pitchFamily="2" charset="2"/>
+              </a:rPr>
+              <a:t>			 .round(10.5), .floor(10.2) , .ceil(10.2) </a:t>
+            </a:r>
+          </a:p>
+          <a:p>
+            <a:pPr marL="12700">
+              <a:spcBef>
+                <a:spcPts val="95"/>
+              </a:spcBef>
+            </a:pPr>
+            <a:r>
+              <a:rPr lang="en-US" sz="3200" kern="0" dirty="0" err="1">
+                <a:latin typeface="Carlito"/>
+                <a:cs typeface="Carlito"/>
+                <a:sym typeface="Wingdings" panose="05000000000000000000" pitchFamily="2" charset="2"/>
+              </a:rPr>
+              <a:t>Math.random</a:t>
+            </a:r>
+            <a:r>
+              <a:rPr lang="en-US" sz="3200" kern="0" dirty="0">
+                <a:latin typeface="Carlito"/>
+                <a:cs typeface="Carlito"/>
+                <a:sym typeface="Wingdings" panose="05000000000000000000" pitchFamily="2" charset="2"/>
+              </a:rPr>
+              <a:t>() =&gt; range from (0,1) </a:t>
+            </a:r>
+          </a:p>
+          <a:p>
+            <a:pPr marL="12700">
+              <a:spcBef>
+                <a:spcPts val="95"/>
+              </a:spcBef>
+            </a:pPr>
+            <a:endParaRPr lang="en-US" sz="3200" kern="0" dirty="0">
+              <a:latin typeface="Carlito"/>
+              <a:cs typeface="Carlito"/>
+              <a:sym typeface="Wingdings" panose="05000000000000000000" pitchFamily="2" charset="2"/>
+            </a:endParaRPr>
+          </a:p>
+          <a:p>
+            <a:pPr marL="12700">
+              <a:spcBef>
+                <a:spcPts val="95"/>
+              </a:spcBef>
+            </a:pPr>
+            <a:r>
+              <a:rPr lang="en-US" sz="3200" kern="0" dirty="0">
+                <a:latin typeface="Carlito"/>
+                <a:cs typeface="Carlito"/>
+                <a:sym typeface="Wingdings" panose="05000000000000000000" pitchFamily="2" charset="2"/>
+              </a:rPr>
+              <a:t>Ques(DIY): Use this function to generate number between 22 - 26.</a:t>
+            </a:r>
+          </a:p>
+        </p:txBody>
+      </p:sp>
+      <p:sp>
+        <p:nvSpPr>
+          <p:cNvPr id="7" name="TextBox 6">
+            <a:extLst>
+              <a:ext uri="{FF2B5EF4-FFF2-40B4-BE49-F238E27FC236}">
+                <a16:creationId xmlns:a16="http://schemas.microsoft.com/office/drawing/2014/main" id="{C2428796-F632-00B4-E484-CA738D260150}"/>
+              </a:ext>
+            </a:extLst>
+          </p:cNvPr>
+          <p:cNvSpPr txBox="1"/>
+          <p:nvPr/>
+        </p:nvSpPr>
+        <p:spPr>
+          <a:xfrm>
+            <a:off x="685800" y="4323186"/>
+            <a:ext cx="7086600" cy="707886"/>
+          </a:xfrm>
+          <a:prstGeom prst="rect">
+            <a:avLst/>
+          </a:prstGeom>
+          <a:noFill/>
+        </p:spPr>
+        <p:txBody>
+          <a:bodyPr wrap="square" rtlCol="0">
+            <a:spAutoFit/>
+          </a:bodyPr>
+          <a:lstStyle/>
+          <a:p>
+            <a:endParaRPr lang="en-IN" sz="4000" dirty="0">
+              <a:solidFill>
+                <a:schemeClr val="bg1"/>
+              </a:solidFill>
+            </a:endParaRPr>
+          </a:p>
+        </p:txBody>
+      </p:sp>
+    </p:spTree>
+    <p:extLst>
+      <p:ext uri="{BB962C8B-B14F-4D97-AF65-F5344CB8AC3E}">
+        <p14:creationId xmlns:p14="http://schemas.microsoft.com/office/powerpoint/2010/main" val="1307551898"/>
+      </p:ext>
+    </p:extLst>
+  </p:cSld>
+  <p:clrMapOvr>
+    <a:masterClrMapping/>
+  </p:clrMapOvr>
+</p:sld>
+</file>
+
+<file path=ppt/slides/slide11.xml><?xml version="1.0" encoding="utf-8"?>
+<p:sld xmlns:a="http://schemas.openxmlformats.org/drawingml/2006/main" xmlns:r="http://schemas.openxmlformats.org/officeDocument/2006/relationships" xmlns:p="http://schemas.openxmlformats.org/presentationml/2006/main">
+  <p:cSld>
+    <p:spTree>
+      <p:nvGrpSpPr>
+        <p:cNvPr id="1" name=""/>
+        <p:cNvGrpSpPr/>
+        <p:nvPr/>
+      </p:nvGrpSpPr>
+      <p:grpSpPr>
+        <a:xfrm>
+          <a:off x="0" y="0"/>
+          <a:ext cx="0" cy="0"/>
+          <a:chOff x="0" y="0"/>
+          <a:chExt cx="0" cy="0"/>
+        </a:xfrm>
+      </p:grpSpPr>
+      <p:sp>
+        <p:nvSpPr>
+          <p:cNvPr id="2" name="object 2"/>
+          <p:cNvSpPr/>
+          <p:nvPr/>
+        </p:nvSpPr>
+        <p:spPr>
+          <a:xfrm>
+            <a:off x="1" y="44199"/>
+            <a:ext cx="12191999" cy="7118601"/>
+          </a:xfrm>
+          <a:prstGeom prst="rect">
+            <a:avLst/>
+          </a:prstGeom>
+          <a:blipFill>
+            <a:blip r:embed="rId2" cstate="print"/>
+            <a:stretch>
+              <a:fillRect/>
+            </a:stretch>
+          </a:blipFill>
+        </p:spPr>
+        <p:txBody>
+          <a:bodyPr wrap="square" lIns="0" tIns="0" rIns="0" bIns="0" rtlCol="0"/>
+          <a:lstStyle/>
+          <a:p>
+            <a:endParaRPr b="1" dirty="0">
+              <a:ln w="13462">
+                <a:solidFill>
+                  <a:schemeClr val="bg1"/>
+                </a:solidFill>
+                <a:prstDash val="solid"/>
+              </a:ln>
+              <a:solidFill>
+                <a:schemeClr val="tx1">
+                  <a:lumMod val="85000"/>
+                  <a:lumOff val="15000"/>
+                </a:schemeClr>
+              </a:solidFill>
+              <a:effectLst>
+                <a:outerShdw dist="38100" dir="2700000" algn="bl" rotWithShape="0">
+                  <a:schemeClr val="accent5"/>
+                </a:outerShdw>
+              </a:effectLst>
+            </a:endParaRPr>
+          </a:p>
+        </p:txBody>
+      </p:sp>
+      <p:sp>
+        <p:nvSpPr>
+          <p:cNvPr id="3" name="object 3"/>
+          <p:cNvSpPr txBox="1">
+            <a:spLocks noGrp="1"/>
+          </p:cNvSpPr>
+          <p:nvPr>
+            <p:ph type="title"/>
+          </p:nvPr>
+        </p:nvSpPr>
+        <p:spPr>
+          <a:xfrm>
+            <a:off x="786485" y="457200"/>
+            <a:ext cx="8967115" cy="535403"/>
+          </a:xfrm>
+          <a:prstGeom prst="rect">
+            <a:avLst/>
+          </a:prstGeom>
+        </p:spPr>
+        <p:txBody>
+          <a:bodyPr vert="horz" wrap="square" lIns="0" tIns="12065" rIns="0" bIns="0" rtlCol="0">
+            <a:spAutoFit/>
+          </a:bodyPr>
+          <a:lstStyle/>
+          <a:p>
+            <a:pPr marL="12700">
+              <a:lnSpc>
+                <a:spcPct val="100000"/>
+              </a:lnSpc>
+              <a:spcBef>
+                <a:spcPts val="95"/>
+              </a:spcBef>
+            </a:pPr>
+            <a:r>
+              <a:rPr lang="en-US" sz="3400" dirty="0">
+                <a:latin typeface="Carlito"/>
+                <a:cs typeface="Carlito"/>
+              </a:rPr>
+              <a:t>Conditionals</a:t>
+            </a:r>
+            <a:endParaRPr sz="3400" dirty="0">
+              <a:latin typeface="Carlito"/>
+              <a:cs typeface="Carlito"/>
+            </a:endParaRPr>
+          </a:p>
+        </p:txBody>
+      </p:sp>
+      <p:sp>
+        <p:nvSpPr>
+          <p:cNvPr id="5" name="object 5"/>
+          <p:cNvSpPr/>
+          <p:nvPr/>
+        </p:nvSpPr>
+        <p:spPr>
+          <a:xfrm>
+            <a:off x="9816083" y="262127"/>
+            <a:ext cx="1976627" cy="822960"/>
+          </a:xfrm>
+          <a:prstGeom prst="rect">
+            <a:avLst/>
+          </a:prstGeom>
+          <a:blipFill>
+            <a:blip r:embed="rId3" cstate="print"/>
+            <a:stretch>
+              <a:fillRect/>
+            </a:stretch>
+          </a:blipFill>
+        </p:spPr>
+        <p:txBody>
+          <a:bodyPr wrap="square" lIns="0" tIns="0" rIns="0" bIns="0" rtlCol="0"/>
+          <a:lstStyle/>
+          <a:p>
+            <a:endParaRPr/>
+          </a:p>
+        </p:txBody>
+      </p:sp>
+      <p:sp>
+        <p:nvSpPr>
+          <p:cNvPr id="4" name="object 3">
+            <a:extLst>
+              <a:ext uri="{FF2B5EF4-FFF2-40B4-BE49-F238E27FC236}">
+                <a16:creationId xmlns:a16="http://schemas.microsoft.com/office/drawing/2014/main" id="{1ED9D45B-4B0D-FC76-3A8C-E89F6CD72254}"/>
+              </a:ext>
+            </a:extLst>
+          </p:cNvPr>
+          <p:cNvSpPr txBox="1">
+            <a:spLocks/>
+          </p:cNvSpPr>
+          <p:nvPr/>
+        </p:nvSpPr>
+        <p:spPr>
+          <a:xfrm>
+            <a:off x="762000" y="1143000"/>
+            <a:ext cx="11283579" cy="5557291"/>
+          </a:xfrm>
+          <a:prstGeom prst="rect">
+            <a:avLst/>
+          </a:prstGeom>
+        </p:spPr>
+        <p:txBody>
+          <a:bodyPr vert="horz" wrap="square" lIns="0" tIns="12065" rIns="0" bIns="0" rtlCol="0">
+            <a:spAutoFit/>
+          </a:bodyPr>
+          <a:lstStyle>
+            <a:lvl1pPr>
+              <a:defRPr sz="6000" b="0" i="0">
+                <a:solidFill>
+                  <a:srgbClr val="E7E6E6"/>
+                </a:solidFill>
+                <a:latin typeface="Trebuchet MS"/>
+                <a:ea typeface="+mj-ea"/>
+                <a:cs typeface="Trebuchet MS"/>
+              </a:defRPr>
+            </a:lvl1pPr>
+          </a:lstStyle>
+          <a:p>
+            <a:pPr marL="12700">
+              <a:spcBef>
+                <a:spcPts val="95"/>
+              </a:spcBef>
+            </a:pPr>
+            <a:r>
+              <a:rPr lang="en-US" sz="3200" kern="0" dirty="0">
+                <a:latin typeface="Carlito"/>
+                <a:cs typeface="Carlito"/>
+                <a:sym typeface="Wingdings" panose="05000000000000000000" pitchFamily="2" charset="2"/>
+              </a:rPr>
+              <a:t>if(conditions) {				{  } -&gt; Block</a:t>
+            </a:r>
+          </a:p>
+          <a:p>
+            <a:pPr marL="12700">
+              <a:spcBef>
+                <a:spcPts val="95"/>
+              </a:spcBef>
+            </a:pPr>
+            <a:r>
+              <a:rPr lang="en-US" sz="3200" kern="0" dirty="0">
+                <a:latin typeface="Carlito"/>
+                <a:cs typeface="Carlito"/>
+                <a:sym typeface="Wingdings" panose="05000000000000000000" pitchFamily="2" charset="2"/>
+              </a:rPr>
+              <a:t>//true condition</a:t>
+            </a:r>
+          </a:p>
+          <a:p>
+            <a:pPr marL="12700">
+              <a:spcBef>
+                <a:spcPts val="95"/>
+              </a:spcBef>
+            </a:pPr>
+            <a:r>
+              <a:rPr lang="en-US" sz="3200" kern="0" dirty="0">
+                <a:latin typeface="Carlito"/>
+                <a:cs typeface="Carlito"/>
+                <a:sym typeface="Wingdings" panose="05000000000000000000" pitchFamily="2" charset="2"/>
+              </a:rPr>
+              <a:t>}else if(2</a:t>
+            </a:r>
+            <a:r>
+              <a:rPr lang="en-US" sz="3200" kern="0" baseline="30000" dirty="0">
+                <a:latin typeface="Carlito"/>
+                <a:cs typeface="Carlito"/>
+                <a:sym typeface="Wingdings" panose="05000000000000000000" pitchFamily="2" charset="2"/>
+              </a:rPr>
+              <a:t>nd</a:t>
+            </a:r>
+            <a:r>
+              <a:rPr lang="en-US" sz="3200" kern="0" dirty="0">
+                <a:latin typeface="Carlito"/>
+                <a:cs typeface="Carlito"/>
+                <a:sym typeface="Wingdings" panose="05000000000000000000" pitchFamily="2" charset="2"/>
+              </a:rPr>
+              <a:t> conditions ){</a:t>
+            </a:r>
+          </a:p>
+          <a:p>
+            <a:pPr marL="12700">
+              <a:spcBef>
+                <a:spcPts val="95"/>
+              </a:spcBef>
+            </a:pPr>
+            <a:r>
+              <a:rPr lang="en-US" sz="3200" kern="0" dirty="0">
+                <a:latin typeface="Carlito"/>
+                <a:cs typeface="Carlito"/>
+                <a:sym typeface="Wingdings" panose="05000000000000000000" pitchFamily="2" charset="2"/>
+              </a:rPr>
+              <a:t>//true 2</a:t>
+            </a:r>
+            <a:r>
+              <a:rPr lang="en-US" sz="3200" kern="0" baseline="30000" dirty="0">
+                <a:latin typeface="Carlito"/>
+                <a:cs typeface="Carlito"/>
+                <a:sym typeface="Wingdings" panose="05000000000000000000" pitchFamily="2" charset="2"/>
+              </a:rPr>
+              <a:t>nd</a:t>
+            </a:r>
+            <a:r>
+              <a:rPr lang="en-US" sz="3200" kern="0" dirty="0">
+                <a:latin typeface="Carlito"/>
+                <a:cs typeface="Carlito"/>
+                <a:sym typeface="Wingdings" panose="05000000000000000000" pitchFamily="2" charset="2"/>
+              </a:rPr>
+              <a:t> condition</a:t>
+            </a:r>
+          </a:p>
+          <a:p>
+            <a:pPr marL="12700">
+              <a:spcBef>
+                <a:spcPts val="95"/>
+              </a:spcBef>
+            </a:pPr>
+            <a:r>
+              <a:rPr lang="en-US" sz="3200" kern="0" dirty="0">
+                <a:latin typeface="Carlito"/>
+                <a:cs typeface="Carlito"/>
+                <a:sym typeface="Wingdings" panose="05000000000000000000" pitchFamily="2" charset="2"/>
+              </a:rPr>
+              <a:t>}else{</a:t>
+            </a:r>
+          </a:p>
+          <a:p>
+            <a:pPr marL="12700">
+              <a:spcBef>
+                <a:spcPts val="95"/>
+              </a:spcBef>
+            </a:pPr>
+            <a:r>
+              <a:rPr lang="en-US" sz="3200" kern="0" dirty="0">
+                <a:latin typeface="Carlito"/>
+                <a:cs typeface="Carlito"/>
+                <a:sym typeface="Wingdings" panose="05000000000000000000" pitchFamily="2" charset="2"/>
+              </a:rPr>
+              <a:t>//all conditions false</a:t>
+            </a:r>
+          </a:p>
+          <a:p>
+            <a:pPr marL="12700">
+              <a:spcBef>
+                <a:spcPts val="95"/>
+              </a:spcBef>
+            </a:pPr>
+            <a:r>
+              <a:rPr lang="en-US" sz="3200" kern="0" dirty="0">
+                <a:latin typeface="Carlito"/>
+                <a:cs typeface="Carlito"/>
+                <a:sym typeface="Wingdings" panose="05000000000000000000" pitchFamily="2" charset="2"/>
+              </a:rPr>
+              <a:t>}</a:t>
+            </a:r>
+          </a:p>
+          <a:p>
+            <a:pPr marL="12700">
+              <a:spcBef>
+                <a:spcPts val="95"/>
+              </a:spcBef>
+            </a:pPr>
+            <a:endParaRPr lang="en-US" sz="3200" kern="0" dirty="0">
+              <a:latin typeface="Carlito"/>
+              <a:cs typeface="Carlito"/>
+              <a:sym typeface="Wingdings" panose="05000000000000000000" pitchFamily="2" charset="2"/>
+            </a:endParaRPr>
+          </a:p>
+          <a:p>
+            <a:pPr marL="12700">
+              <a:spcBef>
+                <a:spcPts val="95"/>
+              </a:spcBef>
+            </a:pPr>
+            <a:r>
+              <a:rPr lang="en-US" sz="3200" kern="0" dirty="0">
+                <a:latin typeface="Carlito"/>
+                <a:cs typeface="Carlito"/>
+                <a:sym typeface="Wingdings" panose="05000000000000000000" pitchFamily="2" charset="2"/>
+              </a:rPr>
+              <a:t>Logical Operators : and(&amp;&amp;),  or(||) , not(!)</a:t>
+            </a:r>
+          </a:p>
+          <a:p>
+            <a:pPr marL="12700">
+              <a:spcBef>
+                <a:spcPts val="95"/>
+              </a:spcBef>
+            </a:pPr>
+            <a:r>
+              <a:rPr lang="en-US" sz="3200" kern="0" dirty="0">
+                <a:latin typeface="Carlito"/>
+                <a:cs typeface="Carlito"/>
+                <a:sym typeface="Wingdings" panose="05000000000000000000" pitchFamily="2" charset="2"/>
+              </a:rPr>
+              <a:t>Relational Operators : != , !== , == , === , &gt; , &lt; , =&lt; , &gt;=  </a:t>
+            </a:r>
+          </a:p>
+          <a:p>
+            <a:pPr marL="12700">
+              <a:spcBef>
+                <a:spcPts val="95"/>
+              </a:spcBef>
+            </a:pPr>
+            <a:endParaRPr lang="en-US" sz="3200" kern="0" dirty="0">
+              <a:latin typeface="Carlito"/>
+              <a:cs typeface="Carlito"/>
+              <a:sym typeface="Wingdings" panose="05000000000000000000" pitchFamily="2" charset="2"/>
+            </a:endParaRPr>
+          </a:p>
+        </p:txBody>
+      </p:sp>
+      <p:sp>
+        <p:nvSpPr>
+          <p:cNvPr id="7" name="TextBox 6">
+            <a:extLst>
+              <a:ext uri="{FF2B5EF4-FFF2-40B4-BE49-F238E27FC236}">
+                <a16:creationId xmlns:a16="http://schemas.microsoft.com/office/drawing/2014/main" id="{C2428796-F632-00B4-E484-CA738D260150}"/>
+              </a:ext>
+            </a:extLst>
+          </p:cNvPr>
+          <p:cNvSpPr txBox="1"/>
+          <p:nvPr/>
+        </p:nvSpPr>
+        <p:spPr>
+          <a:xfrm>
+            <a:off x="685800" y="4323186"/>
+            <a:ext cx="7086600" cy="707886"/>
+          </a:xfrm>
+          <a:prstGeom prst="rect">
+            <a:avLst/>
+          </a:prstGeom>
+          <a:noFill/>
+        </p:spPr>
+        <p:txBody>
+          <a:bodyPr wrap="square" rtlCol="0">
+            <a:spAutoFit/>
+          </a:bodyPr>
+          <a:lstStyle/>
+          <a:p>
+            <a:endParaRPr lang="en-IN" sz="4000" dirty="0">
+              <a:solidFill>
+                <a:schemeClr val="bg1"/>
+              </a:solidFill>
+            </a:endParaRPr>
+          </a:p>
+        </p:txBody>
+      </p:sp>
+    </p:spTree>
+    <p:extLst>
+      <p:ext uri="{BB962C8B-B14F-4D97-AF65-F5344CB8AC3E}">
+        <p14:creationId xmlns:p14="http://schemas.microsoft.com/office/powerpoint/2010/main" val="2410471770"/>
+      </p:ext>
+    </p:extLst>
+  </p:cSld>
+  <p:clrMapOvr>
+    <a:masterClrMapping/>
+  </p:clrMapOvr>
+</p:sld>
+</file>
+
+<file path=ppt/slides/slide12.xml><?xml version="1.0" encoding="utf-8"?>
+<p:sld xmlns:a="http://schemas.openxmlformats.org/drawingml/2006/main" xmlns:r="http://schemas.openxmlformats.org/officeDocument/2006/relationships" xmlns:p="http://schemas.openxmlformats.org/presentationml/2006/main">
+  <p:cSld>
+    <p:spTree>
+      <p:nvGrpSpPr>
+        <p:cNvPr id="1" name=""/>
+        <p:cNvGrpSpPr/>
+        <p:nvPr/>
+      </p:nvGrpSpPr>
+      <p:grpSpPr>
+        <a:xfrm>
+          <a:off x="0" y="0"/>
+          <a:ext cx="0" cy="0"/>
+          <a:chOff x="0" y="0"/>
+          <a:chExt cx="0" cy="0"/>
+        </a:xfrm>
+      </p:grpSpPr>
+      <p:sp>
+        <p:nvSpPr>
+          <p:cNvPr id="2" name="object 2"/>
+          <p:cNvSpPr/>
+          <p:nvPr/>
+        </p:nvSpPr>
+        <p:spPr>
+          <a:xfrm>
+            <a:off x="1" y="-152400"/>
+            <a:ext cx="12191999" cy="7118601"/>
+          </a:xfrm>
+          <a:prstGeom prst="rect">
+            <a:avLst/>
+          </a:prstGeom>
+          <a:blipFill>
+            <a:blip r:embed="rId2" cstate="print"/>
+            <a:stretch>
+              <a:fillRect/>
+            </a:stretch>
+          </a:blipFill>
+        </p:spPr>
+        <p:txBody>
+          <a:bodyPr wrap="square" lIns="0" tIns="0" rIns="0" bIns="0" rtlCol="0"/>
+          <a:lstStyle/>
+          <a:p>
+            <a:endParaRPr b="1" dirty="0">
+              <a:ln w="13462">
+                <a:solidFill>
+                  <a:schemeClr val="bg1"/>
+                </a:solidFill>
+                <a:prstDash val="solid"/>
+              </a:ln>
+              <a:solidFill>
+                <a:schemeClr val="tx1">
+                  <a:lumMod val="85000"/>
+                  <a:lumOff val="15000"/>
+                </a:schemeClr>
+              </a:solidFill>
+              <a:effectLst>
+                <a:outerShdw dist="38100" dir="2700000" algn="bl" rotWithShape="0">
+                  <a:schemeClr val="accent5"/>
+                </a:outerShdw>
+              </a:effectLst>
+            </a:endParaRPr>
+          </a:p>
+        </p:txBody>
+      </p:sp>
+      <p:sp>
+        <p:nvSpPr>
+          <p:cNvPr id="3" name="object 3"/>
+          <p:cNvSpPr txBox="1">
+            <a:spLocks noGrp="1"/>
+          </p:cNvSpPr>
+          <p:nvPr>
+            <p:ph type="title"/>
+          </p:nvPr>
+        </p:nvSpPr>
+        <p:spPr>
+          <a:xfrm>
+            <a:off x="786485" y="457200"/>
+            <a:ext cx="8967115" cy="535403"/>
+          </a:xfrm>
+          <a:prstGeom prst="rect">
+            <a:avLst/>
+          </a:prstGeom>
+        </p:spPr>
+        <p:txBody>
+          <a:bodyPr vert="horz" wrap="square" lIns="0" tIns="12065" rIns="0" bIns="0" rtlCol="0">
+            <a:spAutoFit/>
+          </a:bodyPr>
+          <a:lstStyle/>
+          <a:p>
+            <a:pPr marL="12700">
+              <a:lnSpc>
+                <a:spcPct val="100000"/>
+              </a:lnSpc>
+              <a:spcBef>
+                <a:spcPts val="95"/>
+              </a:spcBef>
+            </a:pPr>
+            <a:r>
+              <a:rPr lang="en-US" sz="3400" dirty="0">
+                <a:latin typeface="Carlito"/>
+                <a:cs typeface="Carlito"/>
+              </a:rPr>
+              <a:t>User Input</a:t>
+            </a:r>
+            <a:endParaRPr sz="3400" dirty="0">
+              <a:latin typeface="Carlito"/>
+              <a:cs typeface="Carlito"/>
+            </a:endParaRPr>
+          </a:p>
+        </p:txBody>
+      </p:sp>
+      <p:sp>
+        <p:nvSpPr>
+          <p:cNvPr id="5" name="object 5"/>
+          <p:cNvSpPr/>
+          <p:nvPr/>
+        </p:nvSpPr>
+        <p:spPr>
+          <a:xfrm>
+            <a:off x="9816083" y="262127"/>
+            <a:ext cx="1976627" cy="822960"/>
+          </a:xfrm>
+          <a:prstGeom prst="rect">
+            <a:avLst/>
+          </a:prstGeom>
+          <a:blipFill>
+            <a:blip r:embed="rId3" cstate="print"/>
+            <a:stretch>
+              <a:fillRect/>
+            </a:stretch>
+          </a:blipFill>
+        </p:spPr>
+        <p:txBody>
+          <a:bodyPr wrap="square" lIns="0" tIns="0" rIns="0" bIns="0" rtlCol="0"/>
+          <a:lstStyle/>
+          <a:p>
+            <a:endParaRPr/>
+          </a:p>
+        </p:txBody>
+      </p:sp>
+      <p:sp>
+        <p:nvSpPr>
+          <p:cNvPr id="4" name="object 3">
+            <a:extLst>
+              <a:ext uri="{FF2B5EF4-FFF2-40B4-BE49-F238E27FC236}">
+                <a16:creationId xmlns:a16="http://schemas.microsoft.com/office/drawing/2014/main" id="{1ED9D45B-4B0D-FC76-3A8C-E89F6CD72254}"/>
+              </a:ext>
+            </a:extLst>
+          </p:cNvPr>
+          <p:cNvSpPr txBox="1">
+            <a:spLocks/>
+          </p:cNvSpPr>
+          <p:nvPr/>
+        </p:nvSpPr>
+        <p:spPr>
+          <a:xfrm>
+            <a:off x="762000" y="1143000"/>
+            <a:ext cx="11283579" cy="2525691"/>
+          </a:xfrm>
+          <a:prstGeom prst="rect">
+            <a:avLst/>
+          </a:prstGeom>
+        </p:spPr>
+        <p:txBody>
+          <a:bodyPr vert="horz" wrap="square" lIns="0" tIns="12065" rIns="0" bIns="0" rtlCol="0">
+            <a:spAutoFit/>
+          </a:bodyPr>
+          <a:lstStyle>
+            <a:lvl1pPr>
+              <a:defRPr sz="6000" b="0" i="0">
+                <a:solidFill>
+                  <a:srgbClr val="E7E6E6"/>
+                </a:solidFill>
+                <a:latin typeface="Trebuchet MS"/>
+                <a:ea typeface="+mj-ea"/>
+                <a:cs typeface="Trebuchet MS"/>
+              </a:defRPr>
+            </a:lvl1pPr>
+          </a:lstStyle>
+          <a:p>
+            <a:pPr marL="12700">
+              <a:spcBef>
+                <a:spcPts val="95"/>
+              </a:spcBef>
+            </a:pPr>
+            <a:r>
+              <a:rPr lang="en-US" sz="3200" kern="0" dirty="0">
+                <a:latin typeface="Carlito"/>
+                <a:cs typeface="Carlito"/>
+                <a:sym typeface="Wingdings" panose="05000000000000000000" pitchFamily="2" charset="2"/>
+              </a:rPr>
+              <a:t>We use prompt to take user input.</a:t>
+            </a:r>
+          </a:p>
+          <a:p>
+            <a:pPr marL="12700">
+              <a:spcBef>
+                <a:spcPts val="95"/>
+              </a:spcBef>
+            </a:pPr>
+            <a:r>
+              <a:rPr lang="en-US" sz="3200" kern="0" dirty="0">
+                <a:latin typeface="Carlito"/>
+                <a:cs typeface="Carlito"/>
+                <a:sym typeface="Wingdings" panose="05000000000000000000" pitchFamily="2" charset="2"/>
+              </a:rPr>
+              <a:t>let a = prompt(“Entera a number”);</a:t>
+            </a:r>
+          </a:p>
+          <a:p>
+            <a:pPr marL="12700">
+              <a:spcBef>
+                <a:spcPts val="95"/>
+              </a:spcBef>
+            </a:pPr>
+            <a:r>
+              <a:rPr lang="en-US" sz="3200" kern="0" dirty="0">
+                <a:latin typeface="Carlito"/>
+                <a:cs typeface="Carlito"/>
+                <a:sym typeface="Wingdings" panose="05000000000000000000" pitchFamily="2" charset="2"/>
+              </a:rPr>
+              <a:t>Prompt returns all values in String </a:t>
+            </a:r>
+          </a:p>
+          <a:p>
+            <a:pPr marL="469900" indent="-457200">
+              <a:spcBef>
+                <a:spcPts val="95"/>
+              </a:spcBef>
+              <a:buFont typeface="Wingdings" panose="05000000000000000000" pitchFamily="2" charset="2"/>
+              <a:buChar char="à"/>
+            </a:pPr>
+            <a:r>
+              <a:rPr lang="en-US" sz="3200" kern="0" dirty="0">
+                <a:latin typeface="Carlito"/>
+                <a:cs typeface="Carlito"/>
+                <a:sym typeface="Wingdings" panose="05000000000000000000" pitchFamily="2" charset="2"/>
+              </a:rPr>
+              <a:t>We have to parse it into our desired datatypes using parse</a:t>
+            </a:r>
+          </a:p>
+          <a:p>
+            <a:pPr marL="12700">
+              <a:spcBef>
+                <a:spcPts val="95"/>
+              </a:spcBef>
+            </a:pPr>
+            <a:r>
+              <a:rPr lang="en-US" sz="3200" kern="0" dirty="0">
+                <a:latin typeface="Carlito"/>
+                <a:cs typeface="Carlito"/>
+                <a:sym typeface="Wingdings" panose="05000000000000000000" pitchFamily="2" charset="2"/>
+              </a:rPr>
+              <a:t>     (</a:t>
+            </a:r>
+            <a:r>
+              <a:rPr lang="en-US" sz="3200" kern="0" dirty="0" err="1">
+                <a:latin typeface="Carlito"/>
+                <a:cs typeface="Carlito"/>
+                <a:sym typeface="Wingdings" panose="05000000000000000000" pitchFamily="2" charset="2"/>
+              </a:rPr>
+              <a:t>e.g</a:t>
+            </a:r>
+            <a:r>
+              <a:rPr lang="en-US" sz="3200" kern="0" dirty="0">
+                <a:latin typeface="Carlito"/>
+                <a:cs typeface="Carlito"/>
+                <a:sym typeface="Wingdings" panose="05000000000000000000" pitchFamily="2" charset="2"/>
+              </a:rPr>
+              <a:t> </a:t>
+            </a:r>
+            <a:r>
+              <a:rPr lang="en-US" sz="3200" kern="0" dirty="0" err="1">
+                <a:latin typeface="Carlito"/>
+                <a:cs typeface="Carlito"/>
+                <a:sym typeface="Wingdings" panose="05000000000000000000" pitchFamily="2" charset="2"/>
+              </a:rPr>
+              <a:t>parseInt</a:t>
+            </a:r>
+            <a:r>
+              <a:rPr lang="en-US" sz="3200" kern="0" dirty="0">
+                <a:latin typeface="Carlito"/>
+                <a:cs typeface="Carlito"/>
+                <a:sym typeface="Wingdings" panose="05000000000000000000" pitchFamily="2" charset="2"/>
+              </a:rPr>
+              <a:t>(a) ,</a:t>
+            </a:r>
+            <a:r>
+              <a:rPr lang="en-US" sz="3200" kern="0" dirty="0" err="1">
+                <a:latin typeface="Carlito"/>
+                <a:cs typeface="Carlito"/>
+                <a:sym typeface="Wingdings" panose="05000000000000000000" pitchFamily="2" charset="2"/>
+              </a:rPr>
+              <a:t>parseFloat</a:t>
+            </a:r>
+            <a:r>
+              <a:rPr lang="en-US" sz="3200" kern="0" dirty="0">
+                <a:latin typeface="Carlito"/>
+                <a:cs typeface="Carlito"/>
+                <a:sym typeface="Wingdings" panose="05000000000000000000" pitchFamily="2" charset="2"/>
+              </a:rPr>
+              <a:t>…)</a:t>
+            </a:r>
+          </a:p>
+        </p:txBody>
+      </p:sp>
+      <p:sp>
+        <p:nvSpPr>
+          <p:cNvPr id="7" name="TextBox 6">
+            <a:extLst>
+              <a:ext uri="{FF2B5EF4-FFF2-40B4-BE49-F238E27FC236}">
+                <a16:creationId xmlns:a16="http://schemas.microsoft.com/office/drawing/2014/main" id="{C2428796-F632-00B4-E484-CA738D260150}"/>
+              </a:ext>
+            </a:extLst>
+          </p:cNvPr>
+          <p:cNvSpPr txBox="1"/>
+          <p:nvPr/>
+        </p:nvSpPr>
+        <p:spPr>
+          <a:xfrm>
+            <a:off x="685800" y="4323186"/>
+            <a:ext cx="7086600" cy="707886"/>
+          </a:xfrm>
+          <a:prstGeom prst="rect">
+            <a:avLst/>
+          </a:prstGeom>
+          <a:noFill/>
+        </p:spPr>
+        <p:txBody>
+          <a:bodyPr wrap="square" rtlCol="0">
+            <a:spAutoFit/>
+          </a:bodyPr>
+          <a:lstStyle/>
+          <a:p>
+            <a:endParaRPr lang="en-IN" sz="4000" dirty="0">
+              <a:solidFill>
+                <a:schemeClr val="bg1"/>
+              </a:solidFill>
+            </a:endParaRPr>
+          </a:p>
+        </p:txBody>
+      </p:sp>
+    </p:spTree>
+    <p:extLst>
+      <p:ext uri="{BB962C8B-B14F-4D97-AF65-F5344CB8AC3E}">
+        <p14:creationId xmlns:p14="http://schemas.microsoft.com/office/powerpoint/2010/main" val="1847197179"/>
+      </p:ext>
+    </p:extLst>
+  </p:cSld>
+  <p:clrMapOvr>
+    <a:masterClrMapping/>
+  </p:clrMapOvr>
+</p:sld>
+</file>
+
+<file path=ppt/slides/slide13.xml><?xml version="1.0" encoding="utf-8"?>
+<p:sld xmlns:a="http://schemas.openxmlformats.org/drawingml/2006/main" xmlns:r="http://schemas.openxmlformats.org/officeDocument/2006/relationships" xmlns:p="http://schemas.openxmlformats.org/presentationml/2006/main">
+  <p:cSld>
+    <p:spTree>
+      <p:nvGrpSpPr>
+        <p:cNvPr id="1" name=""/>
+        <p:cNvGrpSpPr/>
+        <p:nvPr/>
+      </p:nvGrpSpPr>
+      <p:grpSpPr>
+        <a:xfrm>
+          <a:off x="0" y="0"/>
+          <a:ext cx="0" cy="0"/>
+          <a:chOff x="0" y="0"/>
+          <a:chExt cx="0" cy="0"/>
+        </a:xfrm>
+      </p:grpSpPr>
+      <p:sp>
+        <p:nvSpPr>
+          <p:cNvPr id="2" name="object 2"/>
+          <p:cNvSpPr/>
+          <p:nvPr/>
+        </p:nvSpPr>
+        <p:spPr>
+          <a:xfrm>
+            <a:off x="1" y="44199"/>
+            <a:ext cx="12191999" cy="7118601"/>
+          </a:xfrm>
+          <a:prstGeom prst="rect">
+            <a:avLst/>
+          </a:prstGeom>
+          <a:blipFill>
+            <a:blip r:embed="rId2" cstate="print"/>
+            <a:stretch>
+              <a:fillRect/>
+            </a:stretch>
+          </a:blipFill>
+        </p:spPr>
+        <p:txBody>
+          <a:bodyPr wrap="square" lIns="0" tIns="0" rIns="0" bIns="0" rtlCol="0"/>
+          <a:lstStyle/>
+          <a:p>
+            <a:endParaRPr b="1" dirty="0">
+              <a:ln w="13462">
+                <a:solidFill>
+                  <a:schemeClr val="bg1"/>
+                </a:solidFill>
+                <a:prstDash val="solid"/>
+              </a:ln>
+              <a:solidFill>
+                <a:schemeClr val="tx1">
+                  <a:lumMod val="85000"/>
+                  <a:lumOff val="15000"/>
+                </a:schemeClr>
+              </a:solidFill>
+              <a:effectLst>
+                <a:outerShdw dist="38100" dir="2700000" algn="bl" rotWithShape="0">
+                  <a:schemeClr val="accent5"/>
+                </a:outerShdw>
+              </a:effectLst>
+            </a:endParaRPr>
+          </a:p>
+        </p:txBody>
+      </p:sp>
+      <p:sp>
+        <p:nvSpPr>
+          <p:cNvPr id="3" name="object 3"/>
+          <p:cNvSpPr txBox="1">
+            <a:spLocks noGrp="1"/>
+          </p:cNvSpPr>
+          <p:nvPr>
+            <p:ph type="title"/>
+          </p:nvPr>
+        </p:nvSpPr>
+        <p:spPr>
+          <a:xfrm>
+            <a:off x="786485" y="457200"/>
+            <a:ext cx="8967115" cy="535403"/>
+          </a:xfrm>
+          <a:prstGeom prst="rect">
+            <a:avLst/>
+          </a:prstGeom>
+        </p:spPr>
+        <p:txBody>
+          <a:bodyPr vert="horz" wrap="square" lIns="0" tIns="12065" rIns="0" bIns="0" rtlCol="0">
+            <a:spAutoFit/>
+          </a:bodyPr>
+          <a:lstStyle/>
+          <a:p>
+            <a:pPr marL="12700">
+              <a:lnSpc>
+                <a:spcPct val="100000"/>
+              </a:lnSpc>
+              <a:spcBef>
+                <a:spcPts val="95"/>
+              </a:spcBef>
+            </a:pPr>
+            <a:r>
+              <a:rPr lang="en-US" sz="3400" dirty="0">
+                <a:latin typeface="Carlito"/>
+                <a:cs typeface="Carlito"/>
+              </a:rPr>
+              <a:t>Array</a:t>
+            </a:r>
+            <a:endParaRPr sz="3400" dirty="0">
+              <a:latin typeface="Carlito"/>
+              <a:cs typeface="Carlito"/>
+            </a:endParaRPr>
+          </a:p>
+        </p:txBody>
+      </p:sp>
+      <p:sp>
+        <p:nvSpPr>
+          <p:cNvPr id="5" name="object 5"/>
+          <p:cNvSpPr/>
+          <p:nvPr/>
+        </p:nvSpPr>
+        <p:spPr>
+          <a:xfrm>
+            <a:off x="9816083" y="262127"/>
+            <a:ext cx="1976627" cy="822960"/>
+          </a:xfrm>
+          <a:prstGeom prst="rect">
+            <a:avLst/>
+          </a:prstGeom>
+          <a:blipFill>
+            <a:blip r:embed="rId3" cstate="print"/>
+            <a:stretch>
+              <a:fillRect/>
+            </a:stretch>
+          </a:blipFill>
+        </p:spPr>
+        <p:txBody>
+          <a:bodyPr wrap="square" lIns="0" tIns="0" rIns="0" bIns="0" rtlCol="0"/>
+          <a:lstStyle/>
+          <a:p>
+            <a:endParaRPr/>
+          </a:p>
+        </p:txBody>
+      </p:sp>
+      <p:sp>
+        <p:nvSpPr>
+          <p:cNvPr id="4" name="object 3">
+            <a:extLst>
+              <a:ext uri="{FF2B5EF4-FFF2-40B4-BE49-F238E27FC236}">
+                <a16:creationId xmlns:a16="http://schemas.microsoft.com/office/drawing/2014/main" id="{1ED9D45B-4B0D-FC76-3A8C-E89F6CD72254}"/>
+              </a:ext>
+            </a:extLst>
+          </p:cNvPr>
+          <p:cNvSpPr txBox="1">
+            <a:spLocks/>
+          </p:cNvSpPr>
+          <p:nvPr/>
+        </p:nvSpPr>
+        <p:spPr>
+          <a:xfrm>
+            <a:off x="762000" y="1143000"/>
+            <a:ext cx="11283579" cy="5557291"/>
+          </a:xfrm>
+          <a:prstGeom prst="rect">
+            <a:avLst/>
+          </a:prstGeom>
+        </p:spPr>
+        <p:txBody>
+          <a:bodyPr vert="horz" wrap="square" lIns="0" tIns="12065" rIns="0" bIns="0" rtlCol="0">
+            <a:spAutoFit/>
+          </a:bodyPr>
+          <a:lstStyle>
+            <a:lvl1pPr>
+              <a:defRPr sz="6000" b="0" i="0">
+                <a:solidFill>
+                  <a:srgbClr val="E7E6E6"/>
+                </a:solidFill>
+                <a:latin typeface="Trebuchet MS"/>
+                <a:ea typeface="+mj-ea"/>
+                <a:cs typeface="Trebuchet MS"/>
+              </a:defRPr>
+            </a:lvl1pPr>
+          </a:lstStyle>
+          <a:p>
+            <a:pPr marL="12700">
+              <a:spcBef>
+                <a:spcPts val="95"/>
+              </a:spcBef>
+            </a:pPr>
+            <a:r>
+              <a:rPr lang="en-US" sz="3200" kern="0" dirty="0">
+                <a:latin typeface="Carlito"/>
+                <a:cs typeface="Carlito"/>
+                <a:sym typeface="Wingdings" panose="05000000000000000000" pitchFamily="2" charset="2"/>
+              </a:rPr>
+              <a:t>Array is a Data Structure. </a:t>
+            </a:r>
+          </a:p>
+          <a:p>
+            <a:pPr marL="469900" indent="-457200">
+              <a:spcBef>
+                <a:spcPts val="95"/>
+              </a:spcBef>
+              <a:buFont typeface="Wingdings" panose="05000000000000000000" pitchFamily="2" charset="2"/>
+              <a:buChar char="à"/>
+            </a:pPr>
+            <a:r>
+              <a:rPr lang="en-US" sz="3200" kern="0" dirty="0">
+                <a:latin typeface="Carlito"/>
+                <a:cs typeface="Carlito"/>
+                <a:sym typeface="Wingdings" panose="05000000000000000000" pitchFamily="2" charset="2"/>
+              </a:rPr>
+              <a:t>Ordered data structure.</a:t>
+            </a:r>
+          </a:p>
+          <a:p>
+            <a:pPr marL="469900" indent="-457200">
+              <a:spcBef>
+                <a:spcPts val="95"/>
+              </a:spcBef>
+              <a:buFont typeface="Wingdings" panose="05000000000000000000" pitchFamily="2" charset="2"/>
+              <a:buChar char="à"/>
+            </a:pPr>
+            <a:r>
+              <a:rPr lang="en-US" sz="3200" kern="0" dirty="0">
+                <a:latin typeface="Carlito"/>
+                <a:cs typeface="Carlito"/>
+                <a:sym typeface="Wingdings" panose="05000000000000000000" pitchFamily="2" charset="2"/>
+              </a:rPr>
+              <a:t>Heterogenous types of data ( in JS)</a:t>
+            </a:r>
+          </a:p>
+          <a:p>
+            <a:pPr marL="12700">
+              <a:spcBef>
+                <a:spcPts val="95"/>
+              </a:spcBef>
+            </a:pPr>
+            <a:endParaRPr lang="en-US" sz="3200" kern="0" dirty="0">
+              <a:latin typeface="Carlito"/>
+              <a:cs typeface="Carlito"/>
+              <a:sym typeface="Wingdings" panose="05000000000000000000" pitchFamily="2" charset="2"/>
+            </a:endParaRPr>
+          </a:p>
+          <a:p>
+            <a:pPr marL="12700">
+              <a:spcBef>
+                <a:spcPts val="95"/>
+              </a:spcBef>
+            </a:pPr>
+            <a:r>
+              <a:rPr lang="en-US" sz="3200" kern="0" dirty="0">
+                <a:latin typeface="Carlito"/>
+                <a:cs typeface="Carlito"/>
+                <a:sym typeface="Wingdings" panose="05000000000000000000" pitchFamily="2" charset="2"/>
+              </a:rPr>
+              <a:t>e.g. let </a:t>
+            </a:r>
+            <a:r>
+              <a:rPr lang="en-US" sz="3200" kern="0" dirty="0" err="1">
+                <a:latin typeface="Carlito"/>
+                <a:cs typeface="Carlito"/>
+                <a:sym typeface="Wingdings" panose="05000000000000000000" pitchFamily="2" charset="2"/>
+              </a:rPr>
+              <a:t>arr</a:t>
+            </a:r>
+            <a:r>
+              <a:rPr lang="en-US" sz="3200" kern="0" dirty="0">
+                <a:latin typeface="Carlito"/>
+                <a:cs typeface="Carlito"/>
+                <a:sym typeface="Wingdings" panose="05000000000000000000" pitchFamily="2" charset="2"/>
+              </a:rPr>
+              <a:t> = [] ; print(</a:t>
+            </a:r>
+            <a:r>
+              <a:rPr lang="en-US" sz="3200" kern="0" dirty="0" err="1">
+                <a:latin typeface="Carlito"/>
+                <a:cs typeface="Carlito"/>
+                <a:sym typeface="Wingdings" panose="05000000000000000000" pitchFamily="2" charset="2"/>
+              </a:rPr>
+              <a:t>arr</a:t>
+            </a:r>
+            <a:r>
+              <a:rPr lang="en-US" sz="3200" kern="0" dirty="0">
+                <a:latin typeface="Carlito"/>
+                <a:cs typeface="Carlito"/>
+                <a:sym typeface="Wingdings" panose="05000000000000000000" pitchFamily="2" charset="2"/>
+              </a:rPr>
+              <a:t>); // it returns object of Array, why?</a:t>
+            </a:r>
+          </a:p>
+          <a:p>
+            <a:pPr marL="12700">
+              <a:spcBef>
+                <a:spcPts val="95"/>
+              </a:spcBef>
+            </a:pPr>
+            <a:r>
+              <a:rPr lang="en-US" sz="3200" kern="0" dirty="0" err="1">
+                <a:latin typeface="Carlito"/>
+                <a:cs typeface="Carlito"/>
+                <a:sym typeface="Wingdings" panose="05000000000000000000" pitchFamily="2" charset="2"/>
+              </a:rPr>
+              <a:t>ans</a:t>
+            </a:r>
+            <a:r>
+              <a:rPr lang="en-US" sz="3200" kern="0" dirty="0">
+                <a:latin typeface="Carlito"/>
+                <a:cs typeface="Carlito"/>
+                <a:sym typeface="Wingdings" panose="05000000000000000000" pitchFamily="2" charset="2"/>
+              </a:rPr>
+              <a:t> - Everything inside JS is an Object.</a:t>
+            </a:r>
+          </a:p>
+          <a:p>
+            <a:pPr marL="12700">
+              <a:spcBef>
+                <a:spcPts val="95"/>
+              </a:spcBef>
+            </a:pPr>
+            <a:endParaRPr lang="en-US" sz="3200" kern="0" dirty="0">
+              <a:latin typeface="Carlito"/>
+              <a:cs typeface="Carlito"/>
+              <a:sym typeface="Wingdings" panose="05000000000000000000" pitchFamily="2" charset="2"/>
+            </a:endParaRPr>
+          </a:p>
+          <a:p>
+            <a:pPr marL="12700">
+              <a:spcBef>
+                <a:spcPts val="95"/>
+              </a:spcBef>
+            </a:pPr>
+            <a:r>
+              <a:rPr lang="en-US" sz="3200" kern="0" dirty="0">
+                <a:latin typeface="Carlito"/>
+                <a:cs typeface="Carlito"/>
+                <a:sym typeface="Wingdings" panose="05000000000000000000" pitchFamily="2" charset="2"/>
+              </a:rPr>
+              <a:t>1.Access content in 1d </a:t>
+            </a:r>
+            <a:r>
+              <a:rPr lang="en-US" sz="3200" kern="0" dirty="0" err="1">
+                <a:latin typeface="Carlito"/>
+                <a:cs typeface="Carlito"/>
+                <a:sym typeface="Wingdings" panose="05000000000000000000" pitchFamily="2" charset="2"/>
+              </a:rPr>
+              <a:t>arr</a:t>
+            </a:r>
+            <a:r>
+              <a:rPr lang="en-US" sz="3200" kern="0" dirty="0">
+                <a:latin typeface="Carlito"/>
+                <a:cs typeface="Carlito"/>
+                <a:sym typeface="Wingdings" panose="05000000000000000000" pitchFamily="2" charset="2"/>
+              </a:rPr>
+              <a:t> : </a:t>
+            </a:r>
+            <a:r>
+              <a:rPr lang="en-US" sz="3200" kern="0" dirty="0" err="1">
+                <a:latin typeface="Carlito"/>
+                <a:cs typeface="Carlito"/>
+                <a:sym typeface="Wingdings" panose="05000000000000000000" pitchFamily="2" charset="2"/>
+              </a:rPr>
+              <a:t>arr</a:t>
+            </a:r>
+            <a:r>
+              <a:rPr lang="en-US" sz="3200" kern="0" dirty="0">
+                <a:latin typeface="Carlito"/>
+                <a:cs typeface="Carlito"/>
+                <a:sym typeface="Wingdings" panose="05000000000000000000" pitchFamily="2" charset="2"/>
+              </a:rPr>
+              <a:t>[</a:t>
+            </a:r>
+            <a:r>
+              <a:rPr lang="en-US" sz="3200" kern="0" dirty="0" err="1">
+                <a:latin typeface="Carlito"/>
+                <a:cs typeface="Carlito"/>
+                <a:sym typeface="Wingdings" panose="05000000000000000000" pitchFamily="2" charset="2"/>
+              </a:rPr>
+              <a:t>i</a:t>
+            </a:r>
+            <a:r>
+              <a:rPr lang="en-US" sz="3200" kern="0" dirty="0">
+                <a:latin typeface="Carlito"/>
+                <a:cs typeface="Carlito"/>
+                <a:sym typeface="Wingdings" panose="05000000000000000000" pitchFamily="2" charset="2"/>
+              </a:rPr>
+              <a:t>];</a:t>
+            </a:r>
+          </a:p>
+          <a:p>
+            <a:pPr marL="12700">
+              <a:spcBef>
+                <a:spcPts val="95"/>
+              </a:spcBef>
+            </a:pPr>
+            <a:r>
+              <a:rPr lang="en-US" sz="3200" kern="0" dirty="0">
+                <a:latin typeface="Carlito"/>
+                <a:cs typeface="Carlito"/>
+                <a:sym typeface="Wingdings" panose="05000000000000000000" pitchFamily="2" charset="2"/>
+              </a:rPr>
+              <a:t>2.Access content in 2d </a:t>
+            </a:r>
+            <a:r>
+              <a:rPr lang="en-US" sz="3200" kern="0" dirty="0" err="1">
+                <a:latin typeface="Carlito"/>
+                <a:cs typeface="Carlito"/>
+                <a:sym typeface="Wingdings" panose="05000000000000000000" pitchFamily="2" charset="2"/>
+              </a:rPr>
+              <a:t>arr</a:t>
+            </a:r>
+            <a:r>
+              <a:rPr lang="en-US" sz="3200" kern="0" dirty="0">
+                <a:latin typeface="Carlito"/>
+                <a:cs typeface="Carlito"/>
+                <a:sym typeface="Wingdings" panose="05000000000000000000" pitchFamily="2" charset="2"/>
+              </a:rPr>
+              <a:t> : </a:t>
+            </a:r>
+            <a:r>
+              <a:rPr lang="en-US" sz="3200" kern="0" dirty="0" err="1">
+                <a:latin typeface="Carlito"/>
+                <a:cs typeface="Carlito"/>
+                <a:sym typeface="Wingdings" panose="05000000000000000000" pitchFamily="2" charset="2"/>
+              </a:rPr>
+              <a:t>arr</a:t>
+            </a:r>
+            <a:r>
+              <a:rPr lang="en-US" sz="3200" kern="0" dirty="0">
+                <a:latin typeface="Carlito"/>
+                <a:cs typeface="Carlito"/>
+                <a:sym typeface="Wingdings" panose="05000000000000000000" pitchFamily="2" charset="2"/>
+              </a:rPr>
+              <a:t>[</a:t>
+            </a:r>
+            <a:r>
+              <a:rPr lang="en-US" sz="3200" kern="0" dirty="0" err="1">
+                <a:latin typeface="Carlito"/>
+                <a:cs typeface="Carlito"/>
+                <a:sym typeface="Wingdings" panose="05000000000000000000" pitchFamily="2" charset="2"/>
+              </a:rPr>
+              <a:t>i</a:t>
+            </a:r>
+            <a:r>
+              <a:rPr lang="en-US" sz="3200" kern="0" dirty="0">
+                <a:latin typeface="Carlito"/>
+                <a:cs typeface="Carlito"/>
+                <a:sym typeface="Wingdings" panose="05000000000000000000" pitchFamily="2" charset="2"/>
+              </a:rPr>
+              <a:t>][j];</a:t>
+            </a:r>
+          </a:p>
+          <a:p>
+            <a:pPr marL="12700">
+              <a:spcBef>
+                <a:spcPts val="95"/>
+              </a:spcBef>
+            </a:pPr>
+            <a:r>
+              <a:rPr lang="en-US" sz="3200" kern="0" dirty="0">
+                <a:latin typeface="Carlito"/>
+                <a:cs typeface="Carlito"/>
+                <a:sym typeface="Wingdings" panose="05000000000000000000" pitchFamily="2" charset="2"/>
+              </a:rPr>
+              <a:t>3.Access content in 3d </a:t>
+            </a:r>
+            <a:r>
+              <a:rPr lang="en-US" sz="3200" kern="0" dirty="0" err="1">
+                <a:latin typeface="Carlito"/>
+                <a:cs typeface="Carlito"/>
+                <a:sym typeface="Wingdings" panose="05000000000000000000" pitchFamily="2" charset="2"/>
+              </a:rPr>
+              <a:t>arr</a:t>
+            </a:r>
+            <a:r>
+              <a:rPr lang="en-US" sz="3200" kern="0" dirty="0">
+                <a:latin typeface="Carlito"/>
+                <a:cs typeface="Carlito"/>
+                <a:sym typeface="Wingdings" panose="05000000000000000000" pitchFamily="2" charset="2"/>
+              </a:rPr>
+              <a:t> : </a:t>
+            </a:r>
+            <a:r>
+              <a:rPr lang="en-US" sz="3200" kern="0" dirty="0" err="1">
+                <a:latin typeface="Carlito"/>
+                <a:cs typeface="Carlito"/>
+                <a:sym typeface="Wingdings" panose="05000000000000000000" pitchFamily="2" charset="2"/>
+              </a:rPr>
+              <a:t>arr</a:t>
+            </a:r>
+            <a:r>
+              <a:rPr lang="en-US" sz="3200" kern="0" dirty="0">
+                <a:latin typeface="Carlito"/>
+                <a:cs typeface="Carlito"/>
+                <a:sym typeface="Wingdings" panose="05000000000000000000" pitchFamily="2" charset="2"/>
+              </a:rPr>
+              <a:t>[</a:t>
+            </a:r>
+            <a:r>
+              <a:rPr lang="en-US" sz="3200" kern="0" dirty="0" err="1">
+                <a:latin typeface="Carlito"/>
+                <a:cs typeface="Carlito"/>
+                <a:sym typeface="Wingdings" panose="05000000000000000000" pitchFamily="2" charset="2"/>
+              </a:rPr>
+              <a:t>i</a:t>
+            </a:r>
+            <a:r>
+              <a:rPr lang="en-US" sz="3200" kern="0" dirty="0">
+                <a:latin typeface="Carlito"/>
+                <a:cs typeface="Carlito"/>
+                <a:sym typeface="Wingdings" panose="05000000000000000000" pitchFamily="2" charset="2"/>
+              </a:rPr>
+              <a:t>][j][k];</a:t>
+            </a:r>
+          </a:p>
+          <a:p>
+            <a:pPr marL="12700">
+              <a:spcBef>
+                <a:spcPts val="95"/>
+              </a:spcBef>
+            </a:pPr>
+            <a:endParaRPr lang="en-US" sz="3200" kern="0" dirty="0">
+              <a:latin typeface="Carlito"/>
+              <a:cs typeface="Carlito"/>
+              <a:sym typeface="Wingdings" panose="05000000000000000000" pitchFamily="2" charset="2"/>
+            </a:endParaRPr>
+          </a:p>
+        </p:txBody>
+      </p:sp>
+      <p:sp>
+        <p:nvSpPr>
+          <p:cNvPr id="7" name="TextBox 6">
+            <a:extLst>
+              <a:ext uri="{FF2B5EF4-FFF2-40B4-BE49-F238E27FC236}">
+                <a16:creationId xmlns:a16="http://schemas.microsoft.com/office/drawing/2014/main" id="{C2428796-F632-00B4-E484-CA738D260150}"/>
+              </a:ext>
+            </a:extLst>
+          </p:cNvPr>
+          <p:cNvSpPr txBox="1"/>
+          <p:nvPr/>
+        </p:nvSpPr>
+        <p:spPr>
+          <a:xfrm>
+            <a:off x="685800" y="4323186"/>
+            <a:ext cx="7086600" cy="707886"/>
+          </a:xfrm>
+          <a:prstGeom prst="rect">
+            <a:avLst/>
+          </a:prstGeom>
+          <a:noFill/>
+        </p:spPr>
+        <p:txBody>
+          <a:bodyPr wrap="square" rtlCol="0">
+            <a:spAutoFit/>
+          </a:bodyPr>
+          <a:lstStyle/>
+          <a:p>
+            <a:endParaRPr lang="en-IN" sz="4000" dirty="0">
+              <a:solidFill>
+                <a:schemeClr val="bg1"/>
+              </a:solidFill>
+            </a:endParaRPr>
+          </a:p>
+        </p:txBody>
+      </p:sp>
+    </p:spTree>
+    <p:extLst>
+      <p:ext uri="{BB962C8B-B14F-4D97-AF65-F5344CB8AC3E}">
+        <p14:creationId xmlns:p14="http://schemas.microsoft.com/office/powerpoint/2010/main" val="1525072264"/>
+      </p:ext>
+    </p:extLst>
+  </p:cSld>
+  <p:clrMapOvr>
+    <a:masterClrMapping/>
+  </p:clrMapOvr>
+</p:sld>
+</file>
+
+<file path=ppt/slides/slide14.xml><?xml version="1.0" encoding="utf-8"?>
+<p:sld xmlns:a="http://schemas.openxmlformats.org/drawingml/2006/main" xmlns:r="http://schemas.openxmlformats.org/officeDocument/2006/relationships" xmlns:p="http://schemas.openxmlformats.org/presentationml/2006/main">
+  <p:cSld>
+    <p:spTree>
+      <p:nvGrpSpPr>
+        <p:cNvPr id="1" name=""/>
+        <p:cNvGrpSpPr/>
+        <p:nvPr/>
+      </p:nvGrpSpPr>
+      <p:grpSpPr>
+        <a:xfrm>
+          <a:off x="0" y="0"/>
+          <a:ext cx="0" cy="0"/>
+          <a:chOff x="0" y="0"/>
+          <a:chExt cx="0" cy="0"/>
+        </a:xfrm>
+      </p:grpSpPr>
+      <p:sp>
+        <p:nvSpPr>
+          <p:cNvPr id="2" name="object 2"/>
+          <p:cNvSpPr/>
+          <p:nvPr/>
+        </p:nvSpPr>
+        <p:spPr>
+          <a:xfrm>
+            <a:off x="1" y="44199"/>
+            <a:ext cx="12191999" cy="7118601"/>
+          </a:xfrm>
+          <a:prstGeom prst="rect">
+            <a:avLst/>
+          </a:prstGeom>
+          <a:blipFill>
+            <a:blip r:embed="rId2" cstate="print"/>
+            <a:stretch>
+              <a:fillRect/>
+            </a:stretch>
+          </a:blipFill>
+        </p:spPr>
+        <p:txBody>
+          <a:bodyPr wrap="square" lIns="0" tIns="0" rIns="0" bIns="0" rtlCol="0"/>
+          <a:lstStyle/>
+          <a:p>
+            <a:endParaRPr b="1" dirty="0">
+              <a:ln w="13462">
+                <a:solidFill>
+                  <a:schemeClr val="bg1"/>
+                </a:solidFill>
+                <a:prstDash val="solid"/>
+              </a:ln>
+              <a:solidFill>
+                <a:schemeClr val="tx1">
+                  <a:lumMod val="85000"/>
+                  <a:lumOff val="15000"/>
+                </a:schemeClr>
+              </a:solidFill>
+              <a:effectLst>
+                <a:outerShdw dist="38100" dir="2700000" algn="bl" rotWithShape="0">
+                  <a:schemeClr val="accent5"/>
+                </a:outerShdw>
+              </a:effectLst>
+            </a:endParaRPr>
+          </a:p>
+        </p:txBody>
+      </p:sp>
+      <p:sp>
+        <p:nvSpPr>
+          <p:cNvPr id="3" name="object 3"/>
+          <p:cNvSpPr txBox="1">
+            <a:spLocks noGrp="1"/>
+          </p:cNvSpPr>
+          <p:nvPr>
+            <p:ph type="title"/>
+          </p:nvPr>
+        </p:nvSpPr>
+        <p:spPr>
+          <a:xfrm>
+            <a:off x="786485" y="457200"/>
+            <a:ext cx="8967115" cy="535403"/>
+          </a:xfrm>
+          <a:prstGeom prst="rect">
+            <a:avLst/>
+          </a:prstGeom>
+        </p:spPr>
+        <p:txBody>
+          <a:bodyPr vert="horz" wrap="square" lIns="0" tIns="12065" rIns="0" bIns="0" rtlCol="0">
+            <a:spAutoFit/>
+          </a:bodyPr>
+          <a:lstStyle/>
+          <a:p>
+            <a:pPr marL="12700">
+              <a:lnSpc>
+                <a:spcPct val="100000"/>
+              </a:lnSpc>
+              <a:spcBef>
+                <a:spcPts val="95"/>
+              </a:spcBef>
+            </a:pPr>
+            <a:r>
+              <a:rPr lang="en-US" sz="3400" dirty="0">
+                <a:latin typeface="Carlito"/>
+                <a:cs typeface="Carlito"/>
+              </a:rPr>
+              <a:t>Array Methods</a:t>
+            </a:r>
+            <a:endParaRPr sz="3400" dirty="0">
+              <a:latin typeface="Carlito"/>
+              <a:cs typeface="Carlito"/>
+            </a:endParaRPr>
+          </a:p>
+        </p:txBody>
+      </p:sp>
+      <p:sp>
+        <p:nvSpPr>
+          <p:cNvPr id="5" name="object 5"/>
+          <p:cNvSpPr/>
+          <p:nvPr/>
+        </p:nvSpPr>
+        <p:spPr>
+          <a:xfrm>
+            <a:off x="9816083" y="262127"/>
+            <a:ext cx="1976627" cy="822960"/>
+          </a:xfrm>
+          <a:prstGeom prst="rect">
+            <a:avLst/>
+          </a:prstGeom>
+          <a:blipFill>
+            <a:blip r:embed="rId3" cstate="print"/>
+            <a:stretch>
+              <a:fillRect/>
+            </a:stretch>
+          </a:blipFill>
+        </p:spPr>
+        <p:txBody>
+          <a:bodyPr wrap="square" lIns="0" tIns="0" rIns="0" bIns="0" rtlCol="0"/>
+          <a:lstStyle/>
+          <a:p>
+            <a:endParaRPr/>
+          </a:p>
+        </p:txBody>
+      </p:sp>
+      <p:sp>
+        <p:nvSpPr>
+          <p:cNvPr id="4" name="object 3">
+            <a:extLst>
+              <a:ext uri="{FF2B5EF4-FFF2-40B4-BE49-F238E27FC236}">
+                <a16:creationId xmlns:a16="http://schemas.microsoft.com/office/drawing/2014/main" id="{1ED9D45B-4B0D-FC76-3A8C-E89F6CD72254}"/>
+              </a:ext>
+            </a:extLst>
+          </p:cNvPr>
+          <p:cNvSpPr txBox="1">
+            <a:spLocks/>
+          </p:cNvSpPr>
+          <p:nvPr/>
+        </p:nvSpPr>
+        <p:spPr>
+          <a:xfrm>
+            <a:off x="685800" y="1143000"/>
+            <a:ext cx="11429999" cy="6062557"/>
+          </a:xfrm>
+          <a:prstGeom prst="rect">
+            <a:avLst/>
+          </a:prstGeom>
+        </p:spPr>
+        <p:txBody>
+          <a:bodyPr vert="horz" wrap="square" lIns="0" tIns="12065" rIns="0" bIns="0" rtlCol="0">
+            <a:spAutoFit/>
+          </a:bodyPr>
+          <a:lstStyle>
+            <a:lvl1pPr>
+              <a:defRPr sz="6000" b="0" i="0">
+                <a:solidFill>
+                  <a:srgbClr val="E7E6E6"/>
+                </a:solidFill>
+                <a:latin typeface="Trebuchet MS"/>
+                <a:ea typeface="+mj-ea"/>
+                <a:cs typeface="Trebuchet MS"/>
+              </a:defRPr>
+            </a:lvl1pPr>
+          </a:lstStyle>
+          <a:p>
+            <a:pPr marL="12700">
+              <a:spcBef>
+                <a:spcPts val="95"/>
+              </a:spcBef>
+            </a:pPr>
+            <a:r>
+              <a:rPr lang="en-US" sz="3200" kern="0" dirty="0">
+                <a:latin typeface="Carlito"/>
+                <a:cs typeface="Carlito"/>
+                <a:sym typeface="Wingdings" panose="05000000000000000000" pitchFamily="2" charset="2"/>
+              </a:rPr>
+              <a:t>1. Destructive : Changes in the original array.</a:t>
+            </a:r>
+          </a:p>
+          <a:p>
+            <a:pPr marL="12700">
+              <a:spcBef>
+                <a:spcPts val="95"/>
+              </a:spcBef>
+            </a:pPr>
+            <a:r>
+              <a:rPr lang="en-US" sz="3200" kern="0" dirty="0">
+                <a:latin typeface="Carlito"/>
+                <a:cs typeface="Carlito"/>
+                <a:sym typeface="Wingdings" panose="05000000000000000000" pitchFamily="2" charset="2"/>
+              </a:rPr>
+              <a:t>2. Non Destructive : No changes in the original array.</a:t>
+            </a:r>
+          </a:p>
+          <a:p>
+            <a:pPr marL="12700">
+              <a:spcBef>
+                <a:spcPts val="95"/>
+              </a:spcBef>
+            </a:pPr>
+            <a:endParaRPr lang="en-US" sz="3200" kern="0" dirty="0">
+              <a:latin typeface="Carlito"/>
+              <a:cs typeface="Carlito"/>
+              <a:sym typeface="Wingdings" panose="05000000000000000000" pitchFamily="2" charset="2"/>
+            </a:endParaRPr>
+          </a:p>
+          <a:p>
+            <a:pPr marL="12700">
+              <a:spcBef>
+                <a:spcPts val="95"/>
+              </a:spcBef>
+            </a:pPr>
+            <a:r>
+              <a:rPr lang="en-US" sz="3200" kern="0" dirty="0">
+                <a:latin typeface="Carlito"/>
+                <a:cs typeface="Carlito"/>
+                <a:sym typeface="Wingdings" panose="05000000000000000000" pitchFamily="2" charset="2"/>
+              </a:rPr>
+              <a:t>Methods:</a:t>
+            </a:r>
+          </a:p>
+          <a:p>
+            <a:pPr marL="527050" indent="-514350">
+              <a:spcBef>
+                <a:spcPts val="95"/>
+              </a:spcBef>
+              <a:buAutoNum type="arabicPeriod"/>
+            </a:pPr>
+            <a:r>
+              <a:rPr lang="en-US" sz="3200" kern="0" dirty="0">
+                <a:latin typeface="Carlito"/>
+                <a:cs typeface="Carlito"/>
+                <a:sym typeface="Wingdings" panose="05000000000000000000" pitchFamily="2" charset="2"/>
+              </a:rPr>
+              <a:t>push(x) -&gt; destructive method (adds at the end), returns </a:t>
+            </a:r>
+            <a:r>
+              <a:rPr lang="en-US" sz="3200" kern="0" dirty="0" err="1">
+                <a:latin typeface="Carlito"/>
+                <a:cs typeface="Carlito"/>
+                <a:sym typeface="Wingdings" panose="05000000000000000000" pitchFamily="2" charset="2"/>
+              </a:rPr>
+              <a:t>len</a:t>
+            </a:r>
+            <a:endParaRPr lang="en-US" sz="3200" kern="0" dirty="0">
+              <a:latin typeface="Carlito"/>
+              <a:cs typeface="Carlito"/>
+              <a:sym typeface="Wingdings" panose="05000000000000000000" pitchFamily="2" charset="2"/>
+            </a:endParaRPr>
+          </a:p>
+          <a:p>
+            <a:pPr marL="527050" indent="-514350">
+              <a:spcBef>
+                <a:spcPts val="95"/>
+              </a:spcBef>
+              <a:buFontTx/>
+              <a:buAutoNum type="arabicPeriod"/>
+            </a:pPr>
+            <a:r>
+              <a:rPr lang="en-US" sz="3200" kern="0" dirty="0">
+                <a:latin typeface="Carlito"/>
+                <a:cs typeface="Carlito"/>
+                <a:sym typeface="Wingdings" panose="05000000000000000000" pitchFamily="2" charset="2"/>
+              </a:rPr>
+              <a:t>pop() -&gt; destructive method (remove from the end), returns </a:t>
+            </a:r>
+            <a:r>
+              <a:rPr lang="en-US" sz="3200" kern="0" dirty="0" err="1">
+                <a:latin typeface="Carlito"/>
+                <a:cs typeface="Carlito"/>
+                <a:sym typeface="Wingdings" panose="05000000000000000000" pitchFamily="2" charset="2"/>
+              </a:rPr>
+              <a:t>ele</a:t>
+            </a:r>
+            <a:endParaRPr lang="en-US" sz="3200" kern="0" dirty="0">
+              <a:latin typeface="Carlito"/>
+              <a:cs typeface="Carlito"/>
+              <a:sym typeface="Wingdings" panose="05000000000000000000" pitchFamily="2" charset="2"/>
+            </a:endParaRPr>
+          </a:p>
+          <a:p>
+            <a:pPr marL="527050" indent="-514350">
+              <a:spcBef>
+                <a:spcPts val="95"/>
+              </a:spcBef>
+              <a:buFontTx/>
+              <a:buAutoNum type="arabicPeriod"/>
+            </a:pPr>
+            <a:r>
+              <a:rPr lang="en-US" sz="3200" kern="0" dirty="0">
+                <a:latin typeface="Carlito"/>
+                <a:cs typeface="Carlito"/>
+                <a:sym typeface="Wingdings" panose="05000000000000000000" pitchFamily="2" charset="2"/>
+              </a:rPr>
+              <a:t>unshift(x) -&gt; destructive method (adds at the start), returns </a:t>
+            </a:r>
+            <a:r>
+              <a:rPr lang="en-US" sz="3200" kern="0" dirty="0" err="1">
+                <a:latin typeface="Carlito"/>
+                <a:cs typeface="Carlito"/>
+                <a:sym typeface="Wingdings" panose="05000000000000000000" pitchFamily="2" charset="2"/>
+              </a:rPr>
+              <a:t>len</a:t>
+            </a:r>
+            <a:endParaRPr lang="en-US" sz="3200" kern="0" dirty="0">
+              <a:latin typeface="Carlito"/>
+              <a:cs typeface="Carlito"/>
+              <a:sym typeface="Wingdings" panose="05000000000000000000" pitchFamily="2" charset="2"/>
+            </a:endParaRPr>
+          </a:p>
+          <a:p>
+            <a:pPr marL="527050" indent="-514350">
+              <a:spcBef>
+                <a:spcPts val="95"/>
+              </a:spcBef>
+              <a:buFontTx/>
+              <a:buAutoNum type="arabicPeriod"/>
+            </a:pPr>
+            <a:r>
+              <a:rPr lang="en-US" sz="3200" kern="0" dirty="0">
+                <a:latin typeface="Carlito"/>
+                <a:cs typeface="Carlito"/>
+                <a:sym typeface="Wingdings" panose="05000000000000000000" pitchFamily="2" charset="2"/>
+              </a:rPr>
+              <a:t>shift() -&gt; destructive method (remove from the start), returns </a:t>
+            </a:r>
+            <a:r>
+              <a:rPr lang="en-US" sz="3200" kern="0" dirty="0" err="1">
+                <a:latin typeface="Carlito"/>
+                <a:cs typeface="Carlito"/>
+                <a:sym typeface="Wingdings" panose="05000000000000000000" pitchFamily="2" charset="2"/>
+              </a:rPr>
+              <a:t>ele</a:t>
+            </a:r>
+            <a:endParaRPr lang="en-US" sz="3200" kern="0" dirty="0">
+              <a:latin typeface="Carlito"/>
+              <a:cs typeface="Carlito"/>
+              <a:sym typeface="Wingdings" panose="05000000000000000000" pitchFamily="2" charset="2"/>
+            </a:endParaRPr>
+          </a:p>
+          <a:p>
+            <a:pPr marL="12700">
+              <a:spcBef>
+                <a:spcPts val="95"/>
+              </a:spcBef>
+            </a:pPr>
+            <a:endParaRPr lang="en-US" sz="3200" kern="0" dirty="0">
+              <a:latin typeface="Carlito"/>
+              <a:cs typeface="Carlito"/>
+              <a:sym typeface="Wingdings" panose="05000000000000000000" pitchFamily="2" charset="2"/>
+            </a:endParaRPr>
+          </a:p>
+          <a:p>
+            <a:pPr marL="12700">
+              <a:spcBef>
+                <a:spcPts val="95"/>
+              </a:spcBef>
+            </a:pPr>
+            <a:r>
+              <a:rPr lang="en-US" sz="3200" kern="0" dirty="0">
+                <a:latin typeface="Carlito"/>
+                <a:cs typeface="Carlito"/>
+                <a:sym typeface="Wingdings" panose="05000000000000000000" pitchFamily="2" charset="2"/>
+              </a:rPr>
+              <a:t>5. slice(</a:t>
+            </a:r>
+            <a:r>
+              <a:rPr lang="en-US" sz="3200" kern="0" dirty="0" err="1">
+                <a:latin typeface="Carlito"/>
+                <a:cs typeface="Carlito"/>
+                <a:sym typeface="Wingdings" panose="05000000000000000000" pitchFamily="2" charset="2"/>
+              </a:rPr>
+              <a:t>x,y</a:t>
+            </a:r>
+            <a:r>
+              <a:rPr lang="en-US" sz="3200" kern="0" dirty="0">
+                <a:latin typeface="Carlito"/>
+                <a:cs typeface="Carlito"/>
+                <a:sym typeface="Wingdings" panose="05000000000000000000" pitchFamily="2" charset="2"/>
+              </a:rPr>
+              <a:t>) -&gt; returns array = [</a:t>
+            </a:r>
+            <a:r>
+              <a:rPr lang="en-US" sz="3200" kern="0" dirty="0" err="1">
+                <a:latin typeface="Carlito"/>
+                <a:cs typeface="Carlito"/>
+                <a:sym typeface="Wingdings" panose="05000000000000000000" pitchFamily="2" charset="2"/>
+              </a:rPr>
+              <a:t>x,y</a:t>
+            </a:r>
+            <a:r>
+              <a:rPr lang="en-US" sz="3200" kern="0" dirty="0">
+                <a:latin typeface="Carlito"/>
+                <a:cs typeface="Carlito"/>
+                <a:sym typeface="Wingdings" panose="05000000000000000000" pitchFamily="2" charset="2"/>
+              </a:rPr>
+              <a:t>) , (like substring for </a:t>
+            </a:r>
+            <a:r>
+              <a:rPr lang="en-US" sz="3200" kern="0" dirty="0" err="1">
+                <a:latin typeface="Carlito"/>
+                <a:cs typeface="Carlito"/>
+                <a:sym typeface="Wingdings" panose="05000000000000000000" pitchFamily="2" charset="2"/>
+              </a:rPr>
+              <a:t>arr</a:t>
+            </a:r>
+            <a:r>
+              <a:rPr lang="en-US" sz="3200" kern="0" dirty="0">
+                <a:latin typeface="Carlito"/>
+                <a:cs typeface="Carlito"/>
+                <a:sym typeface="Wingdings" panose="05000000000000000000" pitchFamily="2" charset="2"/>
+              </a:rPr>
+              <a:t> , Non-</a:t>
+            </a:r>
+            <a:r>
+              <a:rPr lang="en-US" sz="3200" kern="0" dirty="0" err="1">
+                <a:latin typeface="Carlito"/>
+                <a:cs typeface="Carlito"/>
+                <a:sym typeface="Wingdings" panose="05000000000000000000" pitchFamily="2" charset="2"/>
+              </a:rPr>
+              <a:t>dest</a:t>
+            </a:r>
+            <a:r>
+              <a:rPr lang="en-US" sz="3200" kern="0" dirty="0">
+                <a:latin typeface="Carlito"/>
+                <a:cs typeface="Carlito"/>
+                <a:sym typeface="Wingdings" panose="05000000000000000000" pitchFamily="2" charset="2"/>
+              </a:rPr>
+              <a:t>)</a:t>
+            </a:r>
+          </a:p>
+          <a:p>
+            <a:pPr marL="12700">
+              <a:spcBef>
+                <a:spcPts val="95"/>
+              </a:spcBef>
+            </a:pPr>
+            <a:r>
+              <a:rPr lang="en-US" sz="3200" kern="0" dirty="0">
+                <a:latin typeface="Carlito"/>
+                <a:cs typeface="Carlito"/>
+                <a:sym typeface="Wingdings" panose="05000000000000000000" pitchFamily="2" charset="2"/>
+              </a:rPr>
+              <a:t>6. splice(</a:t>
+            </a:r>
+            <a:r>
+              <a:rPr lang="en-US" sz="3200" kern="0" dirty="0" err="1">
+                <a:latin typeface="Carlito"/>
+                <a:cs typeface="Carlito"/>
+                <a:sym typeface="Wingdings" panose="05000000000000000000" pitchFamily="2" charset="2"/>
+              </a:rPr>
+              <a:t>x,y</a:t>
+            </a:r>
+            <a:r>
+              <a:rPr lang="en-US" sz="3200" kern="0" dirty="0">
+                <a:latin typeface="Carlito"/>
+                <a:cs typeface="Carlito"/>
+                <a:sym typeface="Wingdings" panose="05000000000000000000" pitchFamily="2" charset="2"/>
+              </a:rPr>
+              <a:t>) -&gt; return array = [x],y is size (</a:t>
+            </a:r>
+            <a:r>
+              <a:rPr lang="en-US" sz="3200" kern="0" dirty="0" err="1">
+                <a:latin typeface="Carlito"/>
+                <a:cs typeface="Carlito"/>
+                <a:sym typeface="Wingdings" panose="05000000000000000000" pitchFamily="2" charset="2"/>
+              </a:rPr>
+              <a:t>dest</a:t>
+            </a:r>
+            <a:r>
+              <a:rPr lang="en-US" sz="3200" kern="0" dirty="0">
+                <a:latin typeface="Carlito"/>
+                <a:cs typeface="Carlito"/>
+                <a:sym typeface="Wingdings" panose="05000000000000000000" pitchFamily="2" charset="2"/>
+              </a:rPr>
+              <a:t> method)</a:t>
+            </a:r>
+          </a:p>
+          <a:p>
+            <a:pPr marL="12700">
+              <a:spcBef>
+                <a:spcPts val="95"/>
+              </a:spcBef>
+            </a:pPr>
+            <a:r>
+              <a:rPr lang="en-US" sz="3200" kern="0" dirty="0">
+                <a:latin typeface="Carlito"/>
+                <a:cs typeface="Carlito"/>
+                <a:sym typeface="Wingdings" panose="05000000000000000000" pitchFamily="2" charset="2"/>
+              </a:rPr>
+              <a:t>e.g. splice(2,3,’a’,’b’) -&gt; will add ‘a’ and ‘b’ after 2</a:t>
+            </a:r>
+            <a:r>
+              <a:rPr lang="en-US" sz="3200" kern="0" baseline="30000" dirty="0">
+                <a:latin typeface="Carlito"/>
+                <a:cs typeface="Carlito"/>
+                <a:sym typeface="Wingdings" panose="05000000000000000000" pitchFamily="2" charset="2"/>
+              </a:rPr>
+              <a:t>nd</a:t>
+            </a:r>
+            <a:r>
+              <a:rPr lang="en-US" sz="3200" kern="0" dirty="0">
+                <a:latin typeface="Carlito"/>
+                <a:cs typeface="Carlito"/>
+                <a:sym typeface="Wingdings" panose="05000000000000000000" pitchFamily="2" charset="2"/>
+              </a:rPr>
+              <a:t> index.</a:t>
+            </a:r>
+          </a:p>
+        </p:txBody>
+      </p:sp>
+      <p:sp>
+        <p:nvSpPr>
+          <p:cNvPr id="7" name="TextBox 6">
+            <a:extLst>
+              <a:ext uri="{FF2B5EF4-FFF2-40B4-BE49-F238E27FC236}">
+                <a16:creationId xmlns:a16="http://schemas.microsoft.com/office/drawing/2014/main" id="{C2428796-F632-00B4-E484-CA738D260150}"/>
+              </a:ext>
+            </a:extLst>
+          </p:cNvPr>
+          <p:cNvSpPr txBox="1"/>
+          <p:nvPr/>
+        </p:nvSpPr>
+        <p:spPr>
+          <a:xfrm>
+            <a:off x="685800" y="4323186"/>
+            <a:ext cx="7086600" cy="707886"/>
+          </a:xfrm>
+          <a:prstGeom prst="rect">
+            <a:avLst/>
+          </a:prstGeom>
+          <a:noFill/>
+        </p:spPr>
+        <p:txBody>
+          <a:bodyPr wrap="square" rtlCol="0">
+            <a:spAutoFit/>
+          </a:bodyPr>
+          <a:lstStyle/>
+          <a:p>
+            <a:endParaRPr lang="en-IN" sz="4000" dirty="0">
+              <a:solidFill>
+                <a:schemeClr val="bg1"/>
+              </a:solidFill>
+            </a:endParaRPr>
+          </a:p>
+        </p:txBody>
+      </p:sp>
+    </p:spTree>
+    <p:extLst>
+      <p:ext uri="{BB962C8B-B14F-4D97-AF65-F5344CB8AC3E}">
+        <p14:creationId xmlns:p14="http://schemas.microsoft.com/office/powerpoint/2010/main" val="2507947358"/>
+      </p:ext>
+    </p:extLst>
+  </p:cSld>
+  <p:clrMapOvr>
+    <a:masterClrMapping/>
+  </p:clrMapOvr>
+</p:sld>
+</file>
+
+<file path=ppt/slides/slide15.xml><?xml version="1.0" encoding="utf-8"?>
+<p:sld xmlns:a="http://schemas.openxmlformats.org/drawingml/2006/main" xmlns:r="http://schemas.openxmlformats.org/officeDocument/2006/relationships" xmlns:p="http://schemas.openxmlformats.org/presentationml/2006/main">
+  <p:cSld>
+    <p:spTree>
+      <p:nvGrpSpPr>
+        <p:cNvPr id="1" name=""/>
+        <p:cNvGrpSpPr/>
+        <p:nvPr/>
+      </p:nvGrpSpPr>
+      <p:grpSpPr>
+        <a:xfrm>
+          <a:off x="0" y="0"/>
+          <a:ext cx="0" cy="0"/>
+          <a:chOff x="0" y="0"/>
+          <a:chExt cx="0" cy="0"/>
+        </a:xfrm>
+      </p:grpSpPr>
+      <p:sp>
+        <p:nvSpPr>
+          <p:cNvPr id="2" name="object 2"/>
+          <p:cNvSpPr/>
+          <p:nvPr/>
+        </p:nvSpPr>
+        <p:spPr>
+          <a:xfrm>
+            <a:off x="1" y="44199"/>
+            <a:ext cx="12191999" cy="7118601"/>
+          </a:xfrm>
+          <a:prstGeom prst="rect">
+            <a:avLst/>
+          </a:prstGeom>
+          <a:blipFill>
+            <a:blip r:embed="rId2" cstate="print"/>
+            <a:stretch>
+              <a:fillRect/>
+            </a:stretch>
+          </a:blipFill>
+        </p:spPr>
+        <p:txBody>
+          <a:bodyPr wrap="square" lIns="0" tIns="0" rIns="0" bIns="0" rtlCol="0"/>
+          <a:lstStyle/>
+          <a:p>
+            <a:endParaRPr b="1" dirty="0">
+              <a:ln w="13462">
+                <a:solidFill>
+                  <a:schemeClr val="bg1"/>
+                </a:solidFill>
+                <a:prstDash val="solid"/>
+              </a:ln>
+              <a:solidFill>
+                <a:schemeClr val="tx1">
+                  <a:lumMod val="85000"/>
+                  <a:lumOff val="15000"/>
+                </a:schemeClr>
+              </a:solidFill>
+              <a:effectLst>
+                <a:outerShdw dist="38100" dir="2700000" algn="bl" rotWithShape="0">
+                  <a:schemeClr val="accent5"/>
+                </a:outerShdw>
+              </a:effectLst>
+            </a:endParaRPr>
+          </a:p>
+        </p:txBody>
+      </p:sp>
+      <p:sp>
+        <p:nvSpPr>
+          <p:cNvPr id="3" name="object 3"/>
+          <p:cNvSpPr txBox="1">
+            <a:spLocks noGrp="1"/>
+          </p:cNvSpPr>
+          <p:nvPr>
+            <p:ph type="title"/>
+          </p:nvPr>
+        </p:nvSpPr>
+        <p:spPr>
+          <a:xfrm>
+            <a:off x="786485" y="457200"/>
+            <a:ext cx="8967115" cy="535403"/>
+          </a:xfrm>
+          <a:prstGeom prst="rect">
+            <a:avLst/>
+          </a:prstGeom>
+        </p:spPr>
+        <p:txBody>
+          <a:bodyPr vert="horz" wrap="square" lIns="0" tIns="12065" rIns="0" bIns="0" rtlCol="0">
+            <a:spAutoFit/>
+          </a:bodyPr>
+          <a:lstStyle/>
+          <a:p>
+            <a:pPr marL="12700">
+              <a:lnSpc>
+                <a:spcPct val="100000"/>
+              </a:lnSpc>
+              <a:spcBef>
+                <a:spcPts val="95"/>
+              </a:spcBef>
+            </a:pPr>
+            <a:r>
+              <a:rPr lang="en-US" sz="3400" dirty="0">
+                <a:latin typeface="Carlito"/>
+                <a:cs typeface="Carlito"/>
+              </a:rPr>
+              <a:t>Array Methods</a:t>
+            </a:r>
+            <a:endParaRPr sz="3400" dirty="0">
+              <a:latin typeface="Carlito"/>
+              <a:cs typeface="Carlito"/>
+            </a:endParaRPr>
+          </a:p>
+        </p:txBody>
+      </p:sp>
+      <p:sp>
+        <p:nvSpPr>
+          <p:cNvPr id="5" name="object 5"/>
+          <p:cNvSpPr/>
+          <p:nvPr/>
+        </p:nvSpPr>
+        <p:spPr>
+          <a:xfrm>
+            <a:off x="9816083" y="262127"/>
+            <a:ext cx="1976627" cy="822960"/>
+          </a:xfrm>
+          <a:prstGeom prst="rect">
+            <a:avLst/>
+          </a:prstGeom>
+          <a:blipFill>
+            <a:blip r:embed="rId3" cstate="print"/>
+            <a:stretch>
+              <a:fillRect/>
+            </a:stretch>
+          </a:blipFill>
+        </p:spPr>
+        <p:txBody>
+          <a:bodyPr wrap="square" lIns="0" tIns="0" rIns="0" bIns="0" rtlCol="0"/>
+          <a:lstStyle/>
+          <a:p>
+            <a:endParaRPr/>
+          </a:p>
+        </p:txBody>
+      </p:sp>
+      <p:sp>
+        <p:nvSpPr>
+          <p:cNvPr id="4" name="object 3">
+            <a:extLst>
+              <a:ext uri="{FF2B5EF4-FFF2-40B4-BE49-F238E27FC236}">
+                <a16:creationId xmlns:a16="http://schemas.microsoft.com/office/drawing/2014/main" id="{1ED9D45B-4B0D-FC76-3A8C-E89F6CD72254}"/>
+              </a:ext>
+            </a:extLst>
+          </p:cNvPr>
+          <p:cNvSpPr txBox="1">
+            <a:spLocks/>
+          </p:cNvSpPr>
+          <p:nvPr/>
+        </p:nvSpPr>
+        <p:spPr>
+          <a:xfrm>
+            <a:off x="685800" y="1143000"/>
+            <a:ext cx="11429999" cy="5544467"/>
+          </a:xfrm>
+          <a:prstGeom prst="rect">
+            <a:avLst/>
+          </a:prstGeom>
+        </p:spPr>
+        <p:txBody>
+          <a:bodyPr vert="horz" wrap="square" lIns="0" tIns="12065" rIns="0" bIns="0" rtlCol="0">
+            <a:spAutoFit/>
+          </a:bodyPr>
+          <a:lstStyle>
+            <a:lvl1pPr>
+              <a:defRPr sz="6000" b="0" i="0">
+                <a:solidFill>
+                  <a:srgbClr val="E7E6E6"/>
+                </a:solidFill>
+                <a:latin typeface="Trebuchet MS"/>
+                <a:ea typeface="+mj-ea"/>
+                <a:cs typeface="Trebuchet MS"/>
+              </a:defRPr>
+            </a:lvl1pPr>
+          </a:lstStyle>
+          <a:p>
+            <a:pPr marL="12700">
+              <a:spcBef>
+                <a:spcPts val="95"/>
+              </a:spcBef>
+            </a:pPr>
+            <a:r>
+              <a:rPr lang="en-US" sz="3200" kern="0" dirty="0">
+                <a:latin typeface="Carlito"/>
+                <a:cs typeface="Carlito"/>
+                <a:sym typeface="Wingdings" panose="05000000000000000000" pitchFamily="2" charset="2"/>
+              </a:rPr>
+              <a:t>7. split(‘/’) : String’s method splits at ‘/’ , returns array. (Non - </a:t>
+            </a:r>
+            <a:r>
+              <a:rPr lang="en-US" sz="3200" kern="0" dirty="0" err="1">
+                <a:latin typeface="Carlito"/>
+                <a:cs typeface="Carlito"/>
+                <a:sym typeface="Wingdings" panose="05000000000000000000" pitchFamily="2" charset="2"/>
+              </a:rPr>
+              <a:t>dest</a:t>
+            </a:r>
+            <a:r>
+              <a:rPr lang="en-US" sz="3200" kern="0" dirty="0">
+                <a:latin typeface="Carlito"/>
+                <a:cs typeface="Carlito"/>
+                <a:sym typeface="Wingdings" panose="05000000000000000000" pitchFamily="2" charset="2"/>
+              </a:rPr>
+              <a:t>)</a:t>
+            </a:r>
+          </a:p>
+          <a:p>
+            <a:pPr marL="12700">
+              <a:spcBef>
+                <a:spcPts val="95"/>
+              </a:spcBef>
+            </a:pPr>
+            <a:r>
+              <a:rPr lang="en-US" sz="3200" kern="0" dirty="0">
+                <a:latin typeface="Carlito"/>
+                <a:cs typeface="Carlito"/>
+                <a:sym typeface="Wingdings" panose="05000000000000000000" pitchFamily="2" charset="2"/>
+              </a:rPr>
+              <a:t>join(‘/’) : joins the array to a String. </a:t>
+            </a:r>
+          </a:p>
+          <a:p>
+            <a:pPr marL="12700">
+              <a:spcBef>
+                <a:spcPts val="95"/>
+              </a:spcBef>
+            </a:pPr>
+            <a:endParaRPr lang="en-US" sz="3200" kern="0" dirty="0">
+              <a:latin typeface="Carlito"/>
+              <a:cs typeface="Carlito"/>
+              <a:sym typeface="Wingdings" panose="05000000000000000000" pitchFamily="2" charset="2"/>
+            </a:endParaRPr>
+          </a:p>
+          <a:p>
+            <a:pPr marL="12700">
+              <a:spcBef>
+                <a:spcPts val="95"/>
+              </a:spcBef>
+            </a:pPr>
+            <a:r>
+              <a:rPr lang="en-US" sz="3200" kern="0" dirty="0">
+                <a:latin typeface="Carlito"/>
+                <a:cs typeface="Carlito"/>
+                <a:sym typeface="Wingdings" panose="05000000000000000000" pitchFamily="2" charset="2"/>
+              </a:rPr>
+              <a:t>8. </a:t>
+            </a:r>
+            <a:r>
+              <a:rPr lang="en-US" sz="3200" kern="0" dirty="0" err="1">
+                <a:latin typeface="Carlito"/>
+                <a:cs typeface="Carlito"/>
+                <a:sym typeface="Wingdings" panose="05000000000000000000" pitchFamily="2" charset="2"/>
+              </a:rPr>
+              <a:t>concat</a:t>
+            </a:r>
+            <a:r>
+              <a:rPr lang="en-US" sz="3200" kern="0" dirty="0">
+                <a:latin typeface="Carlito"/>
+                <a:cs typeface="Carlito"/>
+                <a:sym typeface="Wingdings" panose="05000000000000000000" pitchFamily="2" charset="2"/>
+              </a:rPr>
+              <a:t>: Joins 2 arrays and strings both. </a:t>
+            </a:r>
+          </a:p>
+          <a:p>
+            <a:pPr marL="12700">
+              <a:spcBef>
+                <a:spcPts val="95"/>
+              </a:spcBef>
+            </a:pPr>
+            <a:r>
+              <a:rPr lang="en-US" sz="3200" kern="0" dirty="0">
+                <a:latin typeface="Carlito"/>
+                <a:cs typeface="Carlito"/>
+                <a:sym typeface="Wingdings" panose="05000000000000000000" pitchFamily="2" charset="2"/>
+              </a:rPr>
+              <a:t>e.g. arr1.concat(arr2); (Non - </a:t>
+            </a:r>
+            <a:r>
+              <a:rPr lang="en-US" sz="3200" kern="0" dirty="0" err="1">
+                <a:latin typeface="Carlito"/>
+                <a:cs typeface="Carlito"/>
+                <a:sym typeface="Wingdings" panose="05000000000000000000" pitchFamily="2" charset="2"/>
+              </a:rPr>
+              <a:t>dest</a:t>
+            </a:r>
+            <a:r>
+              <a:rPr lang="en-US" sz="3200" kern="0" dirty="0">
+                <a:latin typeface="Carlito"/>
+                <a:cs typeface="Carlito"/>
+                <a:sym typeface="Wingdings" panose="05000000000000000000" pitchFamily="2" charset="2"/>
+              </a:rPr>
+              <a:t>)</a:t>
+            </a:r>
+          </a:p>
+          <a:p>
+            <a:pPr marL="12700">
+              <a:spcBef>
+                <a:spcPts val="95"/>
+              </a:spcBef>
+            </a:pPr>
+            <a:r>
+              <a:rPr lang="en-US" sz="3200" kern="0" dirty="0">
+                <a:latin typeface="Carlito"/>
+                <a:cs typeface="Carlito"/>
+                <a:sym typeface="Wingdings" panose="05000000000000000000" pitchFamily="2" charset="2"/>
+              </a:rPr>
+              <a:t>9. includes(‘x’) : returns Boolean value.</a:t>
+            </a:r>
+          </a:p>
+          <a:p>
+            <a:pPr marL="12700">
+              <a:spcBef>
+                <a:spcPts val="95"/>
+              </a:spcBef>
+            </a:pPr>
+            <a:r>
+              <a:rPr lang="en-US" sz="3200" kern="0" dirty="0">
+                <a:latin typeface="Carlito"/>
+                <a:cs typeface="Carlito"/>
+                <a:sym typeface="Wingdings" panose="05000000000000000000" pitchFamily="2" charset="2"/>
+              </a:rPr>
+              <a:t>10. </a:t>
+            </a:r>
+            <a:r>
+              <a:rPr lang="en-US" sz="3200" kern="0" dirty="0" err="1">
+                <a:latin typeface="Carlito"/>
+                <a:cs typeface="Carlito"/>
+                <a:sym typeface="Wingdings" panose="05000000000000000000" pitchFamily="2" charset="2"/>
+              </a:rPr>
+              <a:t>indexOf</a:t>
+            </a:r>
+            <a:r>
+              <a:rPr lang="en-US" sz="3200" kern="0" dirty="0">
+                <a:latin typeface="Carlito"/>
+                <a:cs typeface="Carlito"/>
+                <a:sym typeface="Wingdings" panose="05000000000000000000" pitchFamily="2" charset="2"/>
+              </a:rPr>
+              <a:t>(‘x’): </a:t>
+            </a:r>
+            <a:r>
+              <a:rPr lang="en-US" sz="3200" kern="0" dirty="0" err="1">
+                <a:latin typeface="Carlito"/>
+                <a:cs typeface="Carlito"/>
+                <a:sym typeface="Wingdings" panose="05000000000000000000" pitchFamily="2" charset="2"/>
+              </a:rPr>
+              <a:t>retuns</a:t>
+            </a:r>
+            <a:r>
+              <a:rPr lang="en-US" sz="3200" kern="0" dirty="0">
+                <a:latin typeface="Carlito"/>
+                <a:cs typeface="Carlito"/>
+                <a:sym typeface="Wingdings" panose="05000000000000000000" pitchFamily="2" charset="2"/>
+              </a:rPr>
+              <a:t> -1(if not present) or integer.</a:t>
+            </a:r>
+          </a:p>
+          <a:p>
+            <a:pPr marL="12700">
+              <a:spcBef>
+                <a:spcPts val="95"/>
+              </a:spcBef>
+            </a:pPr>
+            <a:r>
+              <a:rPr lang="en-US" sz="3200" kern="0" dirty="0">
+                <a:latin typeface="Carlito"/>
+                <a:cs typeface="Carlito"/>
+                <a:sym typeface="Wingdings" panose="05000000000000000000" pitchFamily="2" charset="2"/>
+              </a:rPr>
+              <a:t>11. reverse() : reverse the array  . (</a:t>
+            </a:r>
+            <a:r>
+              <a:rPr lang="en-US" sz="3200" kern="0" dirty="0" err="1">
+                <a:latin typeface="Carlito"/>
+                <a:cs typeface="Carlito"/>
+                <a:sym typeface="Wingdings" panose="05000000000000000000" pitchFamily="2" charset="2"/>
+              </a:rPr>
+              <a:t>dest</a:t>
+            </a:r>
+            <a:r>
+              <a:rPr lang="en-US" sz="3200" kern="0" dirty="0">
+                <a:latin typeface="Carlito"/>
+                <a:cs typeface="Carlito"/>
+                <a:sym typeface="Wingdings" panose="05000000000000000000" pitchFamily="2" charset="2"/>
+              </a:rPr>
+              <a:t> method)</a:t>
+            </a:r>
+          </a:p>
+          <a:p>
+            <a:pPr marL="12700">
+              <a:spcBef>
+                <a:spcPts val="95"/>
+              </a:spcBef>
+            </a:pPr>
+            <a:endParaRPr lang="en-US" sz="3200" kern="0" dirty="0">
+              <a:latin typeface="Carlito"/>
+              <a:cs typeface="Carlito"/>
+              <a:sym typeface="Wingdings" panose="05000000000000000000" pitchFamily="2" charset="2"/>
+            </a:endParaRPr>
+          </a:p>
+          <a:p>
+            <a:pPr marL="12700">
+              <a:spcBef>
+                <a:spcPts val="95"/>
+              </a:spcBef>
+            </a:pPr>
+            <a:r>
+              <a:rPr lang="en-US" sz="3200" kern="0" dirty="0">
+                <a:latin typeface="Carlito"/>
+                <a:cs typeface="Carlito"/>
+                <a:sym typeface="Wingdings" panose="05000000000000000000" pitchFamily="2" charset="2"/>
+              </a:rPr>
+              <a:t>Note: Arrays are reference type , i.e. change in one array is reflected in another array.</a:t>
+            </a:r>
+          </a:p>
+        </p:txBody>
+      </p:sp>
+      <p:sp>
+        <p:nvSpPr>
+          <p:cNvPr id="7" name="TextBox 6">
+            <a:extLst>
+              <a:ext uri="{FF2B5EF4-FFF2-40B4-BE49-F238E27FC236}">
+                <a16:creationId xmlns:a16="http://schemas.microsoft.com/office/drawing/2014/main" id="{C2428796-F632-00B4-E484-CA738D260150}"/>
+              </a:ext>
+            </a:extLst>
+          </p:cNvPr>
+          <p:cNvSpPr txBox="1"/>
+          <p:nvPr/>
+        </p:nvSpPr>
+        <p:spPr>
+          <a:xfrm>
+            <a:off x="685800" y="4323186"/>
+            <a:ext cx="7086600" cy="707886"/>
+          </a:xfrm>
+          <a:prstGeom prst="rect">
+            <a:avLst/>
+          </a:prstGeom>
+          <a:noFill/>
+        </p:spPr>
+        <p:txBody>
+          <a:bodyPr wrap="square" rtlCol="0">
+            <a:spAutoFit/>
+          </a:bodyPr>
+          <a:lstStyle/>
+          <a:p>
+            <a:endParaRPr lang="en-IN" sz="4000" dirty="0">
+              <a:solidFill>
+                <a:schemeClr val="bg1"/>
+              </a:solidFill>
+            </a:endParaRPr>
+          </a:p>
+        </p:txBody>
+      </p:sp>
+    </p:spTree>
+    <p:extLst>
+      <p:ext uri="{BB962C8B-B14F-4D97-AF65-F5344CB8AC3E}">
+        <p14:creationId xmlns:p14="http://schemas.microsoft.com/office/powerpoint/2010/main" val="1422137065"/>
       </p:ext>
     </p:extLst>
   </p:cSld>
@@ -4093,6 +6985,1097 @@
     <p:extLst>
       <p:ext uri="{BB962C8B-B14F-4D97-AF65-F5344CB8AC3E}">
         <p14:creationId xmlns:p14="http://schemas.microsoft.com/office/powerpoint/2010/main" val="1364500409"/>
+      </p:ext>
+    </p:extLst>
+  </p:cSld>
+  <p:clrMapOvr>
+    <a:masterClrMapping/>
+  </p:clrMapOvr>
+</p:sld>
+</file>
+
+<file path=ppt/slides/slide8.xml><?xml version="1.0" encoding="utf-8"?>
+<p:sld xmlns:a="http://schemas.openxmlformats.org/drawingml/2006/main" xmlns:r="http://schemas.openxmlformats.org/officeDocument/2006/relationships" xmlns:p="http://schemas.openxmlformats.org/presentationml/2006/main">
+  <p:cSld>
+    <p:spTree>
+      <p:nvGrpSpPr>
+        <p:cNvPr id="1" name=""/>
+        <p:cNvGrpSpPr/>
+        <p:nvPr/>
+      </p:nvGrpSpPr>
+      <p:grpSpPr>
+        <a:xfrm>
+          <a:off x="0" y="0"/>
+          <a:ext cx="0" cy="0"/>
+          <a:chOff x="0" y="0"/>
+          <a:chExt cx="0" cy="0"/>
+        </a:xfrm>
+      </p:grpSpPr>
+      <p:sp>
+        <p:nvSpPr>
+          <p:cNvPr id="2" name="object 2"/>
+          <p:cNvSpPr/>
+          <p:nvPr/>
+        </p:nvSpPr>
+        <p:spPr>
+          <a:xfrm>
+            <a:off x="1" y="44199"/>
+            <a:ext cx="12191999" cy="7118601"/>
+          </a:xfrm>
+          <a:prstGeom prst="rect">
+            <a:avLst/>
+          </a:prstGeom>
+          <a:blipFill>
+            <a:blip r:embed="rId2" cstate="print"/>
+            <a:stretch>
+              <a:fillRect/>
+            </a:stretch>
+          </a:blipFill>
+        </p:spPr>
+        <p:txBody>
+          <a:bodyPr wrap="square" lIns="0" tIns="0" rIns="0" bIns="0" rtlCol="0"/>
+          <a:lstStyle/>
+          <a:p>
+            <a:endParaRPr b="1" dirty="0">
+              <a:ln w="13462">
+                <a:solidFill>
+                  <a:schemeClr val="bg1"/>
+                </a:solidFill>
+                <a:prstDash val="solid"/>
+              </a:ln>
+              <a:solidFill>
+                <a:schemeClr val="tx1">
+                  <a:lumMod val="85000"/>
+                  <a:lumOff val="15000"/>
+                </a:schemeClr>
+              </a:solidFill>
+              <a:effectLst>
+                <a:outerShdw dist="38100" dir="2700000" algn="bl" rotWithShape="0">
+                  <a:schemeClr val="accent5"/>
+                </a:outerShdw>
+              </a:effectLst>
+            </a:endParaRPr>
+          </a:p>
+        </p:txBody>
+      </p:sp>
+      <p:sp>
+        <p:nvSpPr>
+          <p:cNvPr id="3" name="object 3"/>
+          <p:cNvSpPr txBox="1">
+            <a:spLocks noGrp="1"/>
+          </p:cNvSpPr>
+          <p:nvPr>
+            <p:ph type="title"/>
+          </p:nvPr>
+        </p:nvSpPr>
+        <p:spPr>
+          <a:xfrm>
+            <a:off x="786485" y="457200"/>
+            <a:ext cx="8967115" cy="535403"/>
+          </a:xfrm>
+          <a:prstGeom prst="rect">
+            <a:avLst/>
+          </a:prstGeom>
+        </p:spPr>
+        <p:txBody>
+          <a:bodyPr vert="horz" wrap="square" lIns="0" tIns="12065" rIns="0" bIns="0" rtlCol="0">
+            <a:spAutoFit/>
+          </a:bodyPr>
+          <a:lstStyle/>
+          <a:p>
+            <a:pPr marL="12700">
+              <a:lnSpc>
+                <a:spcPct val="100000"/>
+              </a:lnSpc>
+              <a:spcBef>
+                <a:spcPts val="95"/>
+              </a:spcBef>
+            </a:pPr>
+            <a:r>
+              <a:rPr lang="en-US" sz="3400" b="1" spc="-5" dirty="0">
+                <a:solidFill>
+                  <a:srgbClr val="FFFFFF"/>
+                </a:solidFill>
+                <a:latin typeface="Carlito"/>
+                <a:cs typeface="Carlito"/>
+              </a:rPr>
+              <a:t>String Methods</a:t>
+            </a:r>
+            <a:endParaRPr sz="3400" dirty="0">
+              <a:latin typeface="Carlito"/>
+              <a:cs typeface="Carlito"/>
+            </a:endParaRPr>
+          </a:p>
+        </p:txBody>
+      </p:sp>
+      <p:sp>
+        <p:nvSpPr>
+          <p:cNvPr id="5" name="object 5"/>
+          <p:cNvSpPr/>
+          <p:nvPr/>
+        </p:nvSpPr>
+        <p:spPr>
+          <a:xfrm>
+            <a:off x="9816083" y="262127"/>
+            <a:ext cx="1976627" cy="822960"/>
+          </a:xfrm>
+          <a:prstGeom prst="rect">
+            <a:avLst/>
+          </a:prstGeom>
+          <a:blipFill>
+            <a:blip r:embed="rId3" cstate="print"/>
+            <a:stretch>
+              <a:fillRect/>
+            </a:stretch>
+          </a:blipFill>
+        </p:spPr>
+        <p:txBody>
+          <a:bodyPr wrap="square" lIns="0" tIns="0" rIns="0" bIns="0" rtlCol="0"/>
+          <a:lstStyle/>
+          <a:p>
+            <a:endParaRPr/>
+          </a:p>
+        </p:txBody>
+      </p:sp>
+      <p:sp>
+        <p:nvSpPr>
+          <p:cNvPr id="4" name="object 3">
+            <a:extLst>
+              <a:ext uri="{FF2B5EF4-FFF2-40B4-BE49-F238E27FC236}">
+                <a16:creationId xmlns:a16="http://schemas.microsoft.com/office/drawing/2014/main" id="{1ED9D45B-4B0D-FC76-3A8C-E89F6CD72254}"/>
+              </a:ext>
+            </a:extLst>
+          </p:cNvPr>
+          <p:cNvSpPr txBox="1">
+            <a:spLocks/>
+          </p:cNvSpPr>
+          <p:nvPr/>
+        </p:nvSpPr>
+        <p:spPr>
+          <a:xfrm>
+            <a:off x="762000" y="1143000"/>
+            <a:ext cx="11283579" cy="6062557"/>
+          </a:xfrm>
+          <a:prstGeom prst="rect">
+            <a:avLst/>
+          </a:prstGeom>
+        </p:spPr>
+        <p:txBody>
+          <a:bodyPr vert="horz" wrap="square" lIns="0" tIns="12065" rIns="0" bIns="0" rtlCol="0">
+            <a:spAutoFit/>
+          </a:bodyPr>
+          <a:lstStyle>
+            <a:lvl1pPr>
+              <a:defRPr sz="6000" b="0" i="0">
+                <a:solidFill>
+                  <a:srgbClr val="E7E6E6"/>
+                </a:solidFill>
+                <a:latin typeface="Trebuchet MS"/>
+                <a:ea typeface="+mj-ea"/>
+                <a:cs typeface="Trebuchet MS"/>
+              </a:defRPr>
+            </a:lvl1pPr>
+          </a:lstStyle>
+          <a:p>
+            <a:pPr marL="12700">
+              <a:spcBef>
+                <a:spcPts val="95"/>
+              </a:spcBef>
+            </a:pPr>
+            <a:r>
+              <a:rPr lang="en-US" sz="3200" kern="0" dirty="0">
+                <a:latin typeface="Carlito"/>
+                <a:cs typeface="Carlito"/>
+                <a:sym typeface="Wingdings" panose="05000000000000000000" pitchFamily="2" charset="2"/>
+              </a:rPr>
+              <a:t>1.substr : 	</a:t>
+            </a:r>
+            <a:r>
+              <a:rPr lang="en-US" sz="3200" kern="0" dirty="0" err="1">
+                <a:latin typeface="Carlito"/>
+                <a:cs typeface="Carlito"/>
+                <a:sym typeface="Wingdings" panose="05000000000000000000" pitchFamily="2" charset="2"/>
+              </a:rPr>
+              <a:t>str.substr</a:t>
+            </a:r>
+            <a:r>
+              <a:rPr lang="en-US" sz="3200" kern="0" dirty="0">
+                <a:latin typeface="Carlito"/>
+                <a:cs typeface="Carlito"/>
+                <a:sym typeface="Wingdings" panose="05000000000000000000" pitchFamily="2" charset="2"/>
+              </a:rPr>
+              <a:t>(2)-&gt; removes portion from first</a:t>
+            </a:r>
+          </a:p>
+          <a:p>
+            <a:pPr marL="12700">
+              <a:spcBef>
+                <a:spcPts val="95"/>
+              </a:spcBef>
+            </a:pPr>
+            <a:r>
+              <a:rPr lang="en-US" sz="3200" kern="0" dirty="0">
+                <a:latin typeface="Carlito"/>
+                <a:cs typeface="Carlito"/>
+                <a:sym typeface="Wingdings" panose="05000000000000000000" pitchFamily="2" charset="2"/>
+              </a:rPr>
+              <a:t>		</a:t>
+            </a:r>
+            <a:r>
+              <a:rPr lang="en-US" sz="3200" kern="0" dirty="0" err="1">
+                <a:latin typeface="Carlito"/>
+                <a:cs typeface="Carlito"/>
+                <a:sym typeface="Wingdings" panose="05000000000000000000" pitchFamily="2" charset="2"/>
+              </a:rPr>
+              <a:t>str.substr</a:t>
+            </a:r>
+            <a:r>
+              <a:rPr lang="en-US" sz="3200" kern="0" dirty="0">
+                <a:latin typeface="Carlito"/>
+                <a:cs typeface="Carlito"/>
+                <a:sym typeface="Wingdings" panose="05000000000000000000" pitchFamily="2" charset="2"/>
+              </a:rPr>
+              <a:t>(2,5) -&gt; 5 is size</a:t>
+            </a:r>
+          </a:p>
+          <a:p>
+            <a:pPr marL="12700">
+              <a:spcBef>
+                <a:spcPts val="95"/>
+              </a:spcBef>
+            </a:pPr>
+            <a:r>
+              <a:rPr lang="en-US" sz="3200" kern="0" dirty="0">
+                <a:latin typeface="Carlito"/>
+                <a:cs typeface="Carlito"/>
+                <a:sym typeface="Wingdings" panose="05000000000000000000" pitchFamily="2" charset="2"/>
+              </a:rPr>
+              <a:t>		</a:t>
+            </a:r>
+            <a:r>
+              <a:rPr lang="en-US" sz="3200" kern="0" dirty="0" err="1">
+                <a:latin typeface="Carlito"/>
+                <a:cs typeface="Carlito"/>
+                <a:sym typeface="Wingdings" panose="05000000000000000000" pitchFamily="2" charset="2"/>
+              </a:rPr>
+              <a:t>str.substr</a:t>
+            </a:r>
+            <a:r>
+              <a:rPr lang="en-US" sz="3200" kern="0" dirty="0">
+                <a:latin typeface="Carlito"/>
+                <a:cs typeface="Carlito"/>
+                <a:sym typeface="Wingdings" panose="05000000000000000000" pitchFamily="2" charset="2"/>
+              </a:rPr>
+              <a:t>(-5,5) -&gt; starts from last</a:t>
+            </a:r>
+          </a:p>
+          <a:p>
+            <a:pPr marL="12700">
+              <a:spcBef>
+                <a:spcPts val="95"/>
+              </a:spcBef>
+            </a:pPr>
+            <a:r>
+              <a:rPr lang="en-US" sz="3200" kern="0" dirty="0">
+                <a:latin typeface="Carlito"/>
+                <a:cs typeface="Carlito"/>
+                <a:sym typeface="Wingdings" panose="05000000000000000000" pitchFamily="2" charset="2"/>
+              </a:rPr>
+              <a:t>2.substring : </a:t>
+            </a:r>
+            <a:r>
+              <a:rPr lang="en-US" sz="3200" kern="0" dirty="0" err="1">
+                <a:latin typeface="Carlito"/>
+                <a:cs typeface="Carlito"/>
+                <a:sym typeface="Wingdings" panose="05000000000000000000" pitchFamily="2" charset="2"/>
+              </a:rPr>
+              <a:t>str.substring</a:t>
+            </a:r>
+            <a:r>
+              <a:rPr lang="en-US" sz="3200" kern="0" dirty="0">
+                <a:latin typeface="Carlito"/>
+                <a:cs typeface="Carlito"/>
+                <a:sym typeface="Wingdings" panose="05000000000000000000" pitchFamily="2" charset="2"/>
+              </a:rPr>
+              <a:t>(2)-&gt; removes portion from first</a:t>
+            </a:r>
+          </a:p>
+          <a:p>
+            <a:pPr marL="12700">
+              <a:spcBef>
+                <a:spcPts val="95"/>
+              </a:spcBef>
+            </a:pPr>
+            <a:r>
+              <a:rPr lang="en-US" sz="3200" kern="0" dirty="0">
+                <a:latin typeface="Carlito"/>
+                <a:cs typeface="Carlito"/>
+                <a:sym typeface="Wingdings" panose="05000000000000000000" pitchFamily="2" charset="2"/>
+              </a:rPr>
+              <a:t>		</a:t>
+            </a:r>
+            <a:r>
+              <a:rPr lang="en-US" sz="3200" kern="0" dirty="0" err="1">
+                <a:latin typeface="Carlito"/>
+                <a:cs typeface="Carlito"/>
+                <a:sym typeface="Wingdings" panose="05000000000000000000" pitchFamily="2" charset="2"/>
+              </a:rPr>
+              <a:t>str.substring</a:t>
+            </a:r>
+            <a:r>
+              <a:rPr lang="en-US" sz="3200" kern="0" dirty="0">
+                <a:latin typeface="Carlito"/>
+                <a:cs typeface="Carlito"/>
+                <a:sym typeface="Wingdings" panose="05000000000000000000" pitchFamily="2" charset="2"/>
+              </a:rPr>
+              <a:t>(2,5)-&gt; 5 is the ending index.(not included)</a:t>
+            </a:r>
+          </a:p>
+          <a:p>
+            <a:pPr marL="12700">
+              <a:spcBef>
+                <a:spcPts val="95"/>
+              </a:spcBef>
+            </a:pPr>
+            <a:r>
+              <a:rPr lang="en-US" sz="3200" kern="0" dirty="0">
+                <a:latin typeface="Carlito"/>
+                <a:cs typeface="Carlito"/>
+                <a:sym typeface="Wingdings" panose="05000000000000000000" pitchFamily="2" charset="2"/>
+              </a:rPr>
+              <a:t>		</a:t>
+            </a:r>
+            <a:r>
+              <a:rPr lang="en-US" sz="3200" kern="0" dirty="0" err="1">
+                <a:latin typeface="Carlito"/>
+                <a:cs typeface="Carlito"/>
+                <a:sym typeface="Wingdings" panose="05000000000000000000" pitchFamily="2" charset="2"/>
+              </a:rPr>
+              <a:t>str.substring</a:t>
+            </a:r>
+            <a:r>
+              <a:rPr lang="en-US" sz="3200" kern="0" dirty="0">
+                <a:latin typeface="Carlito"/>
+                <a:cs typeface="Carlito"/>
+                <a:sym typeface="Wingdings" panose="05000000000000000000" pitchFamily="2" charset="2"/>
+              </a:rPr>
+              <a:t>(5,2)-&gt; it swaps to (2,5).</a:t>
+            </a:r>
+          </a:p>
+          <a:p>
+            <a:pPr marL="12700">
+              <a:spcBef>
+                <a:spcPts val="95"/>
+              </a:spcBef>
+            </a:pPr>
+            <a:r>
+              <a:rPr lang="en-US" sz="3200" kern="0" dirty="0">
+                <a:latin typeface="Carlito"/>
+                <a:cs typeface="Carlito"/>
+                <a:sym typeface="Wingdings" panose="05000000000000000000" pitchFamily="2" charset="2"/>
+              </a:rPr>
+              <a:t>		</a:t>
+            </a:r>
+            <a:r>
+              <a:rPr lang="en-US" sz="3200" kern="0" dirty="0" err="1">
+                <a:latin typeface="Carlito"/>
+                <a:cs typeface="Carlito"/>
+                <a:sym typeface="Wingdings" panose="05000000000000000000" pitchFamily="2" charset="2"/>
+              </a:rPr>
+              <a:t>str.substring</a:t>
+            </a:r>
+            <a:r>
+              <a:rPr lang="en-US" sz="3200" kern="0" dirty="0">
+                <a:latin typeface="Carlito"/>
+                <a:cs typeface="Carlito"/>
+                <a:sym typeface="Wingdings" panose="05000000000000000000" pitchFamily="2" charset="2"/>
+              </a:rPr>
+              <a:t>(-5,2)-&gt; it makes -</a:t>
+            </a:r>
+            <a:r>
+              <a:rPr lang="en-US" sz="3200" kern="0" dirty="0" err="1">
+                <a:latin typeface="Carlito"/>
+                <a:cs typeface="Carlito"/>
+                <a:sym typeface="Wingdings" panose="05000000000000000000" pitchFamily="2" charset="2"/>
+              </a:rPr>
+              <a:t>ve</a:t>
+            </a:r>
+            <a:r>
+              <a:rPr lang="en-US" sz="3200" kern="0" dirty="0">
+                <a:latin typeface="Carlito"/>
+                <a:cs typeface="Carlito"/>
+                <a:sym typeface="Wingdings" panose="05000000000000000000" pitchFamily="2" charset="2"/>
+              </a:rPr>
+              <a:t> to 0.</a:t>
+            </a:r>
+          </a:p>
+          <a:p>
+            <a:pPr marL="12700">
+              <a:spcBef>
+                <a:spcPts val="95"/>
+              </a:spcBef>
+            </a:pPr>
+            <a:r>
+              <a:rPr lang="en-US" sz="3200" kern="0" dirty="0">
+                <a:latin typeface="Carlito"/>
+                <a:cs typeface="Carlito"/>
+                <a:sym typeface="Wingdings" panose="05000000000000000000" pitchFamily="2" charset="2"/>
+              </a:rPr>
+              <a:t>3.indexOf : </a:t>
+            </a:r>
+            <a:r>
+              <a:rPr lang="en-US" sz="3200" kern="0" dirty="0" err="1">
+                <a:latin typeface="Carlito"/>
+                <a:cs typeface="Carlito"/>
+                <a:sym typeface="Wingdings" panose="05000000000000000000" pitchFamily="2" charset="2"/>
+              </a:rPr>
+              <a:t>str.indexOf</a:t>
+            </a:r>
+            <a:r>
+              <a:rPr lang="en-US" sz="3200" kern="0" dirty="0">
+                <a:latin typeface="Carlito"/>
+                <a:cs typeface="Carlito"/>
+                <a:sym typeface="Wingdings" panose="05000000000000000000" pitchFamily="2" charset="2"/>
+              </a:rPr>
+              <a:t>(‘a’). -&gt; returns number </a:t>
+            </a:r>
+          </a:p>
+          <a:p>
+            <a:pPr marL="12700">
+              <a:spcBef>
+                <a:spcPts val="95"/>
+              </a:spcBef>
+            </a:pPr>
+            <a:r>
+              <a:rPr lang="en-US" sz="3200" kern="0" dirty="0">
+                <a:latin typeface="Carlito"/>
+                <a:cs typeface="Carlito"/>
+                <a:sym typeface="Wingdings" panose="05000000000000000000" pitchFamily="2" charset="2"/>
+              </a:rPr>
+              <a:t>		</a:t>
+            </a:r>
+            <a:r>
+              <a:rPr lang="en-US" sz="3200" kern="0" dirty="0" err="1">
+                <a:latin typeface="Carlito"/>
+                <a:cs typeface="Carlito"/>
+                <a:sym typeface="Wingdings" panose="05000000000000000000" pitchFamily="2" charset="2"/>
+              </a:rPr>
+              <a:t>str.indexOf</a:t>
+            </a:r>
+            <a:r>
+              <a:rPr lang="en-US" sz="3200" kern="0" dirty="0">
+                <a:latin typeface="Carlito"/>
+                <a:cs typeface="Carlito"/>
+                <a:sym typeface="Wingdings" panose="05000000000000000000" pitchFamily="2" charset="2"/>
+              </a:rPr>
+              <a:t>(‘a’,2). -&gt; starts from index 2 then returns</a:t>
+            </a:r>
+          </a:p>
+          <a:p>
+            <a:pPr marL="12700">
+              <a:spcBef>
+                <a:spcPts val="95"/>
+              </a:spcBef>
+            </a:pPr>
+            <a:r>
+              <a:rPr lang="en-US" sz="3200" kern="0" dirty="0">
+                <a:latin typeface="Carlito"/>
+                <a:cs typeface="Carlito"/>
+                <a:sym typeface="Wingdings" panose="05000000000000000000" pitchFamily="2" charset="2"/>
+              </a:rPr>
+              <a:t>		(DIY Ques: try getting the 3</a:t>
+            </a:r>
+            <a:r>
+              <a:rPr lang="en-US" sz="3200" kern="0" baseline="30000" dirty="0">
+                <a:latin typeface="Carlito"/>
+                <a:cs typeface="Carlito"/>
+                <a:sym typeface="Wingdings" panose="05000000000000000000" pitchFamily="2" charset="2"/>
+              </a:rPr>
+              <a:t>rd</a:t>
+            </a:r>
+            <a:r>
+              <a:rPr lang="en-US" sz="3200" kern="0" dirty="0">
+                <a:latin typeface="Carlito"/>
+                <a:cs typeface="Carlito"/>
+                <a:sym typeface="Wingdings" panose="05000000000000000000" pitchFamily="2" charset="2"/>
+              </a:rPr>
+              <a:t> a).</a:t>
+            </a:r>
+          </a:p>
+          <a:p>
+            <a:pPr marL="12700">
+              <a:spcBef>
+                <a:spcPts val="95"/>
+              </a:spcBef>
+            </a:pPr>
+            <a:r>
+              <a:rPr lang="en-US" sz="3200" kern="0" dirty="0">
+                <a:latin typeface="Carlito"/>
+                <a:cs typeface="Carlito"/>
+                <a:sym typeface="Wingdings" panose="05000000000000000000" pitchFamily="2" charset="2"/>
+              </a:rPr>
+              <a:t>4.replace : </a:t>
+            </a:r>
+            <a:r>
+              <a:rPr lang="en-US" sz="3200" kern="0" dirty="0" err="1">
+                <a:latin typeface="Carlito"/>
+                <a:cs typeface="Carlito"/>
+                <a:sym typeface="Wingdings" panose="05000000000000000000" pitchFamily="2" charset="2"/>
+              </a:rPr>
+              <a:t>str.replace</a:t>
+            </a:r>
+            <a:r>
+              <a:rPr lang="en-US" sz="3200" kern="0" dirty="0">
+                <a:latin typeface="Carlito"/>
+                <a:cs typeface="Carlito"/>
+                <a:sym typeface="Wingdings" panose="05000000000000000000" pitchFamily="2" charset="2"/>
+              </a:rPr>
+              <a:t>(‘</a:t>
+            </a:r>
+            <a:r>
+              <a:rPr lang="en-US" sz="3200" kern="0" dirty="0" err="1">
+                <a:latin typeface="Carlito"/>
+                <a:cs typeface="Carlito"/>
+                <a:sym typeface="Wingdings" panose="05000000000000000000" pitchFamily="2" charset="2"/>
+              </a:rPr>
+              <a:t>a’,’m</a:t>
+            </a:r>
+            <a:r>
+              <a:rPr lang="en-US" sz="3200" kern="0" dirty="0">
+                <a:latin typeface="Carlito"/>
+                <a:cs typeface="Carlito"/>
+                <a:sym typeface="Wingdings" panose="05000000000000000000" pitchFamily="2" charset="2"/>
+              </a:rPr>
+              <a:t>’) -&gt; only replace first </a:t>
+            </a:r>
+          </a:p>
+          <a:p>
+            <a:pPr marL="12700">
+              <a:spcBef>
+                <a:spcPts val="95"/>
+              </a:spcBef>
+            </a:pPr>
+            <a:r>
+              <a:rPr lang="en-US" sz="3200" kern="0" dirty="0">
+                <a:latin typeface="Carlito"/>
+                <a:cs typeface="Carlito"/>
+                <a:sym typeface="Wingdings" panose="05000000000000000000" pitchFamily="2" charset="2"/>
+              </a:rPr>
+              <a:t>		</a:t>
+            </a:r>
+            <a:r>
+              <a:rPr lang="en-US" sz="3200" kern="0" dirty="0" err="1">
+                <a:latin typeface="Carlito"/>
+                <a:cs typeface="Carlito"/>
+                <a:sym typeface="Wingdings" panose="05000000000000000000" pitchFamily="2" charset="2"/>
+              </a:rPr>
+              <a:t>str.replaceAll</a:t>
+            </a:r>
+            <a:r>
+              <a:rPr lang="en-US" sz="3200" kern="0" dirty="0">
+                <a:latin typeface="Carlito"/>
+                <a:cs typeface="Carlito"/>
+                <a:sym typeface="Wingdings" panose="05000000000000000000" pitchFamily="2" charset="2"/>
+              </a:rPr>
+              <a:t>(‘</a:t>
+            </a:r>
+            <a:r>
+              <a:rPr lang="en-US" sz="3200" kern="0" dirty="0" err="1">
+                <a:latin typeface="Carlito"/>
+                <a:cs typeface="Carlito"/>
+                <a:sym typeface="Wingdings" panose="05000000000000000000" pitchFamily="2" charset="2"/>
+              </a:rPr>
+              <a:t>a’,’m</a:t>
+            </a:r>
+            <a:r>
+              <a:rPr lang="en-US" sz="3200" kern="0" dirty="0">
+                <a:latin typeface="Carlito"/>
+                <a:cs typeface="Carlito"/>
+                <a:sym typeface="Wingdings" panose="05000000000000000000" pitchFamily="2" charset="2"/>
+              </a:rPr>
+              <a:t>’) -&gt; replaces all</a:t>
+            </a:r>
+          </a:p>
+        </p:txBody>
+      </p:sp>
+      <p:sp>
+        <p:nvSpPr>
+          <p:cNvPr id="7" name="TextBox 6">
+            <a:extLst>
+              <a:ext uri="{FF2B5EF4-FFF2-40B4-BE49-F238E27FC236}">
+                <a16:creationId xmlns:a16="http://schemas.microsoft.com/office/drawing/2014/main" id="{C2428796-F632-00B4-E484-CA738D260150}"/>
+              </a:ext>
+            </a:extLst>
+          </p:cNvPr>
+          <p:cNvSpPr txBox="1"/>
+          <p:nvPr/>
+        </p:nvSpPr>
+        <p:spPr>
+          <a:xfrm>
+            <a:off x="685800" y="4323186"/>
+            <a:ext cx="7086600" cy="707886"/>
+          </a:xfrm>
+          <a:prstGeom prst="rect">
+            <a:avLst/>
+          </a:prstGeom>
+          <a:noFill/>
+        </p:spPr>
+        <p:txBody>
+          <a:bodyPr wrap="square" rtlCol="0">
+            <a:spAutoFit/>
+          </a:bodyPr>
+          <a:lstStyle/>
+          <a:p>
+            <a:endParaRPr lang="en-IN" sz="4000" dirty="0">
+              <a:solidFill>
+                <a:schemeClr val="bg1"/>
+              </a:solidFill>
+            </a:endParaRPr>
+          </a:p>
+        </p:txBody>
+      </p:sp>
+    </p:spTree>
+    <p:extLst>
+      <p:ext uri="{BB962C8B-B14F-4D97-AF65-F5344CB8AC3E}">
+        <p14:creationId xmlns:p14="http://schemas.microsoft.com/office/powerpoint/2010/main" val="2876343672"/>
+      </p:ext>
+    </p:extLst>
+  </p:cSld>
+  <p:clrMapOvr>
+    <a:masterClrMapping/>
+  </p:clrMapOvr>
+</p:sld>
+</file>
+
+<file path=ppt/slides/slide9.xml><?xml version="1.0" encoding="utf-8"?>
+<p:sld xmlns:a="http://schemas.openxmlformats.org/drawingml/2006/main" xmlns:r="http://schemas.openxmlformats.org/officeDocument/2006/relationships" xmlns:p="http://schemas.openxmlformats.org/presentationml/2006/main">
+  <p:cSld>
+    <p:spTree>
+      <p:nvGrpSpPr>
+        <p:cNvPr id="1" name=""/>
+        <p:cNvGrpSpPr/>
+        <p:nvPr/>
+      </p:nvGrpSpPr>
+      <p:grpSpPr>
+        <a:xfrm>
+          <a:off x="0" y="0"/>
+          <a:ext cx="0" cy="0"/>
+          <a:chOff x="0" y="0"/>
+          <a:chExt cx="0" cy="0"/>
+        </a:xfrm>
+      </p:grpSpPr>
+      <p:sp>
+        <p:nvSpPr>
+          <p:cNvPr id="2" name="object 2"/>
+          <p:cNvSpPr/>
+          <p:nvPr/>
+        </p:nvSpPr>
+        <p:spPr>
+          <a:xfrm>
+            <a:off x="1" y="44199"/>
+            <a:ext cx="12191999" cy="7118601"/>
+          </a:xfrm>
+          <a:prstGeom prst="rect">
+            <a:avLst/>
+          </a:prstGeom>
+          <a:blipFill>
+            <a:blip r:embed="rId2" cstate="print"/>
+            <a:stretch>
+              <a:fillRect/>
+            </a:stretch>
+          </a:blipFill>
+        </p:spPr>
+        <p:txBody>
+          <a:bodyPr wrap="square" lIns="0" tIns="0" rIns="0" bIns="0" rtlCol="0"/>
+          <a:lstStyle/>
+          <a:p>
+            <a:endParaRPr b="1" dirty="0">
+              <a:ln w="13462">
+                <a:solidFill>
+                  <a:schemeClr val="bg1"/>
+                </a:solidFill>
+                <a:prstDash val="solid"/>
+              </a:ln>
+              <a:solidFill>
+                <a:schemeClr val="tx1">
+                  <a:lumMod val="85000"/>
+                  <a:lumOff val="15000"/>
+                </a:schemeClr>
+              </a:solidFill>
+              <a:effectLst>
+                <a:outerShdw dist="38100" dir="2700000" algn="bl" rotWithShape="0">
+                  <a:schemeClr val="accent5"/>
+                </a:outerShdw>
+              </a:effectLst>
+            </a:endParaRPr>
+          </a:p>
+        </p:txBody>
+      </p:sp>
+      <p:sp>
+        <p:nvSpPr>
+          <p:cNvPr id="3" name="object 3"/>
+          <p:cNvSpPr txBox="1">
+            <a:spLocks noGrp="1"/>
+          </p:cNvSpPr>
+          <p:nvPr>
+            <p:ph type="title"/>
+          </p:nvPr>
+        </p:nvSpPr>
+        <p:spPr>
+          <a:xfrm>
+            <a:off x="786485" y="457200"/>
+            <a:ext cx="8967115" cy="535403"/>
+          </a:xfrm>
+          <a:prstGeom prst="rect">
+            <a:avLst/>
+          </a:prstGeom>
+        </p:spPr>
+        <p:txBody>
+          <a:bodyPr vert="horz" wrap="square" lIns="0" tIns="12065" rIns="0" bIns="0" rtlCol="0">
+            <a:spAutoFit/>
+          </a:bodyPr>
+          <a:lstStyle/>
+          <a:p>
+            <a:pPr marL="12700">
+              <a:lnSpc>
+                <a:spcPct val="100000"/>
+              </a:lnSpc>
+              <a:spcBef>
+                <a:spcPts val="95"/>
+              </a:spcBef>
+            </a:pPr>
+            <a:r>
+              <a:rPr lang="en-US" sz="3400" b="1" spc="-5" dirty="0">
+                <a:solidFill>
+                  <a:srgbClr val="FFFFFF"/>
+                </a:solidFill>
+                <a:latin typeface="Carlito"/>
+                <a:cs typeface="Carlito"/>
+              </a:rPr>
+              <a:t>String Methods</a:t>
+            </a:r>
+            <a:endParaRPr sz="3400" dirty="0">
+              <a:latin typeface="Carlito"/>
+              <a:cs typeface="Carlito"/>
+            </a:endParaRPr>
+          </a:p>
+        </p:txBody>
+      </p:sp>
+      <p:sp>
+        <p:nvSpPr>
+          <p:cNvPr id="5" name="object 5"/>
+          <p:cNvSpPr/>
+          <p:nvPr/>
+        </p:nvSpPr>
+        <p:spPr>
+          <a:xfrm>
+            <a:off x="9816083" y="262127"/>
+            <a:ext cx="1976627" cy="822960"/>
+          </a:xfrm>
+          <a:prstGeom prst="rect">
+            <a:avLst/>
+          </a:prstGeom>
+          <a:blipFill>
+            <a:blip r:embed="rId3" cstate="print"/>
+            <a:stretch>
+              <a:fillRect/>
+            </a:stretch>
+          </a:blipFill>
+        </p:spPr>
+        <p:txBody>
+          <a:bodyPr wrap="square" lIns="0" tIns="0" rIns="0" bIns="0" rtlCol="0"/>
+          <a:lstStyle/>
+          <a:p>
+            <a:endParaRPr/>
+          </a:p>
+        </p:txBody>
+      </p:sp>
+      <p:sp>
+        <p:nvSpPr>
+          <p:cNvPr id="4" name="object 3">
+            <a:extLst>
+              <a:ext uri="{FF2B5EF4-FFF2-40B4-BE49-F238E27FC236}">
+                <a16:creationId xmlns:a16="http://schemas.microsoft.com/office/drawing/2014/main" id="{1ED9D45B-4B0D-FC76-3A8C-E89F6CD72254}"/>
+              </a:ext>
+            </a:extLst>
+          </p:cNvPr>
+          <p:cNvSpPr txBox="1">
+            <a:spLocks/>
+          </p:cNvSpPr>
+          <p:nvPr/>
+        </p:nvSpPr>
+        <p:spPr>
+          <a:xfrm>
+            <a:off x="762000" y="1143000"/>
+            <a:ext cx="11283579" cy="5544467"/>
+          </a:xfrm>
+          <a:prstGeom prst="rect">
+            <a:avLst/>
+          </a:prstGeom>
+        </p:spPr>
+        <p:txBody>
+          <a:bodyPr vert="horz" wrap="square" lIns="0" tIns="12065" rIns="0" bIns="0" rtlCol="0">
+            <a:spAutoFit/>
+          </a:bodyPr>
+          <a:lstStyle>
+            <a:lvl1pPr>
+              <a:defRPr sz="6000" b="0" i="0">
+                <a:solidFill>
+                  <a:srgbClr val="E7E6E6"/>
+                </a:solidFill>
+                <a:latin typeface="Trebuchet MS"/>
+                <a:ea typeface="+mj-ea"/>
+                <a:cs typeface="Trebuchet MS"/>
+              </a:defRPr>
+            </a:lvl1pPr>
+          </a:lstStyle>
+          <a:p>
+            <a:pPr marL="12700">
+              <a:spcBef>
+                <a:spcPts val="95"/>
+              </a:spcBef>
+            </a:pPr>
+            <a:r>
+              <a:rPr lang="en-US" sz="3200" kern="0" dirty="0">
+                <a:latin typeface="Carlito"/>
+                <a:cs typeface="Carlito"/>
+                <a:sym typeface="Wingdings" panose="05000000000000000000" pitchFamily="2" charset="2"/>
+              </a:rPr>
+              <a:t>5. repeat : 	</a:t>
+            </a:r>
+            <a:r>
+              <a:rPr lang="en-US" sz="3200" kern="0" dirty="0" err="1">
+                <a:latin typeface="Carlito"/>
+                <a:cs typeface="Carlito"/>
+                <a:sym typeface="Wingdings" panose="05000000000000000000" pitchFamily="2" charset="2"/>
+              </a:rPr>
+              <a:t>str.repeat</a:t>
+            </a:r>
+            <a:r>
+              <a:rPr lang="en-US" sz="3200" kern="0" dirty="0">
+                <a:latin typeface="Carlito"/>
+                <a:cs typeface="Carlito"/>
+                <a:sym typeface="Wingdings" panose="05000000000000000000" pitchFamily="2" charset="2"/>
+              </a:rPr>
+              <a:t>(3)</a:t>
+            </a:r>
+          </a:p>
+          <a:p>
+            <a:pPr marL="12700">
+              <a:spcBef>
+                <a:spcPts val="95"/>
+              </a:spcBef>
+            </a:pPr>
+            <a:endParaRPr lang="en-US" sz="3200" kern="0" dirty="0">
+              <a:latin typeface="Carlito"/>
+              <a:cs typeface="Carlito"/>
+              <a:sym typeface="Wingdings" panose="05000000000000000000" pitchFamily="2" charset="2"/>
+            </a:endParaRPr>
+          </a:p>
+          <a:p>
+            <a:pPr marL="12700">
+              <a:spcBef>
+                <a:spcPts val="95"/>
+              </a:spcBef>
+            </a:pPr>
+            <a:r>
+              <a:rPr lang="en-US" sz="3200" kern="0" dirty="0">
+                <a:latin typeface="Carlito"/>
+                <a:cs typeface="Carlito"/>
+                <a:sym typeface="Wingdings" panose="05000000000000000000" pitchFamily="2" charset="2"/>
+              </a:rPr>
+              <a:t>6. </a:t>
+            </a:r>
+            <a:r>
+              <a:rPr lang="en-US" sz="3200" kern="0" dirty="0" err="1">
+                <a:latin typeface="Carlito"/>
+                <a:cs typeface="Carlito"/>
+                <a:sym typeface="Wingdings" panose="05000000000000000000" pitchFamily="2" charset="2"/>
+              </a:rPr>
+              <a:t>str.toUpperCase</a:t>
+            </a:r>
+            <a:r>
+              <a:rPr lang="en-US" sz="3200" kern="0" dirty="0">
+                <a:latin typeface="Carlito"/>
+                <a:cs typeface="Carlito"/>
+                <a:sym typeface="Wingdings" panose="05000000000000000000" pitchFamily="2" charset="2"/>
+              </a:rPr>
+              <a:t>()  , </a:t>
+            </a:r>
+            <a:r>
+              <a:rPr lang="en-US" sz="3200" kern="0" dirty="0" err="1">
+                <a:latin typeface="Carlito"/>
+                <a:cs typeface="Carlito"/>
+                <a:sym typeface="Wingdings" panose="05000000000000000000" pitchFamily="2" charset="2"/>
+              </a:rPr>
+              <a:t>str.toLowerCase</a:t>
+            </a:r>
+            <a:r>
+              <a:rPr lang="en-US" sz="3200" kern="0" dirty="0">
+                <a:latin typeface="Carlito"/>
+                <a:cs typeface="Carlito"/>
+                <a:sym typeface="Wingdings" panose="05000000000000000000" pitchFamily="2" charset="2"/>
+              </a:rPr>
+              <a:t>()</a:t>
+            </a:r>
+          </a:p>
+          <a:p>
+            <a:pPr marL="12700">
+              <a:spcBef>
+                <a:spcPts val="95"/>
+              </a:spcBef>
+            </a:pPr>
+            <a:r>
+              <a:rPr lang="en-US" sz="3200" kern="0" dirty="0">
+                <a:latin typeface="Carlito"/>
+                <a:cs typeface="Carlito"/>
+                <a:sym typeface="Wingdings" panose="05000000000000000000" pitchFamily="2" charset="2"/>
+              </a:rPr>
+              <a:t>7. trim: </a:t>
+            </a:r>
+            <a:r>
+              <a:rPr lang="en-US" sz="3200" kern="0" dirty="0" err="1">
+                <a:latin typeface="Carlito"/>
+                <a:cs typeface="Carlito"/>
+                <a:sym typeface="Wingdings" panose="05000000000000000000" pitchFamily="2" charset="2"/>
+              </a:rPr>
+              <a:t>str.trim</a:t>
+            </a:r>
+            <a:r>
+              <a:rPr lang="en-US" sz="3200" kern="0" dirty="0">
+                <a:latin typeface="Carlito"/>
+                <a:cs typeface="Carlito"/>
+                <a:sym typeface="Wingdings" panose="05000000000000000000" pitchFamily="2" charset="2"/>
+              </a:rPr>
+              <a:t>(); //removes starting and ending whitespace</a:t>
+            </a:r>
+          </a:p>
+          <a:p>
+            <a:pPr marL="12700">
+              <a:spcBef>
+                <a:spcPts val="95"/>
+              </a:spcBef>
+            </a:pPr>
+            <a:endParaRPr lang="en-US" sz="3200" kern="0" dirty="0">
+              <a:latin typeface="Carlito"/>
+              <a:cs typeface="Carlito"/>
+              <a:sym typeface="Wingdings" panose="05000000000000000000" pitchFamily="2" charset="2"/>
+            </a:endParaRPr>
+          </a:p>
+          <a:p>
+            <a:pPr marL="12700">
+              <a:spcBef>
+                <a:spcPts val="95"/>
+              </a:spcBef>
+            </a:pPr>
+            <a:r>
+              <a:rPr lang="en-US" sz="3200" kern="0" dirty="0">
+                <a:latin typeface="Carlito"/>
+                <a:cs typeface="Carlito"/>
+                <a:sym typeface="Wingdings" panose="05000000000000000000" pitchFamily="2" charset="2"/>
+              </a:rPr>
+              <a:t>Boolean </a:t>
+            </a:r>
+          </a:p>
+          <a:p>
+            <a:pPr marL="12700">
+              <a:spcBef>
+                <a:spcPts val="95"/>
+              </a:spcBef>
+            </a:pPr>
+            <a:endParaRPr lang="en-US" sz="3200" kern="0" dirty="0">
+              <a:latin typeface="Carlito"/>
+              <a:cs typeface="Carlito"/>
+              <a:sym typeface="Wingdings" panose="05000000000000000000" pitchFamily="2" charset="2"/>
+            </a:endParaRPr>
+          </a:p>
+          <a:p>
+            <a:pPr marL="12700">
+              <a:spcBef>
+                <a:spcPts val="95"/>
+              </a:spcBef>
+            </a:pPr>
+            <a:r>
+              <a:rPr lang="en-US" sz="3200" kern="0" dirty="0">
+                <a:latin typeface="Carlito"/>
+                <a:cs typeface="Carlito"/>
+                <a:sym typeface="Wingdings" panose="05000000000000000000" pitchFamily="2" charset="2"/>
+              </a:rPr>
+              <a:t>== -&gt; general equality </a:t>
+            </a:r>
+          </a:p>
+          <a:p>
+            <a:pPr marL="12700">
+              <a:spcBef>
+                <a:spcPts val="95"/>
+              </a:spcBef>
+            </a:pPr>
+            <a:r>
+              <a:rPr lang="en-US" sz="3200" kern="0" dirty="0">
+                <a:latin typeface="Carlito"/>
+                <a:cs typeface="Carlito"/>
+                <a:sym typeface="Wingdings" panose="05000000000000000000" pitchFamily="2" charset="2"/>
+              </a:rPr>
+              <a:t>=== -&gt; strict equality</a:t>
+            </a:r>
+          </a:p>
+          <a:p>
+            <a:pPr marL="12700">
+              <a:spcBef>
+                <a:spcPts val="95"/>
+              </a:spcBef>
+            </a:pPr>
+            <a:r>
+              <a:rPr lang="en-US" sz="3200" kern="0" dirty="0">
+                <a:latin typeface="Carlito"/>
+                <a:cs typeface="Carlito"/>
+                <a:sym typeface="Wingdings" panose="05000000000000000000" pitchFamily="2" charset="2"/>
+              </a:rPr>
+              <a:t>Ques: 1==1 , 1===1, 1==‘1’, 1==true, 1===true, ‘1’==true , 	‘true’==true, “ ”==0, </a:t>
+            </a:r>
+          </a:p>
+        </p:txBody>
+      </p:sp>
+      <p:sp>
+        <p:nvSpPr>
+          <p:cNvPr id="7" name="TextBox 6">
+            <a:extLst>
+              <a:ext uri="{FF2B5EF4-FFF2-40B4-BE49-F238E27FC236}">
+                <a16:creationId xmlns:a16="http://schemas.microsoft.com/office/drawing/2014/main" id="{C2428796-F632-00B4-E484-CA738D260150}"/>
+              </a:ext>
+            </a:extLst>
+          </p:cNvPr>
+          <p:cNvSpPr txBox="1"/>
+          <p:nvPr/>
+        </p:nvSpPr>
+        <p:spPr>
+          <a:xfrm>
+            <a:off x="685800" y="4323186"/>
+            <a:ext cx="7086600" cy="707886"/>
+          </a:xfrm>
+          <a:prstGeom prst="rect">
+            <a:avLst/>
+          </a:prstGeom>
+          <a:noFill/>
+        </p:spPr>
+        <p:txBody>
+          <a:bodyPr wrap="square" rtlCol="0">
+            <a:spAutoFit/>
+          </a:bodyPr>
+          <a:lstStyle/>
+          <a:p>
+            <a:endParaRPr lang="en-IN" sz="4000" dirty="0">
+              <a:solidFill>
+                <a:schemeClr val="bg1"/>
+              </a:solidFill>
+            </a:endParaRPr>
+          </a:p>
+        </p:txBody>
+      </p:sp>
+    </p:spTree>
+    <p:extLst>
+      <p:ext uri="{BB962C8B-B14F-4D97-AF65-F5344CB8AC3E}">
+        <p14:creationId xmlns:p14="http://schemas.microsoft.com/office/powerpoint/2010/main" val="1666366778"/>
       </p:ext>
     </p:extLst>
   </p:cSld>

</xml_diff>

<commit_message>
Code updated on 2nd Dec
</commit_message>
<xml_diff>
--- a/JS.pptx
+++ b/JS.pptx
@@ -45,6 +45,13 @@
     <p:sldId id="419" r:id="rId39"/>
     <p:sldId id="420" r:id="rId40"/>
     <p:sldId id="421" r:id="rId41"/>
+    <p:sldId id="422" r:id="rId42"/>
+    <p:sldId id="423" r:id="rId43"/>
+    <p:sldId id="424" r:id="rId44"/>
+    <p:sldId id="425" r:id="rId45"/>
+    <p:sldId id="426" r:id="rId46"/>
+    <p:sldId id="428" r:id="rId47"/>
+    <p:sldId id="429" r:id="rId48"/>
   </p:sldIdLst>
   <p:sldSz cx="12192000" cy="6858000"/>
   <p:notesSz cx="12192000" cy="6858000"/>
@@ -301,7 +308,7 @@
           <a:p>
             <a:fld id="{1D8BD707-D9CF-40AE-B4C6-C98DA3205C09}" type="datetimeFigureOut">
               <a:rPr lang="en-US"/>
-              <a:t>11/28/2023</a:t>
+              <a:t>12/1/2023</a:t>
             </a:fld>
             <a:endParaRPr lang="en-US"/>
           </a:p>
@@ -478,7 +485,7 @@
           <a:p>
             <a:fld id="{1D8BD707-D9CF-40AE-B4C6-C98DA3205C09}" type="datetimeFigureOut">
               <a:rPr lang="en-US"/>
-              <a:t>11/28/2023</a:t>
+              <a:t>12/1/2023</a:t>
             </a:fld>
             <a:endParaRPr lang="en-US"/>
           </a:p>
@@ -692,7 +699,7 @@
           <a:p>
             <a:fld id="{1D8BD707-D9CF-40AE-B4C6-C98DA3205C09}" type="datetimeFigureOut">
               <a:rPr lang="en-US"/>
-              <a:t>11/28/2023</a:t>
+              <a:t>12/1/2023</a:t>
             </a:fld>
             <a:endParaRPr lang="en-US"/>
           </a:p>
@@ -840,7 +847,7 @@
           <a:p>
             <a:fld id="{1D8BD707-D9CF-40AE-B4C6-C98DA3205C09}" type="datetimeFigureOut">
               <a:rPr lang="en-US"/>
-              <a:t>11/28/2023</a:t>
+              <a:t>12/1/2023</a:t>
             </a:fld>
             <a:endParaRPr lang="en-US"/>
           </a:p>
@@ -967,7 +974,7 @@
           <a:p>
             <a:fld id="{1D8BD707-D9CF-40AE-B4C6-C98DA3205C09}" type="datetimeFigureOut">
               <a:rPr lang="en-US"/>
-              <a:t>11/28/2023</a:t>
+              <a:t>12/1/2023</a:t>
             </a:fld>
             <a:endParaRPr lang="en-US"/>
           </a:p>
@@ -1221,7 +1228,7 @@
           <a:p>
             <a:fld id="{1D8BD707-D9CF-40AE-B4C6-C98DA3205C09}" type="datetimeFigureOut">
               <a:rPr lang="en-US"/>
-              <a:t>11/28/2023</a:t>
+              <a:t>12/1/2023</a:t>
             </a:fld>
             <a:endParaRPr lang="en-US"/>
           </a:p>
@@ -15758,7 +15765,7 @@
                 <a:cs typeface="Calibri Light" panose="020F0302020204030204" pitchFamily="34" charset="0"/>
                 <a:sym typeface="Wingdings" panose="05000000000000000000" pitchFamily="2" charset="2"/>
               </a:rPr>
-              <a:t>getElementByClassName</a:t>
+              <a:t>getElementsByClassName</a:t>
             </a:r>
             <a:r>
               <a:rPr lang="en-US" sz="2800" kern="0" dirty="0">
@@ -16848,7 +16855,7 @@
         <p:spPr>
           <a:xfrm>
             <a:off x="533400" y="838200"/>
-            <a:ext cx="11621728" cy="4867358"/>
+            <a:ext cx="11621728" cy="5249514"/>
           </a:xfrm>
           <a:prstGeom prst="rect">
             <a:avLst/>
@@ -16975,6 +16982,60 @@
               <a:buFont typeface="Wingdings" panose="05000000000000000000" pitchFamily="2" charset="2"/>
               <a:buChar char="à"/>
             </a:pPr>
+            <a:r>
+              <a:rPr lang="en-US" sz="2800" kern="0" dirty="0" err="1">
+                <a:latin typeface="+mn-lt"/>
+                <a:cs typeface="Calibri Light" panose="020F0302020204030204" pitchFamily="34" charset="0"/>
+                <a:sym typeface="Wingdings" panose="05000000000000000000" pitchFamily="2" charset="2"/>
+              </a:rPr>
+              <a:t>setAttribute</a:t>
+            </a:r>
+            <a:r>
+              <a:rPr lang="en-US" sz="2800" kern="0" dirty="0">
+                <a:latin typeface="+mn-lt"/>
+                <a:cs typeface="Calibri Light" panose="020F0302020204030204" pitchFamily="34" charset="0"/>
+                <a:sym typeface="Wingdings" panose="05000000000000000000" pitchFamily="2" charset="2"/>
+              </a:rPr>
+              <a:t>(‘class’ , ‘one two three’);//multiple classes possible</a:t>
+            </a:r>
+          </a:p>
+          <a:p>
+            <a:pPr marL="12700">
+              <a:spcBef>
+                <a:spcPts val="95"/>
+              </a:spcBef>
+            </a:pPr>
+            <a:r>
+              <a:rPr lang="en-US" sz="2400" kern="0" dirty="0">
+                <a:latin typeface="Consolas" panose="020B0609020204030204" pitchFamily="49" charset="0"/>
+                <a:cs typeface="Calibri Light" panose="020F0302020204030204" pitchFamily="34" charset="0"/>
+                <a:sym typeface="Wingdings" panose="05000000000000000000" pitchFamily="2" charset="2"/>
+              </a:rPr>
+              <a:t>Task: Make a slider using ‘</a:t>
+            </a:r>
+            <a:r>
+              <a:rPr lang="en-US" sz="2400" kern="0" dirty="0" err="1">
+                <a:latin typeface="Consolas" panose="020B0609020204030204" pitchFamily="49" charset="0"/>
+                <a:cs typeface="Calibri Light" panose="020F0302020204030204" pitchFamily="34" charset="0"/>
+                <a:sym typeface="Wingdings" panose="05000000000000000000" pitchFamily="2" charset="2"/>
+              </a:rPr>
+              <a:t>setInterval</a:t>
+            </a:r>
+            <a:r>
+              <a:rPr lang="en-US" sz="2400" kern="0" dirty="0">
+                <a:latin typeface="Consolas" panose="020B0609020204030204" pitchFamily="49" charset="0"/>
+                <a:cs typeface="Calibri Light" panose="020F0302020204030204" pitchFamily="34" charset="0"/>
+                <a:sym typeface="Wingdings" panose="05000000000000000000" pitchFamily="2" charset="2"/>
+              </a:rPr>
+              <a:t>’ and attribute manipulator, which changes image in 2 seconds.</a:t>
+            </a:r>
+          </a:p>
+          <a:p>
+            <a:pPr marL="12700">
+              <a:spcBef>
+                <a:spcPts val="95"/>
+              </a:spcBef>
+            </a:pPr>
             <a:endParaRPr lang="en-US" sz="2800" kern="0" dirty="0">
               <a:latin typeface="+mn-lt"/>
               <a:cs typeface="Calibri Light" panose="020F0302020204030204" pitchFamily="34" charset="0"/>
@@ -16988,41 +17049,364 @@
               </a:spcBef>
             </a:pPr>
             <a:r>
-              <a:rPr lang="en-US" sz="2800" kern="0" dirty="0">
+              <a:rPr lang="en-US" sz="3200" kern="0" dirty="0" err="1">
                 <a:latin typeface="+mn-lt"/>
                 <a:cs typeface="Calibri Light" panose="020F0302020204030204" pitchFamily="34" charset="0"/>
                 <a:sym typeface="Wingdings" panose="05000000000000000000" pitchFamily="2" charset="2"/>
               </a:rPr>
-              <a:t>Task: Make a slider using ‘</a:t>
-            </a:r>
-            <a:r>
-              <a:rPr lang="en-US" sz="2800" kern="0" dirty="0" err="1">
-                <a:latin typeface="+mn-lt"/>
-                <a:cs typeface="Calibri Light" panose="020F0302020204030204" pitchFamily="34" charset="0"/>
-                <a:sym typeface="Wingdings" panose="05000000000000000000" pitchFamily="2" charset="2"/>
-              </a:rPr>
-              <a:t>setInterval</a:t>
-            </a:r>
-            <a:r>
-              <a:rPr lang="en-US" sz="2800" kern="0" dirty="0">
-                <a:latin typeface="+mn-lt"/>
-                <a:cs typeface="Calibri Light" panose="020F0302020204030204" pitchFamily="34" charset="0"/>
-                <a:sym typeface="Wingdings" panose="05000000000000000000" pitchFamily="2" charset="2"/>
-              </a:rPr>
-              <a:t>’ and attribute manipulator, which changes image in 2 seconds.</a:t>
-            </a:r>
-          </a:p>
-          <a:p>
-            <a:pPr marL="12700">
-              <a:spcBef>
-                <a:spcPts val="95"/>
-              </a:spcBef>
-            </a:pPr>
-            <a:endParaRPr lang="en-US" sz="2800" kern="0">
+              <a:t>ClassList</a:t>
+            </a:r>
+            <a:endParaRPr lang="en-US" sz="3200" kern="0" dirty="0">
               <a:latin typeface="+mn-lt"/>
               <a:cs typeface="Calibri Light" panose="020F0302020204030204" pitchFamily="34" charset="0"/>
               <a:sym typeface="Wingdings" panose="05000000000000000000" pitchFamily="2" charset="2"/>
             </a:endParaRPr>
+          </a:p>
+          <a:p>
+            <a:pPr marL="527050" indent="-514350">
+              <a:spcBef>
+                <a:spcPts val="95"/>
+              </a:spcBef>
+              <a:buAutoNum type="arabicPeriod"/>
+            </a:pPr>
+            <a:r>
+              <a:rPr lang="en-US" sz="2800" kern="0" dirty="0">
+                <a:latin typeface="+mn-lt"/>
+                <a:cs typeface="Calibri Light" panose="020F0302020204030204" pitchFamily="34" charset="0"/>
+                <a:sym typeface="Wingdings" panose="05000000000000000000" pitchFamily="2" charset="2"/>
+              </a:rPr>
+              <a:t>add :  </a:t>
+            </a:r>
+            <a:r>
+              <a:rPr lang="en-US" sz="2800" kern="0" dirty="0" err="1">
+                <a:latin typeface="+mn-lt"/>
+                <a:cs typeface="Calibri Light" panose="020F0302020204030204" pitchFamily="34" charset="0"/>
+                <a:sym typeface="Wingdings" panose="05000000000000000000" pitchFamily="2" charset="2"/>
+              </a:rPr>
+              <a:t>doc.classList.add</a:t>
+            </a:r>
+            <a:r>
+              <a:rPr lang="en-US" sz="2800" kern="0" dirty="0">
+                <a:latin typeface="+mn-lt"/>
+                <a:cs typeface="Calibri Light" panose="020F0302020204030204" pitchFamily="34" charset="0"/>
+                <a:sym typeface="Wingdings" panose="05000000000000000000" pitchFamily="2" charset="2"/>
+              </a:rPr>
+              <a:t>(‘cl1’,’cl2’); // class can be added </a:t>
+            </a:r>
+          </a:p>
+          <a:p>
+            <a:pPr marL="527050" indent="-514350">
+              <a:spcBef>
+                <a:spcPts val="95"/>
+              </a:spcBef>
+              <a:buAutoNum type="arabicPeriod"/>
+            </a:pPr>
+            <a:r>
+              <a:rPr lang="en-US" sz="2800" kern="0" dirty="0">
+                <a:latin typeface="+mn-lt"/>
+                <a:cs typeface="Calibri Light" panose="020F0302020204030204" pitchFamily="34" charset="0"/>
+                <a:sym typeface="Wingdings" panose="05000000000000000000" pitchFamily="2" charset="2"/>
+              </a:rPr>
+              <a:t>remove : </a:t>
+            </a:r>
+            <a:r>
+              <a:rPr lang="en-US" sz="2800" kern="0" dirty="0" err="1">
+                <a:latin typeface="+mn-lt"/>
+                <a:cs typeface="Calibri Light" panose="020F0302020204030204" pitchFamily="34" charset="0"/>
+                <a:sym typeface="Wingdings" panose="05000000000000000000" pitchFamily="2" charset="2"/>
+              </a:rPr>
+              <a:t>doc.classList.remove</a:t>
+            </a:r>
+            <a:r>
+              <a:rPr lang="en-US" sz="2800" kern="0" dirty="0">
+                <a:latin typeface="+mn-lt"/>
+                <a:cs typeface="Calibri Light" panose="020F0302020204030204" pitchFamily="34" charset="0"/>
+                <a:sym typeface="Wingdings" panose="05000000000000000000" pitchFamily="2" charset="2"/>
+              </a:rPr>
+              <a:t>(‘cl1’,’cl2’); // remove these classes</a:t>
+            </a:r>
+          </a:p>
+          <a:p>
+            <a:pPr marL="527050" indent="-514350">
+              <a:spcBef>
+                <a:spcPts val="95"/>
+              </a:spcBef>
+              <a:buAutoNum type="arabicPeriod"/>
+            </a:pPr>
+            <a:r>
+              <a:rPr lang="en-US" sz="2800" kern="0" dirty="0">
+                <a:latin typeface="+mn-lt"/>
+                <a:cs typeface="Calibri Light" panose="020F0302020204030204" pitchFamily="34" charset="0"/>
+                <a:sym typeface="Wingdings" panose="05000000000000000000" pitchFamily="2" charset="2"/>
+              </a:rPr>
+              <a:t>toggle : </a:t>
+            </a:r>
+            <a:r>
+              <a:rPr lang="en-US" sz="2800" kern="0" dirty="0" err="1">
+                <a:latin typeface="+mn-lt"/>
+                <a:cs typeface="Calibri Light" panose="020F0302020204030204" pitchFamily="34" charset="0"/>
+                <a:sym typeface="Wingdings" panose="05000000000000000000" pitchFamily="2" charset="2"/>
+              </a:rPr>
+              <a:t>doc.classList.toggle</a:t>
+            </a:r>
+            <a:r>
+              <a:rPr lang="en-US" sz="2800" kern="0" dirty="0">
+                <a:latin typeface="+mn-lt"/>
+                <a:cs typeface="Calibri Light" panose="020F0302020204030204" pitchFamily="34" charset="0"/>
+                <a:sym typeface="Wingdings" panose="05000000000000000000" pitchFamily="2" charset="2"/>
+              </a:rPr>
+              <a:t>(‘tc1’);// make true-&gt;false and vice-versa</a:t>
+            </a:r>
+          </a:p>
+          <a:p>
+            <a:pPr marL="527050" indent="-514350">
+              <a:spcBef>
+                <a:spcPts val="95"/>
+              </a:spcBef>
+              <a:buAutoNum type="arabicPeriod"/>
+            </a:pPr>
+            <a:r>
+              <a:rPr lang="en-US" sz="2800" kern="0" dirty="0">
+                <a:latin typeface="+mn-lt"/>
+                <a:cs typeface="Calibri Light" panose="020F0302020204030204" pitchFamily="34" charset="0"/>
+                <a:sym typeface="Wingdings" panose="05000000000000000000" pitchFamily="2" charset="2"/>
+              </a:rPr>
+              <a:t>contains : </a:t>
+            </a:r>
+            <a:r>
+              <a:rPr lang="en-US" sz="2800" kern="0" dirty="0" err="1">
+                <a:latin typeface="+mn-lt"/>
+                <a:cs typeface="Calibri Light" panose="020F0302020204030204" pitchFamily="34" charset="0"/>
+                <a:sym typeface="Wingdings" panose="05000000000000000000" pitchFamily="2" charset="2"/>
+              </a:rPr>
+              <a:t>doc.classList.contains</a:t>
+            </a:r>
+            <a:r>
+              <a:rPr lang="en-US" sz="2800" kern="0" dirty="0">
+                <a:latin typeface="+mn-lt"/>
+                <a:cs typeface="Calibri Light" panose="020F0302020204030204" pitchFamily="34" charset="0"/>
+                <a:sym typeface="Wingdings" panose="05000000000000000000" pitchFamily="2" charset="2"/>
+              </a:rPr>
+              <a:t>(‘present’); //returns true or false</a:t>
+            </a:r>
+          </a:p>
+        </p:txBody>
+      </p:sp>
+    </p:spTree>
+    <p:extLst>
+      <p:ext uri="{BB962C8B-B14F-4D97-AF65-F5344CB8AC3E}">
+        <p14:creationId xmlns:p14="http://schemas.microsoft.com/office/powerpoint/2010/main" val="2598095397"/>
+      </p:ext>
+    </p:extLst>
+  </p:cSld>
+  <p:clrMapOvr>
+    <a:masterClrMapping/>
+  </p:clrMapOvr>
+</p:sld>
+</file>
+
+<file path=ppt/slides/slide41.xml><?xml version="1.0" encoding="utf-8"?>
+<p:sld xmlns:a="http://schemas.openxmlformats.org/drawingml/2006/main" xmlns:r="http://schemas.openxmlformats.org/officeDocument/2006/relationships" xmlns:p="http://schemas.openxmlformats.org/presentationml/2006/main">
+  <p:cSld>
+    <p:spTree>
+      <p:nvGrpSpPr>
+        <p:cNvPr id="1" name=""/>
+        <p:cNvGrpSpPr/>
+        <p:nvPr/>
+      </p:nvGrpSpPr>
+      <p:grpSpPr>
+        <a:xfrm>
+          <a:off x="0" y="0"/>
+          <a:ext cx="0" cy="0"/>
+          <a:chOff x="0" y="0"/>
+          <a:chExt cx="0" cy="0"/>
+        </a:xfrm>
+      </p:grpSpPr>
+      <p:sp>
+        <p:nvSpPr>
+          <p:cNvPr id="2" name="object 2"/>
+          <p:cNvSpPr/>
+          <p:nvPr/>
+        </p:nvSpPr>
+        <p:spPr>
+          <a:xfrm>
+            <a:off x="-36871" y="-36871"/>
+            <a:ext cx="12191999" cy="7118601"/>
+          </a:xfrm>
+          <a:prstGeom prst="rect">
+            <a:avLst/>
+          </a:prstGeom>
+          <a:blipFill>
+            <a:blip r:embed="rId2" cstate="print"/>
+            <a:stretch>
+              <a:fillRect/>
+            </a:stretch>
+          </a:blipFill>
+        </p:spPr>
+        <p:txBody>
+          <a:bodyPr wrap="square" lIns="0" tIns="0" rIns="0" bIns="0" rtlCol="0"/>
+          <a:lstStyle/>
+          <a:p>
+            <a:endParaRPr b="1" dirty="0">
+              <a:ln w="13462">
+                <a:solidFill>
+                  <a:schemeClr val="bg1"/>
+                </a:solidFill>
+                <a:prstDash val="solid"/>
+              </a:ln>
+              <a:solidFill>
+                <a:schemeClr val="tx1">
+                  <a:lumMod val="85000"/>
+                  <a:lumOff val="15000"/>
+                </a:schemeClr>
+              </a:solidFill>
+              <a:effectLst>
+                <a:outerShdw dist="38100" dir="2700000" algn="bl" rotWithShape="0">
+                  <a:schemeClr val="accent5"/>
+                </a:outerShdw>
+              </a:effectLst>
+            </a:endParaRPr>
+          </a:p>
+        </p:txBody>
+      </p:sp>
+      <p:sp>
+        <p:nvSpPr>
+          <p:cNvPr id="3" name="object 3"/>
+          <p:cNvSpPr txBox="1">
+            <a:spLocks noGrp="1"/>
+          </p:cNvSpPr>
+          <p:nvPr>
+            <p:ph type="title"/>
+          </p:nvPr>
+        </p:nvSpPr>
+        <p:spPr>
+          <a:xfrm>
+            <a:off x="481685" y="304800"/>
+            <a:ext cx="8967115" cy="566181"/>
+          </a:xfrm>
+          <a:prstGeom prst="rect">
+            <a:avLst/>
+          </a:prstGeom>
+        </p:spPr>
+        <p:txBody>
+          <a:bodyPr vert="horz" wrap="square" lIns="0" tIns="12065" rIns="0" bIns="0" rtlCol="0">
+            <a:spAutoFit/>
+          </a:bodyPr>
+          <a:lstStyle/>
+          <a:p>
+            <a:pPr marL="12700">
+              <a:spcBef>
+                <a:spcPts val="95"/>
+              </a:spcBef>
+            </a:pPr>
+            <a:r>
+              <a:rPr lang="en-US" sz="3600" kern="0" dirty="0">
+                <a:latin typeface="+mn-lt"/>
+                <a:cs typeface="Calibri Light" panose="020F0302020204030204" pitchFamily="34" charset="0"/>
+                <a:sym typeface="Wingdings" panose="05000000000000000000" pitchFamily="2" charset="2"/>
+              </a:rPr>
+              <a:t>Dom Tree Traversing</a:t>
+            </a:r>
+          </a:p>
+        </p:txBody>
+      </p:sp>
+      <p:sp>
+        <p:nvSpPr>
+          <p:cNvPr id="5" name="object 5"/>
+          <p:cNvSpPr/>
+          <p:nvPr/>
+        </p:nvSpPr>
+        <p:spPr>
+          <a:xfrm>
+            <a:off x="9816083" y="262127"/>
+            <a:ext cx="1976627" cy="822960"/>
+          </a:xfrm>
+          <a:prstGeom prst="rect">
+            <a:avLst/>
+          </a:prstGeom>
+          <a:blipFill>
+            <a:blip r:embed="rId3" cstate="print"/>
+            <a:stretch>
+              <a:fillRect/>
+            </a:stretch>
+          </a:blipFill>
+        </p:spPr>
+        <p:txBody>
+          <a:bodyPr wrap="square" lIns="0" tIns="0" rIns="0" bIns="0" rtlCol="0"/>
+          <a:lstStyle/>
+          <a:p>
+            <a:endParaRPr/>
+          </a:p>
+        </p:txBody>
+      </p:sp>
+      <p:sp>
+        <p:nvSpPr>
+          <p:cNvPr id="4" name="object 3">
+            <a:extLst>
+              <a:ext uri="{FF2B5EF4-FFF2-40B4-BE49-F238E27FC236}">
+                <a16:creationId xmlns:a16="http://schemas.microsoft.com/office/drawing/2014/main" id="{1ED9D45B-4B0D-FC76-3A8C-E89F6CD72254}"/>
+              </a:ext>
+            </a:extLst>
+          </p:cNvPr>
+          <p:cNvSpPr txBox="1">
+            <a:spLocks/>
+          </p:cNvSpPr>
+          <p:nvPr/>
+        </p:nvSpPr>
+        <p:spPr>
+          <a:xfrm>
+            <a:off x="533400" y="838200"/>
+            <a:ext cx="11621728" cy="5077672"/>
+          </a:xfrm>
+          <a:prstGeom prst="rect">
+            <a:avLst/>
+          </a:prstGeom>
+        </p:spPr>
+        <p:txBody>
+          <a:bodyPr vert="horz" wrap="square" lIns="0" tIns="12065" rIns="0" bIns="0" rtlCol="0">
+            <a:spAutoFit/>
+          </a:bodyPr>
+          <a:lstStyle>
+            <a:lvl1pPr>
+              <a:defRPr sz="6000" b="0" i="0">
+                <a:solidFill>
+                  <a:srgbClr val="E7E6E6"/>
+                </a:solidFill>
+                <a:latin typeface="Trebuchet MS"/>
+                <a:ea typeface="+mj-ea"/>
+                <a:cs typeface="Trebuchet MS"/>
+              </a:defRPr>
+            </a:lvl1pPr>
+          </a:lstStyle>
+          <a:p>
+            <a:pPr marL="12700">
+              <a:spcBef>
+                <a:spcPts val="95"/>
+              </a:spcBef>
+            </a:pPr>
+            <a:r>
+              <a:rPr lang="en-US" sz="2800" kern="0" dirty="0">
+                <a:latin typeface="+mn-lt"/>
+                <a:cs typeface="Calibri Light" panose="020F0302020204030204" pitchFamily="34" charset="0"/>
+                <a:sym typeface="Wingdings" panose="05000000000000000000" pitchFamily="2" charset="2"/>
+              </a:rPr>
+              <a:t>To access the child elements of parent tag we have to use </a:t>
+            </a:r>
+          </a:p>
+          <a:p>
+            <a:pPr marL="12700">
+              <a:spcBef>
+                <a:spcPts val="95"/>
+              </a:spcBef>
+            </a:pPr>
+            <a:r>
+              <a:rPr lang="en-US" sz="2800" kern="0" dirty="0">
+                <a:latin typeface="+mn-lt"/>
+                <a:cs typeface="Calibri Light" panose="020F0302020204030204" pitchFamily="34" charset="0"/>
+                <a:sym typeface="Wingdings" panose="05000000000000000000" pitchFamily="2" charset="2"/>
+              </a:rPr>
+              <a:t>.children </a:t>
+            </a:r>
           </a:p>
           <a:p>
             <a:pPr marL="12700">
@@ -17042,6 +17426,1031 @@
                 <a:spcPts val="95"/>
               </a:spcBef>
             </a:pPr>
+            <a:r>
+              <a:rPr lang="en-US" sz="2400" kern="0" dirty="0">
+                <a:latin typeface="Consolas" panose="020B0609020204030204" pitchFamily="49" charset="0"/>
+                <a:cs typeface="Calibri Light" panose="020F0302020204030204" pitchFamily="34" charset="0"/>
+                <a:sym typeface="Wingdings" panose="05000000000000000000" pitchFamily="2" charset="2"/>
+              </a:rPr>
+              <a:t>let parent = </a:t>
+            </a:r>
+            <a:r>
+              <a:rPr lang="en-US" sz="2400" kern="0" dirty="0" err="1">
+                <a:latin typeface="Consolas" panose="020B0609020204030204" pitchFamily="49" charset="0"/>
+                <a:cs typeface="Calibri Light" panose="020F0302020204030204" pitchFamily="34" charset="0"/>
+                <a:sym typeface="Wingdings" panose="05000000000000000000" pitchFamily="2" charset="2"/>
+              </a:rPr>
+              <a:t>doc.querySelector</a:t>
+            </a:r>
+            <a:r>
+              <a:rPr lang="en-US" sz="2400" kern="0" dirty="0">
+                <a:latin typeface="Consolas" panose="020B0609020204030204" pitchFamily="49" charset="0"/>
+                <a:cs typeface="Calibri Light" panose="020F0302020204030204" pitchFamily="34" charset="0"/>
+                <a:sym typeface="Wingdings" panose="05000000000000000000" pitchFamily="2" charset="2"/>
+              </a:rPr>
+              <a:t>(‘.parent’);</a:t>
+            </a:r>
+          </a:p>
+          <a:p>
+            <a:pPr marL="12700">
+              <a:spcBef>
+                <a:spcPts val="95"/>
+              </a:spcBef>
+            </a:pPr>
+            <a:r>
+              <a:rPr lang="en-US" sz="2400" kern="0" dirty="0" err="1">
+                <a:latin typeface="Consolas" panose="020B0609020204030204" pitchFamily="49" charset="0"/>
+                <a:cs typeface="Calibri Light" panose="020F0302020204030204" pitchFamily="34" charset="0"/>
+                <a:sym typeface="Wingdings" panose="05000000000000000000" pitchFamily="2" charset="2"/>
+              </a:rPr>
+              <a:t>parent.children</a:t>
+            </a:r>
+            <a:r>
+              <a:rPr lang="en-US" sz="2400" kern="0" dirty="0">
+                <a:latin typeface="Consolas" panose="020B0609020204030204" pitchFamily="49" charset="0"/>
+                <a:cs typeface="Calibri Light" panose="020F0302020204030204" pitchFamily="34" charset="0"/>
+                <a:sym typeface="Wingdings" panose="05000000000000000000" pitchFamily="2" charset="2"/>
+              </a:rPr>
+              <a:t>; // gives HTML collection array</a:t>
+            </a:r>
+          </a:p>
+          <a:p>
+            <a:pPr marL="12700">
+              <a:spcBef>
+                <a:spcPts val="95"/>
+              </a:spcBef>
+            </a:pPr>
+            <a:r>
+              <a:rPr lang="en-US" sz="2400" kern="0" dirty="0" err="1">
+                <a:latin typeface="Consolas" panose="020B0609020204030204" pitchFamily="49" charset="0"/>
+                <a:cs typeface="Calibri Light" panose="020F0302020204030204" pitchFamily="34" charset="0"/>
+                <a:sym typeface="Wingdings" panose="05000000000000000000" pitchFamily="2" charset="2"/>
+              </a:rPr>
+              <a:t>parent.children</a:t>
+            </a:r>
+            <a:r>
+              <a:rPr lang="en-US" sz="2400" kern="0" dirty="0">
+                <a:latin typeface="Consolas" panose="020B0609020204030204" pitchFamily="49" charset="0"/>
+                <a:cs typeface="Calibri Light" panose="020F0302020204030204" pitchFamily="34" charset="0"/>
+                <a:sym typeface="Wingdings" panose="05000000000000000000" pitchFamily="2" charset="2"/>
+              </a:rPr>
+              <a:t>[1];//gives specific element</a:t>
+            </a:r>
+          </a:p>
+          <a:p>
+            <a:pPr marL="12700">
+              <a:spcBef>
+                <a:spcPts val="95"/>
+              </a:spcBef>
+            </a:pPr>
+            <a:endParaRPr lang="en-US" sz="2000" kern="0" dirty="0">
+              <a:latin typeface="Consolas" panose="020B0609020204030204" pitchFamily="49" charset="0"/>
+              <a:cs typeface="Calibri Light" panose="020F0302020204030204" pitchFamily="34" charset="0"/>
+              <a:sym typeface="Wingdings" panose="05000000000000000000" pitchFamily="2" charset="2"/>
+            </a:endParaRPr>
+          </a:p>
+          <a:p>
+            <a:pPr marL="12700">
+              <a:spcBef>
+                <a:spcPts val="95"/>
+              </a:spcBef>
+            </a:pPr>
+            <a:r>
+              <a:rPr lang="en-US" sz="2800" kern="0" dirty="0">
+                <a:latin typeface="+mn-lt"/>
+                <a:cs typeface="Calibri Light" panose="020F0302020204030204" pitchFamily="34" charset="0"/>
+                <a:sym typeface="Wingdings" panose="05000000000000000000" pitchFamily="2" charset="2"/>
+              </a:rPr>
+              <a:t>Similarly, we can access parent from child elements</a:t>
+            </a:r>
+          </a:p>
+          <a:p>
+            <a:pPr marL="12700">
+              <a:spcBef>
+                <a:spcPts val="95"/>
+              </a:spcBef>
+            </a:pPr>
+            <a:r>
+              <a:rPr lang="en-US" sz="2400" kern="0" dirty="0">
+                <a:latin typeface="Consolas" panose="020B0609020204030204" pitchFamily="49" charset="0"/>
+                <a:cs typeface="Calibri Light" panose="020F0302020204030204" pitchFamily="34" charset="0"/>
+                <a:sym typeface="Wingdings" panose="05000000000000000000" pitchFamily="2" charset="2"/>
+              </a:rPr>
+              <a:t>let child = </a:t>
+            </a:r>
+            <a:r>
+              <a:rPr lang="en-US" sz="2400" kern="0" dirty="0" err="1">
+                <a:latin typeface="Consolas" panose="020B0609020204030204" pitchFamily="49" charset="0"/>
+                <a:cs typeface="Calibri Light" panose="020F0302020204030204" pitchFamily="34" charset="0"/>
+                <a:sym typeface="Wingdings" panose="05000000000000000000" pitchFamily="2" charset="2"/>
+              </a:rPr>
+              <a:t>doc.querySelector</a:t>
+            </a:r>
+            <a:r>
+              <a:rPr lang="en-US" sz="2400" kern="0" dirty="0">
+                <a:latin typeface="Consolas" panose="020B0609020204030204" pitchFamily="49" charset="0"/>
+                <a:cs typeface="Calibri Light" panose="020F0302020204030204" pitchFamily="34" charset="0"/>
+                <a:sym typeface="Wingdings" panose="05000000000000000000" pitchFamily="2" charset="2"/>
+              </a:rPr>
+              <a:t>(‘.day’);</a:t>
+            </a:r>
+          </a:p>
+          <a:p>
+            <a:pPr marL="12700">
+              <a:spcBef>
+                <a:spcPts val="95"/>
+              </a:spcBef>
+            </a:pPr>
+            <a:r>
+              <a:rPr lang="en-US" sz="2400" kern="0" dirty="0" err="1">
+                <a:latin typeface="Consolas" panose="020B0609020204030204" pitchFamily="49" charset="0"/>
+                <a:cs typeface="Calibri Light" panose="020F0302020204030204" pitchFamily="34" charset="0"/>
+                <a:sym typeface="Wingdings" panose="05000000000000000000" pitchFamily="2" charset="2"/>
+              </a:rPr>
+              <a:t>child.parentElement</a:t>
+            </a:r>
+            <a:r>
+              <a:rPr lang="en-US" sz="2400" kern="0" dirty="0">
+                <a:latin typeface="Consolas" panose="020B0609020204030204" pitchFamily="49" charset="0"/>
+                <a:cs typeface="Calibri Light" panose="020F0302020204030204" pitchFamily="34" charset="0"/>
+                <a:sym typeface="Wingdings" panose="05000000000000000000" pitchFamily="2" charset="2"/>
+              </a:rPr>
+              <a:t>; // gives parent element</a:t>
+            </a:r>
+          </a:p>
+          <a:p>
+            <a:pPr marL="12700">
+              <a:spcBef>
+                <a:spcPts val="95"/>
+              </a:spcBef>
+            </a:pPr>
+            <a:r>
+              <a:rPr lang="en-US" sz="2400" kern="0" dirty="0" err="1">
+                <a:latin typeface="Consolas" panose="020B0609020204030204" pitchFamily="49" charset="0"/>
+                <a:cs typeface="Calibri Light" panose="020F0302020204030204" pitchFamily="34" charset="0"/>
+                <a:sym typeface="Wingdings" panose="05000000000000000000" pitchFamily="2" charset="2"/>
+              </a:rPr>
+              <a:t>child.nextElementSibling</a:t>
+            </a:r>
+            <a:r>
+              <a:rPr lang="en-US" sz="2400" kern="0" dirty="0">
+                <a:latin typeface="Consolas" panose="020B0609020204030204" pitchFamily="49" charset="0"/>
+                <a:cs typeface="Calibri Light" panose="020F0302020204030204" pitchFamily="34" charset="0"/>
+                <a:sym typeface="Wingdings" panose="05000000000000000000" pitchFamily="2" charset="2"/>
+              </a:rPr>
+              <a:t>;// gives second sibling element of selected element</a:t>
+            </a:r>
+          </a:p>
+          <a:p>
+            <a:pPr marL="12700">
+              <a:spcBef>
+                <a:spcPts val="95"/>
+              </a:spcBef>
+            </a:pPr>
+            <a:endParaRPr lang="en-US" sz="2000" kern="0" dirty="0">
+              <a:latin typeface="Consolas" panose="020B0609020204030204" pitchFamily="49" charset="0"/>
+              <a:cs typeface="Calibri Light" panose="020F0302020204030204" pitchFamily="34" charset="0"/>
+              <a:sym typeface="Wingdings" panose="05000000000000000000" pitchFamily="2" charset="2"/>
+            </a:endParaRPr>
+          </a:p>
+        </p:txBody>
+      </p:sp>
+    </p:spTree>
+    <p:extLst>
+      <p:ext uri="{BB962C8B-B14F-4D97-AF65-F5344CB8AC3E}">
+        <p14:creationId xmlns:p14="http://schemas.microsoft.com/office/powerpoint/2010/main" val="3624862493"/>
+      </p:ext>
+    </p:extLst>
+  </p:cSld>
+  <p:clrMapOvr>
+    <a:masterClrMapping/>
+  </p:clrMapOvr>
+</p:sld>
+</file>
+
+<file path=ppt/slides/slide42.xml><?xml version="1.0" encoding="utf-8"?>
+<p:sld xmlns:a="http://schemas.openxmlformats.org/drawingml/2006/main" xmlns:r="http://schemas.openxmlformats.org/officeDocument/2006/relationships" xmlns:p="http://schemas.openxmlformats.org/presentationml/2006/main">
+  <p:cSld>
+    <p:spTree>
+      <p:nvGrpSpPr>
+        <p:cNvPr id="1" name=""/>
+        <p:cNvGrpSpPr/>
+        <p:nvPr/>
+      </p:nvGrpSpPr>
+      <p:grpSpPr>
+        <a:xfrm>
+          <a:off x="0" y="0"/>
+          <a:ext cx="0" cy="0"/>
+          <a:chOff x="0" y="0"/>
+          <a:chExt cx="0" cy="0"/>
+        </a:xfrm>
+      </p:grpSpPr>
+      <p:sp>
+        <p:nvSpPr>
+          <p:cNvPr id="2" name="object 2"/>
+          <p:cNvSpPr/>
+          <p:nvPr/>
+        </p:nvSpPr>
+        <p:spPr>
+          <a:xfrm>
+            <a:off x="-36871" y="-36871"/>
+            <a:ext cx="12191999" cy="7118601"/>
+          </a:xfrm>
+          <a:prstGeom prst="rect">
+            <a:avLst/>
+          </a:prstGeom>
+          <a:blipFill>
+            <a:blip r:embed="rId2" cstate="print"/>
+            <a:stretch>
+              <a:fillRect/>
+            </a:stretch>
+          </a:blipFill>
+        </p:spPr>
+        <p:txBody>
+          <a:bodyPr wrap="square" lIns="0" tIns="0" rIns="0" bIns="0" rtlCol="0"/>
+          <a:lstStyle/>
+          <a:p>
+            <a:endParaRPr b="1" dirty="0">
+              <a:ln w="13462">
+                <a:solidFill>
+                  <a:schemeClr val="bg1"/>
+                </a:solidFill>
+                <a:prstDash val="solid"/>
+              </a:ln>
+              <a:solidFill>
+                <a:schemeClr val="tx1">
+                  <a:lumMod val="85000"/>
+                  <a:lumOff val="15000"/>
+                </a:schemeClr>
+              </a:solidFill>
+              <a:effectLst>
+                <a:outerShdw dist="38100" dir="2700000" algn="bl" rotWithShape="0">
+                  <a:schemeClr val="accent5"/>
+                </a:outerShdw>
+              </a:effectLst>
+            </a:endParaRPr>
+          </a:p>
+        </p:txBody>
+      </p:sp>
+      <p:sp>
+        <p:nvSpPr>
+          <p:cNvPr id="3" name="object 3"/>
+          <p:cNvSpPr txBox="1">
+            <a:spLocks noGrp="1"/>
+          </p:cNvSpPr>
+          <p:nvPr>
+            <p:ph type="title"/>
+          </p:nvPr>
+        </p:nvSpPr>
+        <p:spPr>
+          <a:xfrm>
+            <a:off x="481685" y="304800"/>
+            <a:ext cx="8967115" cy="566181"/>
+          </a:xfrm>
+          <a:prstGeom prst="rect">
+            <a:avLst/>
+          </a:prstGeom>
+        </p:spPr>
+        <p:txBody>
+          <a:bodyPr vert="horz" wrap="square" lIns="0" tIns="12065" rIns="0" bIns="0" rtlCol="0">
+            <a:spAutoFit/>
+          </a:bodyPr>
+          <a:lstStyle/>
+          <a:p>
+            <a:pPr marL="12700">
+              <a:spcBef>
+                <a:spcPts val="95"/>
+              </a:spcBef>
+            </a:pPr>
+            <a:r>
+              <a:rPr lang="en-US" sz="3600" kern="0" dirty="0">
+                <a:latin typeface="+mn-lt"/>
+                <a:cs typeface="Calibri Light" panose="020F0302020204030204" pitchFamily="34" charset="0"/>
+                <a:sym typeface="Wingdings" panose="05000000000000000000" pitchFamily="2" charset="2"/>
+              </a:rPr>
+              <a:t>Adding Element in DOM</a:t>
+            </a:r>
+          </a:p>
+        </p:txBody>
+      </p:sp>
+      <p:sp>
+        <p:nvSpPr>
+          <p:cNvPr id="5" name="object 5"/>
+          <p:cNvSpPr/>
+          <p:nvPr/>
+        </p:nvSpPr>
+        <p:spPr>
+          <a:xfrm>
+            <a:off x="9816083" y="262127"/>
+            <a:ext cx="1976627" cy="822960"/>
+          </a:xfrm>
+          <a:prstGeom prst="rect">
+            <a:avLst/>
+          </a:prstGeom>
+          <a:blipFill>
+            <a:blip r:embed="rId3" cstate="print"/>
+            <a:stretch>
+              <a:fillRect/>
+            </a:stretch>
+          </a:blipFill>
+        </p:spPr>
+        <p:txBody>
+          <a:bodyPr wrap="square" lIns="0" tIns="0" rIns="0" bIns="0" rtlCol="0"/>
+          <a:lstStyle/>
+          <a:p>
+            <a:endParaRPr/>
+          </a:p>
+        </p:txBody>
+      </p:sp>
+      <p:sp>
+        <p:nvSpPr>
+          <p:cNvPr id="4" name="object 3">
+            <a:extLst>
+              <a:ext uri="{FF2B5EF4-FFF2-40B4-BE49-F238E27FC236}">
+                <a16:creationId xmlns:a16="http://schemas.microsoft.com/office/drawing/2014/main" id="{1ED9D45B-4B0D-FC76-3A8C-E89F6CD72254}"/>
+              </a:ext>
+            </a:extLst>
+          </p:cNvPr>
+          <p:cNvSpPr txBox="1">
+            <a:spLocks/>
+          </p:cNvSpPr>
+          <p:nvPr/>
+        </p:nvSpPr>
+        <p:spPr>
+          <a:xfrm>
+            <a:off x="533400" y="838200"/>
+            <a:ext cx="11621728" cy="4954561"/>
+          </a:xfrm>
+          <a:prstGeom prst="rect">
+            <a:avLst/>
+          </a:prstGeom>
+        </p:spPr>
+        <p:txBody>
+          <a:bodyPr vert="horz" wrap="square" lIns="0" tIns="12065" rIns="0" bIns="0" rtlCol="0">
+            <a:spAutoFit/>
+          </a:bodyPr>
+          <a:lstStyle>
+            <a:lvl1pPr>
+              <a:defRPr sz="6000" b="0" i="0">
+                <a:solidFill>
+                  <a:srgbClr val="E7E6E6"/>
+                </a:solidFill>
+                <a:latin typeface="Trebuchet MS"/>
+                <a:ea typeface="+mj-ea"/>
+                <a:cs typeface="Trebuchet MS"/>
+              </a:defRPr>
+            </a:lvl1pPr>
+          </a:lstStyle>
+          <a:p>
+            <a:pPr marL="12700">
+              <a:spcBef>
+                <a:spcPts val="95"/>
+              </a:spcBef>
+            </a:pPr>
+            <a:r>
+              <a:rPr lang="en-US" sz="2400" kern="0" dirty="0">
+                <a:solidFill>
+                  <a:schemeClr val="bg1">
+                    <a:lumMod val="75000"/>
+                  </a:schemeClr>
+                </a:solidFill>
+                <a:latin typeface="Consolas" panose="020B0609020204030204" pitchFamily="49" charset="0"/>
+                <a:cs typeface="Calibri Light" panose="020F0302020204030204" pitchFamily="34" charset="0"/>
+                <a:sym typeface="Wingdings" panose="05000000000000000000" pitchFamily="2" charset="2"/>
+              </a:rPr>
+              <a:t>1.//make element</a:t>
+            </a:r>
+          </a:p>
+          <a:p>
+            <a:pPr marL="12700">
+              <a:spcBef>
+                <a:spcPts val="95"/>
+              </a:spcBef>
+            </a:pPr>
+            <a:r>
+              <a:rPr lang="en-US" sz="2400" kern="0" dirty="0">
+                <a:latin typeface="Consolas" panose="020B0609020204030204" pitchFamily="49" charset="0"/>
+                <a:cs typeface="Calibri Light" panose="020F0302020204030204" pitchFamily="34" charset="0"/>
+                <a:sym typeface="Wingdings" panose="05000000000000000000" pitchFamily="2" charset="2"/>
+              </a:rPr>
+              <a:t>let </a:t>
+            </a:r>
+            <a:r>
+              <a:rPr lang="en-US" sz="2400" kern="0" dirty="0" err="1">
+                <a:latin typeface="Consolas" panose="020B0609020204030204" pitchFamily="49" charset="0"/>
+                <a:cs typeface="Calibri Light" panose="020F0302020204030204" pitchFamily="34" charset="0"/>
+                <a:sym typeface="Wingdings" panose="05000000000000000000" pitchFamily="2" charset="2"/>
+              </a:rPr>
+              <a:t>ele</a:t>
+            </a:r>
+            <a:r>
+              <a:rPr lang="en-US" sz="2400" kern="0" dirty="0">
+                <a:latin typeface="Consolas" panose="020B0609020204030204" pitchFamily="49" charset="0"/>
+                <a:cs typeface="Calibri Light" panose="020F0302020204030204" pitchFamily="34" charset="0"/>
+                <a:sym typeface="Wingdings" panose="05000000000000000000" pitchFamily="2" charset="2"/>
+              </a:rPr>
+              <a:t> = </a:t>
+            </a:r>
+            <a:r>
+              <a:rPr lang="en-US" sz="2400" kern="0" dirty="0" err="1">
+                <a:latin typeface="Consolas" panose="020B0609020204030204" pitchFamily="49" charset="0"/>
+                <a:cs typeface="Calibri Light" panose="020F0302020204030204" pitchFamily="34" charset="0"/>
+                <a:sym typeface="Wingdings" panose="05000000000000000000" pitchFamily="2" charset="2"/>
+              </a:rPr>
+              <a:t>doc.createElement</a:t>
+            </a:r>
+            <a:r>
+              <a:rPr lang="en-US" sz="2400" kern="0" dirty="0">
+                <a:latin typeface="Consolas" panose="020B0609020204030204" pitchFamily="49" charset="0"/>
+                <a:cs typeface="Calibri Light" panose="020F0302020204030204" pitchFamily="34" charset="0"/>
+                <a:sym typeface="Wingdings" panose="05000000000000000000" pitchFamily="2" charset="2"/>
+              </a:rPr>
+              <a:t>(‘div’);</a:t>
+            </a:r>
+          </a:p>
+          <a:p>
+            <a:pPr marL="12700">
+              <a:spcBef>
+                <a:spcPts val="95"/>
+              </a:spcBef>
+            </a:pPr>
+            <a:r>
+              <a:rPr lang="en-US" sz="2400" kern="0" dirty="0">
+                <a:solidFill>
+                  <a:schemeClr val="bg1">
+                    <a:lumMod val="75000"/>
+                  </a:schemeClr>
+                </a:solidFill>
+                <a:latin typeface="Consolas" panose="020B0609020204030204" pitchFamily="49" charset="0"/>
+                <a:cs typeface="Calibri Light" panose="020F0302020204030204" pitchFamily="34" charset="0"/>
+                <a:sym typeface="Wingdings" panose="05000000000000000000" pitchFamily="2" charset="2"/>
+              </a:rPr>
+              <a:t>2.//get the parent or children previously present</a:t>
+            </a:r>
+          </a:p>
+          <a:p>
+            <a:pPr marL="12700">
+              <a:spcBef>
+                <a:spcPts val="95"/>
+              </a:spcBef>
+            </a:pPr>
+            <a:r>
+              <a:rPr lang="en-US" sz="2400" kern="0" dirty="0">
+                <a:latin typeface="Consolas" panose="020B0609020204030204" pitchFamily="49" charset="0"/>
+                <a:cs typeface="Calibri Light" panose="020F0302020204030204" pitchFamily="34" charset="0"/>
+                <a:sym typeface="Wingdings" panose="05000000000000000000" pitchFamily="2" charset="2"/>
+              </a:rPr>
+              <a:t>let </a:t>
+            </a:r>
+            <a:r>
+              <a:rPr lang="en-US" sz="2400" kern="0" dirty="0" err="1">
+                <a:latin typeface="Consolas" panose="020B0609020204030204" pitchFamily="49" charset="0"/>
+                <a:cs typeface="Calibri Light" panose="020F0302020204030204" pitchFamily="34" charset="0"/>
+                <a:sym typeface="Wingdings" panose="05000000000000000000" pitchFamily="2" charset="2"/>
+              </a:rPr>
+              <a:t>presentEle</a:t>
+            </a:r>
+            <a:r>
+              <a:rPr lang="en-US" sz="2400" kern="0" dirty="0">
+                <a:latin typeface="Consolas" panose="020B0609020204030204" pitchFamily="49" charset="0"/>
+                <a:cs typeface="Calibri Light" panose="020F0302020204030204" pitchFamily="34" charset="0"/>
+                <a:sym typeface="Wingdings" panose="05000000000000000000" pitchFamily="2" charset="2"/>
+              </a:rPr>
+              <a:t> = </a:t>
+            </a:r>
+            <a:r>
+              <a:rPr lang="en-US" sz="2400" kern="0" dirty="0" err="1">
+                <a:latin typeface="Consolas" panose="020B0609020204030204" pitchFamily="49" charset="0"/>
+                <a:cs typeface="Calibri Light" panose="020F0302020204030204" pitchFamily="34" charset="0"/>
+                <a:sym typeface="Wingdings" panose="05000000000000000000" pitchFamily="2" charset="2"/>
+              </a:rPr>
+              <a:t>doc.getElementById</a:t>
+            </a:r>
+            <a:r>
+              <a:rPr lang="en-US" sz="2400" kern="0" dirty="0">
+                <a:latin typeface="Consolas" panose="020B0609020204030204" pitchFamily="49" charset="0"/>
+                <a:cs typeface="Calibri Light" panose="020F0302020204030204" pitchFamily="34" charset="0"/>
+                <a:sym typeface="Wingdings" panose="05000000000000000000" pitchFamily="2" charset="2"/>
+              </a:rPr>
+              <a:t>(‘parent’);</a:t>
+            </a:r>
+          </a:p>
+          <a:p>
+            <a:pPr marL="12700">
+              <a:spcBef>
+                <a:spcPts val="95"/>
+              </a:spcBef>
+            </a:pPr>
+            <a:r>
+              <a:rPr lang="en-US" sz="2400" kern="0" dirty="0">
+                <a:solidFill>
+                  <a:schemeClr val="bg1">
+                    <a:lumMod val="75000"/>
+                  </a:schemeClr>
+                </a:solidFill>
+                <a:latin typeface="Consolas" panose="020B0609020204030204" pitchFamily="49" charset="0"/>
+                <a:cs typeface="Calibri Light" panose="020F0302020204030204" pitchFamily="34" charset="0"/>
+                <a:sym typeface="Wingdings" panose="05000000000000000000" pitchFamily="2" charset="2"/>
+              </a:rPr>
+              <a:t>3.//insert content in the element</a:t>
+            </a:r>
+          </a:p>
+          <a:p>
+            <a:pPr marL="12700">
+              <a:spcBef>
+                <a:spcPts val="95"/>
+              </a:spcBef>
+            </a:pPr>
+            <a:r>
+              <a:rPr lang="en-US" sz="2400" kern="0" dirty="0" err="1">
+                <a:latin typeface="Consolas" panose="020B0609020204030204" pitchFamily="49" charset="0"/>
+                <a:cs typeface="Calibri Light" panose="020F0302020204030204" pitchFamily="34" charset="0"/>
+                <a:sym typeface="Wingdings" panose="05000000000000000000" pitchFamily="2" charset="2"/>
+              </a:rPr>
+              <a:t>ele.innerText</a:t>
+            </a:r>
+            <a:r>
+              <a:rPr lang="en-US" sz="2400" kern="0" dirty="0">
+                <a:latin typeface="Consolas" panose="020B0609020204030204" pitchFamily="49" charset="0"/>
+                <a:cs typeface="Calibri Light" panose="020F0302020204030204" pitchFamily="34" charset="0"/>
+                <a:sym typeface="Wingdings" panose="05000000000000000000" pitchFamily="2" charset="2"/>
+              </a:rPr>
+              <a:t> = “some content”;</a:t>
+            </a:r>
+          </a:p>
+          <a:p>
+            <a:pPr marL="12700">
+              <a:spcBef>
+                <a:spcPts val="95"/>
+              </a:spcBef>
+            </a:pPr>
+            <a:r>
+              <a:rPr lang="en-US" sz="2400" kern="0" dirty="0">
+                <a:solidFill>
+                  <a:schemeClr val="bg1">
+                    <a:lumMod val="75000"/>
+                  </a:schemeClr>
+                </a:solidFill>
+                <a:latin typeface="Consolas" panose="020B0609020204030204" pitchFamily="49" charset="0"/>
+                <a:cs typeface="Calibri Light" panose="020F0302020204030204" pitchFamily="34" charset="0"/>
+                <a:sym typeface="Wingdings" panose="05000000000000000000" pitchFamily="2" charset="2"/>
+              </a:rPr>
+              <a:t>4.//append it to the parent(previous element present)</a:t>
+            </a:r>
+          </a:p>
+          <a:p>
+            <a:pPr marL="12700">
+              <a:spcBef>
+                <a:spcPts val="95"/>
+              </a:spcBef>
+            </a:pPr>
+            <a:r>
+              <a:rPr lang="en-US" sz="2400" kern="0" dirty="0" err="1">
+                <a:latin typeface="Consolas" panose="020B0609020204030204" pitchFamily="49" charset="0"/>
+                <a:cs typeface="Calibri Light" panose="020F0302020204030204" pitchFamily="34" charset="0"/>
+                <a:sym typeface="Wingdings" panose="05000000000000000000" pitchFamily="2" charset="2"/>
+              </a:rPr>
+              <a:t>presentEle.appendChild</a:t>
+            </a:r>
+            <a:r>
+              <a:rPr lang="en-US" sz="2400" kern="0" dirty="0">
+                <a:latin typeface="Consolas" panose="020B0609020204030204" pitchFamily="49" charset="0"/>
+                <a:cs typeface="Calibri Light" panose="020F0302020204030204" pitchFamily="34" charset="0"/>
+                <a:sym typeface="Wingdings" panose="05000000000000000000" pitchFamily="2" charset="2"/>
+              </a:rPr>
+              <a:t>(</a:t>
+            </a:r>
+            <a:r>
+              <a:rPr lang="en-US" sz="2400" kern="0" dirty="0" err="1">
+                <a:latin typeface="Consolas" panose="020B0609020204030204" pitchFamily="49" charset="0"/>
+                <a:cs typeface="Calibri Light" panose="020F0302020204030204" pitchFamily="34" charset="0"/>
+                <a:sym typeface="Wingdings" panose="05000000000000000000" pitchFamily="2" charset="2"/>
+              </a:rPr>
+              <a:t>ele</a:t>
+            </a:r>
+            <a:r>
+              <a:rPr lang="en-US" sz="2400" kern="0" dirty="0">
+                <a:latin typeface="Consolas" panose="020B0609020204030204" pitchFamily="49" charset="0"/>
+                <a:cs typeface="Calibri Light" panose="020F0302020204030204" pitchFamily="34" charset="0"/>
+                <a:sym typeface="Wingdings" panose="05000000000000000000" pitchFamily="2" charset="2"/>
+              </a:rPr>
+              <a:t>);</a:t>
+            </a:r>
+          </a:p>
+          <a:p>
+            <a:pPr marL="12700">
+              <a:spcBef>
+                <a:spcPts val="95"/>
+              </a:spcBef>
+            </a:pPr>
+            <a:endParaRPr lang="en-US" sz="2400" kern="0" dirty="0">
+              <a:latin typeface="Consolas" panose="020B0609020204030204" pitchFamily="49" charset="0"/>
+              <a:cs typeface="Calibri Light" panose="020F0302020204030204" pitchFamily="34" charset="0"/>
+              <a:sym typeface="Wingdings" panose="05000000000000000000" pitchFamily="2" charset="2"/>
+            </a:endParaRPr>
+          </a:p>
+          <a:p>
+            <a:pPr marL="12700">
+              <a:spcBef>
+                <a:spcPts val="95"/>
+              </a:spcBef>
+            </a:pPr>
+            <a:r>
+              <a:rPr lang="en-US" sz="2800" kern="0" dirty="0">
+                <a:latin typeface="+mn-lt"/>
+                <a:cs typeface="Calibri Light" panose="020F0302020204030204" pitchFamily="34" charset="0"/>
+                <a:sym typeface="Wingdings" panose="05000000000000000000" pitchFamily="2" charset="2"/>
+              </a:rPr>
+              <a:t>To input multiple </a:t>
+            </a:r>
+            <a:r>
+              <a:rPr lang="en-US" sz="2800" kern="0" dirty="0" err="1">
+                <a:latin typeface="+mn-lt"/>
+                <a:cs typeface="Calibri Light" panose="020F0302020204030204" pitchFamily="34" charset="0"/>
+                <a:sym typeface="Wingdings" panose="05000000000000000000" pitchFamily="2" charset="2"/>
+              </a:rPr>
+              <a:t>childs</a:t>
+            </a:r>
+            <a:r>
+              <a:rPr lang="en-US" sz="2800" kern="0" dirty="0">
+                <a:latin typeface="+mn-lt"/>
+                <a:cs typeface="Calibri Light" panose="020F0302020204030204" pitchFamily="34" charset="0"/>
+                <a:sym typeface="Wingdings" panose="05000000000000000000" pitchFamily="2" charset="2"/>
+              </a:rPr>
+              <a:t> we can use .append</a:t>
+            </a:r>
+          </a:p>
+          <a:p>
+            <a:pPr marL="12700">
+              <a:spcBef>
+                <a:spcPts val="95"/>
+              </a:spcBef>
+            </a:pPr>
+            <a:r>
+              <a:rPr lang="en-US" sz="2800" kern="0" dirty="0">
+                <a:latin typeface="+mn-lt"/>
+                <a:cs typeface="Calibri Light" panose="020F0302020204030204" pitchFamily="34" charset="0"/>
+                <a:sym typeface="Wingdings" panose="05000000000000000000" pitchFamily="2" charset="2"/>
+              </a:rPr>
+              <a:t>To remove elements we can use </a:t>
+            </a:r>
+            <a:r>
+              <a:rPr lang="en-US" sz="2800" kern="0" dirty="0" err="1">
+                <a:latin typeface="+mn-lt"/>
+                <a:cs typeface="Calibri Light" panose="020F0302020204030204" pitchFamily="34" charset="0"/>
+                <a:sym typeface="Wingdings" panose="05000000000000000000" pitchFamily="2" charset="2"/>
+              </a:rPr>
+              <a:t>removeChild</a:t>
+            </a:r>
+            <a:r>
+              <a:rPr lang="en-US" sz="2800" kern="0" dirty="0">
+                <a:latin typeface="+mn-lt"/>
+                <a:cs typeface="Calibri Light" panose="020F0302020204030204" pitchFamily="34" charset="0"/>
+                <a:sym typeface="Wingdings" panose="05000000000000000000" pitchFamily="2" charset="2"/>
+              </a:rPr>
+              <a:t>();</a:t>
+            </a:r>
+          </a:p>
+          <a:p>
+            <a:pPr marL="12700">
+              <a:spcBef>
+                <a:spcPts val="95"/>
+              </a:spcBef>
+            </a:pPr>
+            <a:r>
+              <a:rPr lang="en-US" sz="2800" kern="0" dirty="0">
+                <a:latin typeface="+mn-lt"/>
+                <a:cs typeface="Calibri Light" panose="020F0302020204030204" pitchFamily="34" charset="0"/>
+                <a:sym typeface="Wingdings" panose="05000000000000000000" pitchFamily="2" charset="2"/>
+              </a:rPr>
+              <a:t>To directly remove use remove();</a:t>
+            </a:r>
+            <a:endParaRPr lang="en-US" sz="3200" kern="0" dirty="0">
+              <a:latin typeface="+mn-lt"/>
+              <a:cs typeface="Calibri Light" panose="020F0302020204030204" pitchFamily="34" charset="0"/>
+              <a:sym typeface="Wingdings" panose="05000000000000000000" pitchFamily="2" charset="2"/>
+            </a:endParaRPr>
+          </a:p>
+        </p:txBody>
+      </p:sp>
+    </p:spTree>
+    <p:extLst>
+      <p:ext uri="{BB962C8B-B14F-4D97-AF65-F5344CB8AC3E}">
+        <p14:creationId xmlns:p14="http://schemas.microsoft.com/office/powerpoint/2010/main" val="2613100490"/>
+      </p:ext>
+    </p:extLst>
+  </p:cSld>
+  <p:clrMapOvr>
+    <a:masterClrMapping/>
+  </p:clrMapOvr>
+</p:sld>
+</file>
+
+<file path=ppt/slides/slide43.xml><?xml version="1.0" encoding="utf-8"?>
+<p:sld xmlns:a="http://schemas.openxmlformats.org/drawingml/2006/main" xmlns:r="http://schemas.openxmlformats.org/officeDocument/2006/relationships" xmlns:p="http://schemas.openxmlformats.org/presentationml/2006/main">
+  <p:cSld>
+    <p:spTree>
+      <p:nvGrpSpPr>
+        <p:cNvPr id="1" name=""/>
+        <p:cNvGrpSpPr/>
+        <p:nvPr/>
+      </p:nvGrpSpPr>
+      <p:grpSpPr>
+        <a:xfrm>
+          <a:off x="0" y="0"/>
+          <a:ext cx="0" cy="0"/>
+          <a:chOff x="0" y="0"/>
+          <a:chExt cx="0" cy="0"/>
+        </a:xfrm>
+      </p:grpSpPr>
+      <p:sp>
+        <p:nvSpPr>
+          <p:cNvPr id="2" name="object 2"/>
+          <p:cNvSpPr/>
+          <p:nvPr/>
+        </p:nvSpPr>
+        <p:spPr>
+          <a:xfrm>
+            <a:off x="-36871" y="-36871"/>
+            <a:ext cx="12191999" cy="7118601"/>
+          </a:xfrm>
+          <a:prstGeom prst="rect">
+            <a:avLst/>
+          </a:prstGeom>
+          <a:blipFill>
+            <a:blip r:embed="rId2" cstate="print"/>
+            <a:stretch>
+              <a:fillRect/>
+            </a:stretch>
+          </a:blipFill>
+        </p:spPr>
+        <p:txBody>
+          <a:bodyPr wrap="square" lIns="0" tIns="0" rIns="0" bIns="0" rtlCol="0"/>
+          <a:lstStyle/>
+          <a:p>
+            <a:endParaRPr b="1" dirty="0">
+              <a:ln w="13462">
+                <a:solidFill>
+                  <a:schemeClr val="bg1"/>
+                </a:solidFill>
+                <a:prstDash val="solid"/>
+              </a:ln>
+              <a:solidFill>
+                <a:schemeClr val="tx1">
+                  <a:lumMod val="85000"/>
+                  <a:lumOff val="15000"/>
+                </a:schemeClr>
+              </a:solidFill>
+              <a:effectLst>
+                <a:outerShdw dist="38100" dir="2700000" algn="bl" rotWithShape="0">
+                  <a:schemeClr val="accent5"/>
+                </a:outerShdw>
+              </a:effectLst>
+            </a:endParaRPr>
+          </a:p>
+        </p:txBody>
+      </p:sp>
+      <p:sp>
+        <p:nvSpPr>
+          <p:cNvPr id="3" name="object 3"/>
+          <p:cNvSpPr txBox="1">
+            <a:spLocks noGrp="1"/>
+          </p:cNvSpPr>
+          <p:nvPr>
+            <p:ph type="title"/>
+          </p:nvPr>
+        </p:nvSpPr>
+        <p:spPr>
+          <a:xfrm>
+            <a:off x="481685" y="304800"/>
+            <a:ext cx="8967115" cy="566181"/>
+          </a:xfrm>
+          <a:prstGeom prst="rect">
+            <a:avLst/>
+          </a:prstGeom>
+        </p:spPr>
+        <p:txBody>
+          <a:bodyPr vert="horz" wrap="square" lIns="0" tIns="12065" rIns="0" bIns="0" rtlCol="0">
+            <a:spAutoFit/>
+          </a:bodyPr>
+          <a:lstStyle/>
+          <a:p>
+            <a:pPr marL="12700">
+              <a:spcBef>
+                <a:spcPts val="95"/>
+              </a:spcBef>
+            </a:pPr>
+            <a:r>
+              <a:rPr lang="en-US" sz="3600" kern="0" dirty="0">
+                <a:latin typeface="+mn-lt"/>
+                <a:cs typeface="Calibri Light" panose="020F0302020204030204" pitchFamily="34" charset="0"/>
+                <a:sym typeface="Wingdings" panose="05000000000000000000" pitchFamily="2" charset="2"/>
+              </a:rPr>
+              <a:t>DOM Events</a:t>
+            </a:r>
+          </a:p>
+        </p:txBody>
+      </p:sp>
+      <p:sp>
+        <p:nvSpPr>
+          <p:cNvPr id="5" name="object 5"/>
+          <p:cNvSpPr/>
+          <p:nvPr/>
+        </p:nvSpPr>
+        <p:spPr>
+          <a:xfrm>
+            <a:off x="9816083" y="262127"/>
+            <a:ext cx="1976627" cy="822960"/>
+          </a:xfrm>
+          <a:prstGeom prst="rect">
+            <a:avLst/>
+          </a:prstGeom>
+          <a:blipFill>
+            <a:blip r:embed="rId3" cstate="print"/>
+            <a:stretch>
+              <a:fillRect/>
+            </a:stretch>
+          </a:blipFill>
+        </p:spPr>
+        <p:txBody>
+          <a:bodyPr wrap="square" lIns="0" tIns="0" rIns="0" bIns="0" rtlCol="0"/>
+          <a:lstStyle/>
+          <a:p>
+            <a:endParaRPr/>
+          </a:p>
+        </p:txBody>
+      </p:sp>
+      <p:sp>
+        <p:nvSpPr>
+          <p:cNvPr id="4" name="object 3">
+            <a:extLst>
+              <a:ext uri="{FF2B5EF4-FFF2-40B4-BE49-F238E27FC236}">
+                <a16:creationId xmlns:a16="http://schemas.microsoft.com/office/drawing/2014/main" id="{1ED9D45B-4B0D-FC76-3A8C-E89F6CD72254}"/>
+              </a:ext>
+            </a:extLst>
+          </p:cNvPr>
+          <p:cNvSpPr txBox="1">
+            <a:spLocks/>
+          </p:cNvSpPr>
+          <p:nvPr/>
+        </p:nvSpPr>
+        <p:spPr>
+          <a:xfrm>
+            <a:off x="533400" y="838200"/>
+            <a:ext cx="11621728" cy="5398273"/>
+          </a:xfrm>
+          <a:prstGeom prst="rect">
+            <a:avLst/>
+          </a:prstGeom>
+        </p:spPr>
+        <p:txBody>
+          <a:bodyPr vert="horz" wrap="square" lIns="0" tIns="12065" rIns="0" bIns="0" rtlCol="0">
+            <a:spAutoFit/>
+          </a:bodyPr>
+          <a:lstStyle>
+            <a:lvl1pPr>
+              <a:defRPr sz="6000" b="0" i="0">
+                <a:solidFill>
+                  <a:srgbClr val="E7E6E6"/>
+                </a:solidFill>
+                <a:latin typeface="Trebuchet MS"/>
+                <a:ea typeface="+mj-ea"/>
+                <a:cs typeface="Trebuchet MS"/>
+              </a:defRPr>
+            </a:lvl1pPr>
+          </a:lstStyle>
+          <a:p>
+            <a:pPr marL="12700">
+              <a:spcBef>
+                <a:spcPts val="95"/>
+              </a:spcBef>
+            </a:pPr>
+            <a:r>
+              <a:rPr lang="en-US" sz="2800" kern="0" dirty="0">
+                <a:latin typeface="+mn-lt"/>
+                <a:cs typeface="Calibri Light" panose="020F0302020204030204" pitchFamily="34" charset="0"/>
+                <a:sym typeface="Wingdings" panose="05000000000000000000" pitchFamily="2" charset="2"/>
+              </a:rPr>
+              <a:t>Actions that happen in HTML document.</a:t>
+            </a:r>
+          </a:p>
+          <a:p>
+            <a:pPr marL="527050" indent="-514350">
+              <a:spcBef>
+                <a:spcPts val="95"/>
+              </a:spcBef>
+              <a:buAutoNum type="arabicPeriod"/>
+            </a:pPr>
+            <a:r>
+              <a:rPr lang="en-US" sz="2800" kern="0" dirty="0">
+                <a:latin typeface="+mn-lt"/>
+                <a:cs typeface="Calibri Light" panose="020F0302020204030204" pitchFamily="34" charset="0"/>
+                <a:sym typeface="Wingdings" panose="05000000000000000000" pitchFamily="2" charset="2"/>
+              </a:rPr>
+              <a:t>Inline: onclick as attribute</a:t>
+            </a:r>
+          </a:p>
+          <a:p>
+            <a:pPr marL="527050" indent="-514350">
+              <a:spcBef>
+                <a:spcPts val="95"/>
+              </a:spcBef>
+              <a:buAutoNum type="arabicPeriod"/>
+            </a:pPr>
+            <a:r>
+              <a:rPr lang="en-US" sz="2800" kern="0" dirty="0">
+                <a:latin typeface="+mn-lt"/>
+                <a:cs typeface="Calibri Light" panose="020F0302020204030204" pitchFamily="34" charset="0"/>
+                <a:sym typeface="Wingdings" panose="05000000000000000000" pitchFamily="2" charset="2"/>
+              </a:rPr>
+              <a:t>onclick directly </a:t>
+            </a:r>
+          </a:p>
+          <a:p>
+            <a:pPr marL="12700">
+              <a:spcBef>
+                <a:spcPts val="95"/>
+              </a:spcBef>
+            </a:pPr>
+            <a:r>
+              <a:rPr lang="en-US" sz="2000" kern="0" dirty="0">
+                <a:latin typeface="Consolas" panose="020B0609020204030204" pitchFamily="49" charset="0"/>
+                <a:cs typeface="Calibri Light" panose="020F0302020204030204" pitchFamily="34" charset="0"/>
+                <a:sym typeface="Wingdings" panose="05000000000000000000" pitchFamily="2" charset="2"/>
+              </a:rPr>
+              <a:t>const </a:t>
+            </a:r>
+            <a:r>
+              <a:rPr lang="en-US" sz="2000" kern="0" dirty="0" err="1">
+                <a:latin typeface="Consolas" panose="020B0609020204030204" pitchFamily="49" charset="0"/>
+                <a:cs typeface="Calibri Light" panose="020F0302020204030204" pitchFamily="34" charset="0"/>
+                <a:sym typeface="Wingdings" panose="05000000000000000000" pitchFamily="2" charset="2"/>
+              </a:rPr>
+              <a:t>btn</a:t>
+            </a:r>
+            <a:r>
+              <a:rPr lang="en-US" sz="2000" kern="0" dirty="0">
+                <a:latin typeface="Consolas" panose="020B0609020204030204" pitchFamily="49" charset="0"/>
+                <a:cs typeface="Calibri Light" panose="020F0302020204030204" pitchFamily="34" charset="0"/>
+                <a:sym typeface="Wingdings" panose="05000000000000000000" pitchFamily="2" charset="2"/>
+              </a:rPr>
+              <a:t> = </a:t>
+            </a:r>
+            <a:r>
+              <a:rPr lang="en-US" sz="2000" kern="0" dirty="0" err="1">
+                <a:latin typeface="Consolas" panose="020B0609020204030204" pitchFamily="49" charset="0"/>
+                <a:cs typeface="Calibri Light" panose="020F0302020204030204" pitchFamily="34" charset="0"/>
+                <a:sym typeface="Wingdings" panose="05000000000000000000" pitchFamily="2" charset="2"/>
+              </a:rPr>
+              <a:t>doc.querySelector</a:t>
+            </a:r>
+            <a:r>
+              <a:rPr lang="en-US" sz="2000" kern="0" dirty="0">
+                <a:latin typeface="Consolas" panose="020B0609020204030204" pitchFamily="49" charset="0"/>
+                <a:cs typeface="Calibri Light" panose="020F0302020204030204" pitchFamily="34" charset="0"/>
+                <a:sym typeface="Wingdings" panose="05000000000000000000" pitchFamily="2" charset="2"/>
+              </a:rPr>
+              <a:t>(‘.</a:t>
+            </a:r>
+            <a:r>
+              <a:rPr lang="en-US" sz="2000" kern="0" dirty="0" err="1">
+                <a:latin typeface="Consolas" panose="020B0609020204030204" pitchFamily="49" charset="0"/>
+                <a:cs typeface="Calibri Light" panose="020F0302020204030204" pitchFamily="34" charset="0"/>
+                <a:sym typeface="Wingdings" panose="05000000000000000000" pitchFamily="2" charset="2"/>
+              </a:rPr>
+              <a:t>btn</a:t>
+            </a:r>
+            <a:r>
+              <a:rPr lang="en-US" sz="2000" kern="0" dirty="0">
+                <a:latin typeface="Consolas" panose="020B0609020204030204" pitchFamily="49" charset="0"/>
+                <a:cs typeface="Calibri Light" panose="020F0302020204030204" pitchFamily="34" charset="0"/>
+                <a:sym typeface="Wingdings" panose="05000000000000000000" pitchFamily="2" charset="2"/>
+              </a:rPr>
+              <a:t>’);</a:t>
+            </a:r>
+          </a:p>
+          <a:p>
+            <a:pPr marL="12700">
+              <a:spcBef>
+                <a:spcPts val="95"/>
+              </a:spcBef>
+            </a:pPr>
+            <a:r>
+              <a:rPr lang="en-US" sz="2000" kern="0" dirty="0" err="1">
+                <a:latin typeface="Consolas" panose="020B0609020204030204" pitchFamily="49" charset="0"/>
+                <a:cs typeface="Calibri Light" panose="020F0302020204030204" pitchFamily="34" charset="0"/>
+                <a:sym typeface="Wingdings" panose="05000000000000000000" pitchFamily="2" charset="2"/>
+              </a:rPr>
+              <a:t>btn.onclick</a:t>
+            </a:r>
+            <a:r>
+              <a:rPr lang="en-US" sz="2000" kern="0" dirty="0">
+                <a:latin typeface="Consolas" panose="020B0609020204030204" pitchFamily="49" charset="0"/>
+                <a:cs typeface="Calibri Light" panose="020F0302020204030204" pitchFamily="34" charset="0"/>
+                <a:sym typeface="Wingdings" panose="05000000000000000000" pitchFamily="2" charset="2"/>
+              </a:rPr>
+              <a:t> = ()=&gt;{ log(‘clicked’); }</a:t>
+            </a:r>
             <a:endParaRPr lang="en-US" sz="2800" kern="0" dirty="0">
               <a:latin typeface="+mn-lt"/>
               <a:cs typeface="Calibri Light" panose="020F0302020204030204" pitchFamily="34" charset="0"/>
@@ -17054,6 +18463,22 @@
                 <a:spcPts val="95"/>
               </a:spcBef>
             </a:pPr>
+            <a:r>
+              <a:rPr lang="en-US" sz="2800" kern="0" dirty="0">
+                <a:latin typeface="+mn-lt"/>
+                <a:cs typeface="Calibri Light" panose="020F0302020204030204" pitchFamily="34" charset="0"/>
+                <a:sym typeface="Wingdings" panose="05000000000000000000" pitchFamily="2" charset="2"/>
+              </a:rPr>
+              <a:t>3. using </a:t>
+            </a:r>
+            <a:r>
+              <a:rPr lang="en-US" sz="2800" kern="0" dirty="0" err="1">
+                <a:latin typeface="+mn-lt"/>
+                <a:cs typeface="Calibri Light" panose="020F0302020204030204" pitchFamily="34" charset="0"/>
+                <a:sym typeface="Wingdings" panose="05000000000000000000" pitchFamily="2" charset="2"/>
+              </a:rPr>
+              <a:t>eventListener</a:t>
+            </a:r>
             <a:endParaRPr lang="en-US" sz="2800" kern="0" dirty="0">
               <a:latin typeface="+mn-lt"/>
               <a:cs typeface="Calibri Light" panose="020F0302020204030204" pitchFamily="34" charset="0"/>
@@ -17066,18 +18491,2185 @@
                 <a:spcPts val="95"/>
               </a:spcBef>
             </a:pPr>
+            <a:r>
+              <a:rPr lang="en-US" sz="2000" kern="0" dirty="0" err="1">
+                <a:latin typeface="Consolas" panose="020B0609020204030204" pitchFamily="49" charset="0"/>
+                <a:cs typeface="Calibri Light" panose="020F0302020204030204" pitchFamily="34" charset="0"/>
+                <a:sym typeface="Wingdings" panose="05000000000000000000" pitchFamily="2" charset="2"/>
+              </a:rPr>
+              <a:t>btn.addEventListener</a:t>
+            </a:r>
+            <a:r>
+              <a:rPr lang="en-US" sz="2000" kern="0" dirty="0">
+                <a:latin typeface="Consolas" panose="020B0609020204030204" pitchFamily="49" charset="0"/>
+                <a:cs typeface="Calibri Light" panose="020F0302020204030204" pitchFamily="34" charset="0"/>
+                <a:sym typeface="Wingdings" panose="05000000000000000000" pitchFamily="2" charset="2"/>
+              </a:rPr>
+              <a:t>(‘click’,()=&gt;{ log(‘clicked’); } ); </a:t>
+            </a:r>
+            <a:r>
+              <a:rPr lang="en-US" sz="2000" kern="0" dirty="0" err="1">
+                <a:latin typeface="Consolas" panose="020B0609020204030204" pitchFamily="49" charset="0"/>
+                <a:cs typeface="Calibri Light" panose="020F0302020204030204" pitchFamily="34" charset="0"/>
+                <a:sym typeface="Wingdings" panose="05000000000000000000" pitchFamily="2" charset="2"/>
+              </a:rPr>
+              <a:t>btn.addEventListener</a:t>
+            </a:r>
+            <a:r>
+              <a:rPr lang="en-US" sz="2000" kern="0" dirty="0">
+                <a:latin typeface="Consolas" panose="020B0609020204030204" pitchFamily="49" charset="0"/>
+                <a:cs typeface="Calibri Light" panose="020F0302020204030204" pitchFamily="34" charset="0"/>
+                <a:sym typeface="Wingdings" panose="05000000000000000000" pitchFamily="2" charset="2"/>
+              </a:rPr>
+              <a:t>(‘</a:t>
+            </a:r>
+            <a:r>
+              <a:rPr lang="en-US" sz="2000" kern="0" dirty="0" err="1">
+                <a:latin typeface="Consolas" panose="020B0609020204030204" pitchFamily="49" charset="0"/>
+                <a:cs typeface="Calibri Light" panose="020F0302020204030204" pitchFamily="34" charset="0"/>
+                <a:sym typeface="Wingdings" panose="05000000000000000000" pitchFamily="2" charset="2"/>
+              </a:rPr>
+              <a:t>dblclick</a:t>
+            </a:r>
+            <a:r>
+              <a:rPr lang="en-US" sz="2000" kern="0" dirty="0">
+                <a:latin typeface="Consolas" panose="020B0609020204030204" pitchFamily="49" charset="0"/>
+                <a:cs typeface="Calibri Light" panose="020F0302020204030204" pitchFamily="34" charset="0"/>
+                <a:sym typeface="Wingdings" panose="05000000000000000000" pitchFamily="2" charset="2"/>
+              </a:rPr>
+              <a:t>’,()=&gt;{ log(‘clicked twice’); } );</a:t>
+            </a:r>
+          </a:p>
+          <a:p>
+            <a:pPr marL="12700">
+              <a:spcBef>
+                <a:spcPts val="95"/>
+              </a:spcBef>
+            </a:pPr>
             <a:endParaRPr lang="en-US" sz="2800" kern="0" dirty="0">
               <a:latin typeface="+mn-lt"/>
               <a:cs typeface="Calibri Light" panose="020F0302020204030204" pitchFamily="34" charset="0"/>
               <a:sym typeface="Wingdings" panose="05000000000000000000" pitchFamily="2" charset="2"/>
             </a:endParaRPr>
           </a:p>
+          <a:p>
+            <a:pPr marL="12700">
+              <a:spcBef>
+                <a:spcPts val="95"/>
+              </a:spcBef>
+            </a:pPr>
+            <a:r>
+              <a:rPr lang="en-US" sz="2800" kern="0" dirty="0">
+                <a:latin typeface="+mn-lt"/>
+                <a:cs typeface="Calibri Light" panose="020F0302020204030204" pitchFamily="34" charset="0"/>
+                <a:sym typeface="Wingdings" panose="05000000000000000000" pitchFamily="2" charset="2"/>
+              </a:rPr>
+              <a:t>Input Events</a:t>
+            </a:r>
+          </a:p>
+          <a:p>
+            <a:pPr marL="12700">
+              <a:spcBef>
+                <a:spcPts val="95"/>
+              </a:spcBef>
+            </a:pPr>
+            <a:r>
+              <a:rPr lang="en-US" sz="2000" kern="0" dirty="0" err="1">
+                <a:latin typeface="Consolas" panose="020B0609020204030204" pitchFamily="49" charset="0"/>
+                <a:cs typeface="Calibri Light" panose="020F0302020204030204" pitchFamily="34" charset="0"/>
+                <a:sym typeface="Wingdings" panose="05000000000000000000" pitchFamily="2" charset="2"/>
+              </a:rPr>
+              <a:t>btn.addEventListener</a:t>
+            </a:r>
+            <a:r>
+              <a:rPr lang="en-US" sz="2000" kern="0" dirty="0">
+                <a:latin typeface="Consolas" panose="020B0609020204030204" pitchFamily="49" charset="0"/>
+                <a:cs typeface="Calibri Light" panose="020F0302020204030204" pitchFamily="34" charset="0"/>
+                <a:sym typeface="Wingdings" panose="05000000000000000000" pitchFamily="2" charset="2"/>
+              </a:rPr>
+              <a:t>(‘input’,()=&gt;{ log(‘clicked’); } );</a:t>
+            </a:r>
+            <a:endParaRPr lang="en-US" sz="2400" kern="0" dirty="0">
+              <a:latin typeface="+mj-lt"/>
+              <a:cs typeface="Calibri Light" panose="020F0302020204030204" pitchFamily="34" charset="0"/>
+              <a:sym typeface="Wingdings" panose="05000000000000000000" pitchFamily="2" charset="2"/>
+            </a:endParaRPr>
+          </a:p>
+          <a:p>
+            <a:pPr marL="12700">
+              <a:spcBef>
+                <a:spcPts val="95"/>
+              </a:spcBef>
+            </a:pPr>
+            <a:r>
+              <a:rPr lang="en-US" sz="2400" kern="0" dirty="0">
+                <a:latin typeface="+mj-lt"/>
+                <a:cs typeface="Calibri Light" panose="020F0302020204030204" pitchFamily="34" charset="0"/>
+                <a:sym typeface="Wingdings" panose="05000000000000000000" pitchFamily="2" charset="2"/>
+              </a:rPr>
+              <a:t>To access the elements in input tag we use </a:t>
+            </a:r>
+            <a:r>
+              <a:rPr lang="en-US" sz="2400" kern="0" dirty="0" err="1">
+                <a:latin typeface="+mj-lt"/>
+                <a:cs typeface="Calibri Light" panose="020F0302020204030204" pitchFamily="34" charset="0"/>
+                <a:sym typeface="Wingdings" panose="05000000000000000000" pitchFamily="2" charset="2"/>
+              </a:rPr>
+              <a:t>arg</a:t>
+            </a:r>
+            <a:r>
+              <a:rPr lang="en-US" sz="2400" kern="0" dirty="0">
+                <a:latin typeface="+mj-lt"/>
+                <a:cs typeface="Calibri Light" panose="020F0302020204030204" pitchFamily="34" charset="0"/>
+                <a:sym typeface="Wingdings" panose="05000000000000000000" pitchFamily="2" charset="2"/>
+              </a:rPr>
+              <a:t> e and  </a:t>
+            </a:r>
+            <a:r>
+              <a:rPr lang="en-US" sz="2400" kern="0" dirty="0" err="1">
+                <a:latin typeface="+mj-lt"/>
+                <a:cs typeface="Calibri Light" panose="020F0302020204030204" pitchFamily="34" charset="0"/>
+                <a:sym typeface="Wingdings" panose="05000000000000000000" pitchFamily="2" charset="2"/>
+              </a:rPr>
+              <a:t>e.target.value</a:t>
+            </a:r>
+            <a:r>
+              <a:rPr lang="en-US" sz="2400" kern="0" dirty="0">
+                <a:latin typeface="+mj-lt"/>
+                <a:cs typeface="Calibri Light" panose="020F0302020204030204" pitchFamily="34" charset="0"/>
+                <a:sym typeface="Wingdings" panose="05000000000000000000" pitchFamily="2" charset="2"/>
+              </a:rPr>
+              <a:t> for its value</a:t>
+            </a:r>
+          </a:p>
+          <a:p>
+            <a:pPr marL="12700">
+              <a:spcBef>
+                <a:spcPts val="95"/>
+              </a:spcBef>
+            </a:pPr>
+            <a:r>
+              <a:rPr lang="en-US" sz="2000" kern="0" dirty="0" err="1">
+                <a:latin typeface="Consolas" panose="020B0609020204030204" pitchFamily="49" charset="0"/>
+                <a:cs typeface="Calibri Light" panose="020F0302020204030204" pitchFamily="34" charset="0"/>
+                <a:sym typeface="Wingdings" panose="05000000000000000000" pitchFamily="2" charset="2"/>
+              </a:rPr>
+              <a:t>btn.addEventListener</a:t>
+            </a:r>
+            <a:r>
+              <a:rPr lang="en-US" sz="2000" kern="0" dirty="0">
+                <a:latin typeface="Consolas" panose="020B0609020204030204" pitchFamily="49" charset="0"/>
+                <a:cs typeface="Calibri Light" panose="020F0302020204030204" pitchFamily="34" charset="0"/>
+                <a:sym typeface="Wingdings" panose="05000000000000000000" pitchFamily="2" charset="2"/>
+              </a:rPr>
+              <a:t>(‘input’,(e)=&gt;{ log(</a:t>
+            </a:r>
+            <a:r>
+              <a:rPr lang="en-US" sz="2000" kern="0" dirty="0" err="1">
+                <a:latin typeface="Consolas" panose="020B0609020204030204" pitchFamily="49" charset="0"/>
+                <a:cs typeface="Calibri Light" panose="020F0302020204030204" pitchFamily="34" charset="0"/>
+                <a:sym typeface="Wingdings" panose="05000000000000000000" pitchFamily="2" charset="2"/>
+              </a:rPr>
+              <a:t>e.target.value</a:t>
+            </a:r>
+            <a:r>
+              <a:rPr lang="en-US" sz="2000" kern="0" dirty="0">
+                <a:latin typeface="Consolas" panose="020B0609020204030204" pitchFamily="49" charset="0"/>
+                <a:cs typeface="Calibri Light" panose="020F0302020204030204" pitchFamily="34" charset="0"/>
+                <a:sym typeface="Wingdings" panose="05000000000000000000" pitchFamily="2" charset="2"/>
+              </a:rPr>
+              <a:t>); } );</a:t>
+            </a:r>
+          </a:p>
+          <a:p>
+            <a:pPr marL="12700">
+              <a:spcBef>
+                <a:spcPts val="95"/>
+              </a:spcBef>
+            </a:pPr>
+            <a:endParaRPr lang="en-US" sz="2800" kern="0" dirty="0">
+              <a:latin typeface="+mn-lt"/>
+              <a:cs typeface="Calibri Light" panose="020F0302020204030204" pitchFamily="34" charset="0"/>
+              <a:sym typeface="Wingdings" panose="05000000000000000000" pitchFamily="2" charset="2"/>
+            </a:endParaRPr>
+          </a:p>
         </p:txBody>
       </p:sp>
     </p:spTree>
     <p:extLst>
       <p:ext uri="{BB962C8B-B14F-4D97-AF65-F5344CB8AC3E}">
-        <p14:creationId xmlns:p14="http://schemas.microsoft.com/office/powerpoint/2010/main" val="2598095397"/>
+        <p14:creationId xmlns:p14="http://schemas.microsoft.com/office/powerpoint/2010/main" val="973722338"/>
+      </p:ext>
+    </p:extLst>
+  </p:cSld>
+  <p:clrMapOvr>
+    <a:masterClrMapping/>
+  </p:clrMapOvr>
+</p:sld>
+</file>
+
+<file path=ppt/slides/slide44.xml><?xml version="1.0" encoding="utf-8"?>
+<p:sld xmlns:a="http://schemas.openxmlformats.org/drawingml/2006/main" xmlns:r="http://schemas.openxmlformats.org/officeDocument/2006/relationships" xmlns:p="http://schemas.openxmlformats.org/presentationml/2006/main">
+  <p:cSld>
+    <p:spTree>
+      <p:nvGrpSpPr>
+        <p:cNvPr id="1" name=""/>
+        <p:cNvGrpSpPr/>
+        <p:nvPr/>
+      </p:nvGrpSpPr>
+      <p:grpSpPr>
+        <a:xfrm>
+          <a:off x="0" y="0"/>
+          <a:ext cx="0" cy="0"/>
+          <a:chOff x="0" y="0"/>
+          <a:chExt cx="0" cy="0"/>
+        </a:xfrm>
+      </p:grpSpPr>
+      <p:sp>
+        <p:nvSpPr>
+          <p:cNvPr id="2" name="object 2"/>
+          <p:cNvSpPr/>
+          <p:nvPr/>
+        </p:nvSpPr>
+        <p:spPr>
+          <a:xfrm>
+            <a:off x="-36871" y="-36871"/>
+            <a:ext cx="12191999" cy="7118601"/>
+          </a:xfrm>
+          <a:prstGeom prst="rect">
+            <a:avLst/>
+          </a:prstGeom>
+          <a:blipFill>
+            <a:blip r:embed="rId2" cstate="print"/>
+            <a:stretch>
+              <a:fillRect/>
+            </a:stretch>
+          </a:blipFill>
+        </p:spPr>
+        <p:txBody>
+          <a:bodyPr wrap="square" lIns="0" tIns="0" rIns="0" bIns="0" rtlCol="0"/>
+          <a:lstStyle/>
+          <a:p>
+            <a:endParaRPr b="1" dirty="0">
+              <a:ln w="13462">
+                <a:solidFill>
+                  <a:schemeClr val="bg1"/>
+                </a:solidFill>
+                <a:prstDash val="solid"/>
+              </a:ln>
+              <a:solidFill>
+                <a:schemeClr val="tx1">
+                  <a:lumMod val="85000"/>
+                  <a:lumOff val="15000"/>
+                </a:schemeClr>
+              </a:solidFill>
+              <a:effectLst>
+                <a:outerShdw dist="38100" dir="2700000" algn="bl" rotWithShape="0">
+                  <a:schemeClr val="accent5"/>
+                </a:outerShdw>
+              </a:effectLst>
+            </a:endParaRPr>
+          </a:p>
+        </p:txBody>
+      </p:sp>
+      <p:sp>
+        <p:nvSpPr>
+          <p:cNvPr id="3" name="object 3"/>
+          <p:cNvSpPr txBox="1">
+            <a:spLocks noGrp="1"/>
+          </p:cNvSpPr>
+          <p:nvPr>
+            <p:ph type="title"/>
+          </p:nvPr>
+        </p:nvSpPr>
+        <p:spPr>
+          <a:xfrm>
+            <a:off x="481685" y="304800"/>
+            <a:ext cx="8967115" cy="566181"/>
+          </a:xfrm>
+          <a:prstGeom prst="rect">
+            <a:avLst/>
+          </a:prstGeom>
+        </p:spPr>
+        <p:txBody>
+          <a:bodyPr vert="horz" wrap="square" lIns="0" tIns="12065" rIns="0" bIns="0" rtlCol="0">
+            <a:spAutoFit/>
+          </a:bodyPr>
+          <a:lstStyle/>
+          <a:p>
+            <a:pPr marL="12700">
+              <a:spcBef>
+                <a:spcPts val="95"/>
+              </a:spcBef>
+            </a:pPr>
+            <a:r>
+              <a:rPr lang="en-US" sz="3600" kern="0" dirty="0">
+                <a:latin typeface="+mn-lt"/>
+                <a:cs typeface="Calibri Light" panose="020F0302020204030204" pitchFamily="34" charset="0"/>
+                <a:sym typeface="Wingdings" panose="05000000000000000000" pitchFamily="2" charset="2"/>
+              </a:rPr>
+              <a:t>DOM Events</a:t>
+            </a:r>
+          </a:p>
+        </p:txBody>
+      </p:sp>
+      <p:sp>
+        <p:nvSpPr>
+          <p:cNvPr id="5" name="object 5"/>
+          <p:cNvSpPr/>
+          <p:nvPr/>
+        </p:nvSpPr>
+        <p:spPr>
+          <a:xfrm>
+            <a:off x="9816083" y="262127"/>
+            <a:ext cx="1976627" cy="822960"/>
+          </a:xfrm>
+          <a:prstGeom prst="rect">
+            <a:avLst/>
+          </a:prstGeom>
+          <a:blipFill>
+            <a:blip r:embed="rId3" cstate="print"/>
+            <a:stretch>
+              <a:fillRect/>
+            </a:stretch>
+          </a:blipFill>
+        </p:spPr>
+        <p:txBody>
+          <a:bodyPr wrap="square" lIns="0" tIns="0" rIns="0" bIns="0" rtlCol="0"/>
+          <a:lstStyle/>
+          <a:p>
+            <a:endParaRPr/>
+          </a:p>
+        </p:txBody>
+      </p:sp>
+      <p:sp>
+        <p:nvSpPr>
+          <p:cNvPr id="4" name="object 3">
+            <a:extLst>
+              <a:ext uri="{FF2B5EF4-FFF2-40B4-BE49-F238E27FC236}">
+                <a16:creationId xmlns:a16="http://schemas.microsoft.com/office/drawing/2014/main" id="{1ED9D45B-4B0D-FC76-3A8C-E89F6CD72254}"/>
+              </a:ext>
+            </a:extLst>
+          </p:cNvPr>
+          <p:cNvSpPr txBox="1">
+            <a:spLocks/>
+          </p:cNvSpPr>
+          <p:nvPr/>
+        </p:nvSpPr>
+        <p:spPr>
+          <a:xfrm>
+            <a:off x="533400" y="838200"/>
+            <a:ext cx="11621728" cy="5262338"/>
+          </a:xfrm>
+          <a:prstGeom prst="rect">
+            <a:avLst/>
+          </a:prstGeom>
+        </p:spPr>
+        <p:txBody>
+          <a:bodyPr vert="horz" wrap="square" lIns="0" tIns="12065" rIns="0" bIns="0" rtlCol="0">
+            <a:spAutoFit/>
+          </a:bodyPr>
+          <a:lstStyle>
+            <a:lvl1pPr>
+              <a:defRPr sz="6000" b="0" i="0">
+                <a:solidFill>
+                  <a:srgbClr val="E7E6E6"/>
+                </a:solidFill>
+                <a:latin typeface="Trebuchet MS"/>
+                <a:ea typeface="+mj-ea"/>
+                <a:cs typeface="Trebuchet MS"/>
+              </a:defRPr>
+            </a:lvl1pPr>
+          </a:lstStyle>
+          <a:p>
+            <a:pPr marL="12700">
+              <a:spcBef>
+                <a:spcPts val="95"/>
+              </a:spcBef>
+            </a:pPr>
+            <a:r>
+              <a:rPr lang="en-US" sz="2800" kern="0" dirty="0">
+                <a:latin typeface="+mn-lt"/>
+                <a:cs typeface="Calibri Light" panose="020F0302020204030204" pitchFamily="34" charset="0"/>
+                <a:sym typeface="Wingdings" panose="05000000000000000000" pitchFamily="2" charset="2"/>
+              </a:rPr>
+              <a:t>Submit Events : Used in form tag</a:t>
+            </a:r>
+            <a:endParaRPr lang="en-US" sz="2400" kern="0" dirty="0">
+              <a:latin typeface="+mn-lt"/>
+              <a:cs typeface="Calibri Light" panose="020F0302020204030204" pitchFamily="34" charset="0"/>
+              <a:sym typeface="Wingdings" panose="05000000000000000000" pitchFamily="2" charset="2"/>
+            </a:endParaRPr>
+          </a:p>
+          <a:p>
+            <a:pPr marL="12700">
+              <a:spcBef>
+                <a:spcPts val="95"/>
+              </a:spcBef>
+            </a:pPr>
+            <a:r>
+              <a:rPr lang="en-US" sz="2400" kern="0" dirty="0">
+                <a:latin typeface="Consolas" panose="020B0609020204030204" pitchFamily="49" charset="0"/>
+                <a:cs typeface="Calibri Light" panose="020F0302020204030204" pitchFamily="34" charset="0"/>
+                <a:sym typeface="Wingdings" panose="05000000000000000000" pitchFamily="2" charset="2"/>
+              </a:rPr>
+              <a:t>0.const form = </a:t>
+            </a:r>
+            <a:r>
+              <a:rPr lang="en-US" sz="2400" kern="0" dirty="0" err="1">
+                <a:latin typeface="Consolas" panose="020B0609020204030204" pitchFamily="49" charset="0"/>
+                <a:cs typeface="Calibri Light" panose="020F0302020204030204" pitchFamily="34" charset="0"/>
+                <a:sym typeface="Wingdings" panose="05000000000000000000" pitchFamily="2" charset="2"/>
+              </a:rPr>
+              <a:t>doc.querySelector</a:t>
+            </a:r>
+            <a:r>
+              <a:rPr lang="en-US" sz="2400" kern="0" dirty="0">
+                <a:latin typeface="Consolas" panose="020B0609020204030204" pitchFamily="49" charset="0"/>
+                <a:cs typeface="Calibri Light" panose="020F0302020204030204" pitchFamily="34" charset="0"/>
+                <a:sym typeface="Wingdings" panose="05000000000000000000" pitchFamily="2" charset="2"/>
+              </a:rPr>
+              <a:t>(‘form’);</a:t>
+            </a:r>
+          </a:p>
+          <a:p>
+            <a:pPr marL="12700">
+              <a:spcBef>
+                <a:spcPts val="95"/>
+              </a:spcBef>
+            </a:pPr>
+            <a:r>
+              <a:rPr lang="en-US" sz="2400" kern="0" dirty="0">
+                <a:latin typeface="Consolas" panose="020B0609020204030204" pitchFamily="49" charset="0"/>
+                <a:cs typeface="Calibri Light" panose="020F0302020204030204" pitchFamily="34" charset="0"/>
+                <a:sym typeface="Wingdings" panose="05000000000000000000" pitchFamily="2" charset="2"/>
+              </a:rPr>
+              <a:t>1.form.addEventListener(‘submit’,()=&gt;{ log(‘form submitted’); } );</a:t>
+            </a:r>
+          </a:p>
+          <a:p>
+            <a:pPr marL="12700">
+              <a:spcBef>
+                <a:spcPts val="95"/>
+              </a:spcBef>
+            </a:pPr>
+            <a:r>
+              <a:rPr lang="en-US" sz="2400" kern="0" dirty="0">
+                <a:latin typeface="Consolas" panose="020B0609020204030204" pitchFamily="49" charset="0"/>
+                <a:cs typeface="Calibri Light" panose="020F0302020204030204" pitchFamily="34" charset="0"/>
+                <a:sym typeface="Wingdings" panose="05000000000000000000" pitchFamily="2" charset="2"/>
+              </a:rPr>
+              <a:t>//the submit will reload the page, </a:t>
+            </a:r>
+          </a:p>
+          <a:p>
+            <a:pPr marL="12700">
+              <a:spcBef>
+                <a:spcPts val="95"/>
+              </a:spcBef>
+            </a:pPr>
+            <a:r>
+              <a:rPr lang="en-US" sz="2400" kern="0" dirty="0">
+                <a:latin typeface="Consolas" panose="020B0609020204030204" pitchFamily="49" charset="0"/>
+                <a:cs typeface="Calibri Light" panose="020F0302020204030204" pitchFamily="34" charset="0"/>
+                <a:sym typeface="Wingdings" panose="05000000000000000000" pitchFamily="2" charset="2"/>
+              </a:rPr>
+              <a:t>//to stop it we have to use </a:t>
+            </a:r>
+            <a:r>
+              <a:rPr lang="en-US" sz="2400" kern="0" dirty="0" err="1">
+                <a:latin typeface="Consolas" panose="020B0609020204030204" pitchFamily="49" charset="0"/>
+                <a:cs typeface="Calibri Light" panose="020F0302020204030204" pitchFamily="34" charset="0"/>
+                <a:sym typeface="Wingdings" panose="05000000000000000000" pitchFamily="2" charset="2"/>
+              </a:rPr>
+              <a:t>event.preventDefault</a:t>
+            </a:r>
+            <a:r>
+              <a:rPr lang="en-US" sz="2400" kern="0" dirty="0">
+                <a:latin typeface="Consolas" panose="020B0609020204030204" pitchFamily="49" charset="0"/>
+                <a:cs typeface="Calibri Light" panose="020F0302020204030204" pitchFamily="34" charset="0"/>
+                <a:sym typeface="Wingdings" panose="05000000000000000000" pitchFamily="2" charset="2"/>
+              </a:rPr>
+              <a:t>()</a:t>
+            </a:r>
+            <a:endParaRPr lang="en-US" sz="2400" kern="0" dirty="0">
+              <a:latin typeface="+mj-lt"/>
+              <a:cs typeface="Calibri Light" panose="020F0302020204030204" pitchFamily="34" charset="0"/>
+              <a:sym typeface="Wingdings" panose="05000000000000000000" pitchFamily="2" charset="2"/>
+            </a:endParaRPr>
+          </a:p>
+          <a:p>
+            <a:pPr marL="12700">
+              <a:spcBef>
+                <a:spcPts val="95"/>
+              </a:spcBef>
+            </a:pPr>
+            <a:r>
+              <a:rPr lang="en-US" sz="2400" kern="0" dirty="0">
+                <a:latin typeface="Consolas" panose="020B0609020204030204" pitchFamily="49" charset="0"/>
+                <a:cs typeface="Calibri Light" panose="020F0302020204030204" pitchFamily="34" charset="0"/>
+                <a:sym typeface="Wingdings" panose="05000000000000000000" pitchFamily="2" charset="2"/>
+              </a:rPr>
+              <a:t>2.form.addEventListener(‘submit’,(e)=&gt;{</a:t>
+            </a:r>
+            <a:r>
+              <a:rPr lang="en-US" sz="2400" kern="0" dirty="0" err="1">
+                <a:latin typeface="Consolas" panose="020B0609020204030204" pitchFamily="49" charset="0"/>
+                <a:cs typeface="Calibri Light" panose="020F0302020204030204" pitchFamily="34" charset="0"/>
+                <a:sym typeface="Wingdings" panose="05000000000000000000" pitchFamily="2" charset="2"/>
+              </a:rPr>
+              <a:t>e.preventDefault</a:t>
+            </a:r>
+            <a:r>
+              <a:rPr lang="en-US" sz="2400" kern="0" dirty="0">
+                <a:latin typeface="Consolas" panose="020B0609020204030204" pitchFamily="49" charset="0"/>
+                <a:cs typeface="Calibri Light" panose="020F0302020204030204" pitchFamily="34" charset="0"/>
+                <a:sym typeface="Wingdings" panose="05000000000000000000" pitchFamily="2" charset="2"/>
+              </a:rPr>
+              <a:t>();log(‘form submitted’);});</a:t>
+            </a:r>
+          </a:p>
+          <a:p>
+            <a:pPr marL="12700">
+              <a:spcBef>
+                <a:spcPts val="95"/>
+              </a:spcBef>
+            </a:pPr>
+            <a:endParaRPr lang="en-US" sz="2800" kern="0" dirty="0">
+              <a:latin typeface="+mn-lt"/>
+              <a:cs typeface="Calibri Light" panose="020F0302020204030204" pitchFamily="34" charset="0"/>
+              <a:sym typeface="Wingdings" panose="05000000000000000000" pitchFamily="2" charset="2"/>
+            </a:endParaRPr>
+          </a:p>
+          <a:p>
+            <a:pPr marL="12700">
+              <a:spcBef>
+                <a:spcPts val="95"/>
+              </a:spcBef>
+            </a:pPr>
+            <a:r>
+              <a:rPr lang="en-US" sz="2800" kern="0" dirty="0">
+                <a:latin typeface="+mn-lt"/>
+                <a:cs typeface="Calibri Light" panose="020F0302020204030204" pitchFamily="34" charset="0"/>
+                <a:sym typeface="Wingdings" panose="05000000000000000000" pitchFamily="2" charset="2"/>
+              </a:rPr>
+              <a:t>Access Elements of form</a:t>
+            </a:r>
+          </a:p>
+          <a:p>
+            <a:pPr marL="12700">
+              <a:spcBef>
+                <a:spcPts val="95"/>
+              </a:spcBef>
+            </a:pPr>
+            <a:r>
+              <a:rPr lang="en-US" sz="2800" kern="0" dirty="0">
+                <a:latin typeface="+mn-lt"/>
+                <a:cs typeface="Calibri Light" panose="020F0302020204030204" pitchFamily="34" charset="0"/>
+                <a:sym typeface="Wingdings" panose="05000000000000000000" pitchFamily="2" charset="2"/>
+              </a:rPr>
+              <a:t>For 2 input fields in form</a:t>
+            </a:r>
+          </a:p>
+          <a:p>
+            <a:pPr marL="12700">
+              <a:spcBef>
+                <a:spcPts val="95"/>
+              </a:spcBef>
+            </a:pPr>
+            <a:r>
+              <a:rPr lang="en-US" sz="2400" kern="0" dirty="0">
+                <a:latin typeface="Consolas" panose="020B0609020204030204" pitchFamily="49" charset="0"/>
+                <a:cs typeface="Calibri Light" panose="020F0302020204030204" pitchFamily="34" charset="0"/>
+                <a:sym typeface="Wingdings" panose="05000000000000000000" pitchFamily="2" charset="2"/>
+              </a:rPr>
+              <a:t>1.log(</a:t>
+            </a:r>
+            <a:r>
+              <a:rPr lang="en-US" sz="2400" kern="0" dirty="0" err="1">
+                <a:latin typeface="Consolas" panose="020B0609020204030204" pitchFamily="49" charset="0"/>
+                <a:cs typeface="Calibri Light" panose="020F0302020204030204" pitchFamily="34" charset="0"/>
+                <a:sym typeface="Wingdings" panose="05000000000000000000" pitchFamily="2" charset="2"/>
+              </a:rPr>
+              <a:t>form.elements</a:t>
+            </a:r>
+            <a:r>
+              <a:rPr lang="en-US" sz="2400" kern="0" dirty="0">
+                <a:latin typeface="Consolas" panose="020B0609020204030204" pitchFamily="49" charset="0"/>
+                <a:cs typeface="Calibri Light" panose="020F0302020204030204" pitchFamily="34" charset="0"/>
+                <a:sym typeface="Wingdings" panose="05000000000000000000" pitchFamily="2" charset="2"/>
+              </a:rPr>
+              <a:t>[0].value);</a:t>
+            </a:r>
+          </a:p>
+          <a:p>
+            <a:pPr marL="12700">
+              <a:spcBef>
+                <a:spcPts val="95"/>
+              </a:spcBef>
+            </a:pPr>
+            <a:r>
+              <a:rPr lang="en-US" sz="2400" kern="0" dirty="0">
+                <a:latin typeface="Consolas" panose="020B0609020204030204" pitchFamily="49" charset="0"/>
+                <a:cs typeface="Calibri Light" panose="020F0302020204030204" pitchFamily="34" charset="0"/>
+                <a:sym typeface="Wingdings" panose="05000000000000000000" pitchFamily="2" charset="2"/>
+              </a:rPr>
+              <a:t>2.log(</a:t>
+            </a:r>
+            <a:r>
+              <a:rPr lang="en-US" sz="2400" kern="0" dirty="0" err="1">
+                <a:latin typeface="Consolas" panose="020B0609020204030204" pitchFamily="49" charset="0"/>
+                <a:cs typeface="Calibri Light" panose="020F0302020204030204" pitchFamily="34" charset="0"/>
+                <a:sym typeface="Wingdings" panose="05000000000000000000" pitchFamily="2" charset="2"/>
+              </a:rPr>
+              <a:t>form.elements</a:t>
+            </a:r>
+            <a:r>
+              <a:rPr lang="en-US" sz="2400" kern="0" dirty="0">
+                <a:latin typeface="Consolas" panose="020B0609020204030204" pitchFamily="49" charset="0"/>
+                <a:cs typeface="Calibri Light" panose="020F0302020204030204" pitchFamily="34" charset="0"/>
+                <a:sym typeface="Wingdings" panose="05000000000000000000" pitchFamily="2" charset="2"/>
+              </a:rPr>
+              <a:t>[1].value);</a:t>
+            </a:r>
+          </a:p>
+          <a:p>
+            <a:pPr marL="12700">
+              <a:spcBef>
+                <a:spcPts val="95"/>
+              </a:spcBef>
+            </a:pPr>
+            <a:endParaRPr lang="en-US" sz="2800" kern="0" dirty="0">
+              <a:latin typeface="+mn-lt"/>
+              <a:cs typeface="Calibri Light" panose="020F0302020204030204" pitchFamily="34" charset="0"/>
+              <a:sym typeface="Wingdings" panose="05000000000000000000" pitchFamily="2" charset="2"/>
+            </a:endParaRPr>
+          </a:p>
+        </p:txBody>
+      </p:sp>
+    </p:spTree>
+    <p:extLst>
+      <p:ext uri="{BB962C8B-B14F-4D97-AF65-F5344CB8AC3E}">
+        <p14:creationId xmlns:p14="http://schemas.microsoft.com/office/powerpoint/2010/main" val="2178604332"/>
+      </p:ext>
+    </p:extLst>
+  </p:cSld>
+  <p:clrMapOvr>
+    <a:masterClrMapping/>
+  </p:clrMapOvr>
+</p:sld>
+</file>
+
+<file path=ppt/slides/slide45.xml><?xml version="1.0" encoding="utf-8"?>
+<p:sld xmlns:a="http://schemas.openxmlformats.org/drawingml/2006/main" xmlns:r="http://schemas.openxmlformats.org/officeDocument/2006/relationships" xmlns:p="http://schemas.openxmlformats.org/presentationml/2006/main">
+  <p:cSld>
+    <p:spTree>
+      <p:nvGrpSpPr>
+        <p:cNvPr id="1" name=""/>
+        <p:cNvGrpSpPr/>
+        <p:nvPr/>
+      </p:nvGrpSpPr>
+      <p:grpSpPr>
+        <a:xfrm>
+          <a:off x="0" y="0"/>
+          <a:ext cx="0" cy="0"/>
+          <a:chOff x="0" y="0"/>
+          <a:chExt cx="0" cy="0"/>
+        </a:xfrm>
+      </p:grpSpPr>
+      <p:sp>
+        <p:nvSpPr>
+          <p:cNvPr id="2" name="object 2"/>
+          <p:cNvSpPr/>
+          <p:nvPr/>
+        </p:nvSpPr>
+        <p:spPr>
+          <a:xfrm>
+            <a:off x="-36871" y="-36871"/>
+            <a:ext cx="12191999" cy="7118601"/>
+          </a:xfrm>
+          <a:prstGeom prst="rect">
+            <a:avLst/>
+          </a:prstGeom>
+          <a:blipFill>
+            <a:blip r:embed="rId2" cstate="print"/>
+            <a:stretch>
+              <a:fillRect/>
+            </a:stretch>
+          </a:blipFill>
+        </p:spPr>
+        <p:txBody>
+          <a:bodyPr wrap="square" lIns="0" tIns="0" rIns="0" bIns="0" rtlCol="0"/>
+          <a:lstStyle/>
+          <a:p>
+            <a:endParaRPr b="1" dirty="0">
+              <a:ln w="13462">
+                <a:solidFill>
+                  <a:schemeClr val="bg1"/>
+                </a:solidFill>
+                <a:prstDash val="solid"/>
+              </a:ln>
+              <a:solidFill>
+                <a:schemeClr val="tx1">
+                  <a:lumMod val="85000"/>
+                  <a:lumOff val="15000"/>
+                </a:schemeClr>
+              </a:solidFill>
+              <a:effectLst>
+                <a:outerShdw dist="38100" dir="2700000" algn="bl" rotWithShape="0">
+                  <a:schemeClr val="accent5"/>
+                </a:outerShdw>
+              </a:effectLst>
+            </a:endParaRPr>
+          </a:p>
+        </p:txBody>
+      </p:sp>
+      <p:sp>
+        <p:nvSpPr>
+          <p:cNvPr id="3" name="object 3"/>
+          <p:cNvSpPr txBox="1">
+            <a:spLocks noGrp="1"/>
+          </p:cNvSpPr>
+          <p:nvPr>
+            <p:ph type="title"/>
+          </p:nvPr>
+        </p:nvSpPr>
+        <p:spPr>
+          <a:xfrm>
+            <a:off x="481685" y="304800"/>
+            <a:ext cx="8967115" cy="566181"/>
+          </a:xfrm>
+          <a:prstGeom prst="rect">
+            <a:avLst/>
+          </a:prstGeom>
+        </p:spPr>
+        <p:txBody>
+          <a:bodyPr vert="horz" wrap="square" lIns="0" tIns="12065" rIns="0" bIns="0" rtlCol="0">
+            <a:spAutoFit/>
+          </a:bodyPr>
+          <a:lstStyle/>
+          <a:p>
+            <a:pPr marL="12700">
+              <a:spcBef>
+                <a:spcPts val="95"/>
+              </a:spcBef>
+            </a:pPr>
+            <a:r>
+              <a:rPr lang="en-US" sz="3600" kern="0" dirty="0">
+                <a:latin typeface="+mn-lt"/>
+                <a:cs typeface="Calibri Light" panose="020F0302020204030204" pitchFamily="34" charset="0"/>
+                <a:sym typeface="Wingdings" panose="05000000000000000000" pitchFamily="2" charset="2"/>
+              </a:rPr>
+              <a:t>Project ( Note Taking App)</a:t>
+            </a:r>
+          </a:p>
+        </p:txBody>
+      </p:sp>
+      <p:sp>
+        <p:nvSpPr>
+          <p:cNvPr id="5" name="object 5"/>
+          <p:cNvSpPr/>
+          <p:nvPr/>
+        </p:nvSpPr>
+        <p:spPr>
+          <a:xfrm>
+            <a:off x="9816083" y="262127"/>
+            <a:ext cx="1976627" cy="822960"/>
+          </a:xfrm>
+          <a:prstGeom prst="rect">
+            <a:avLst/>
+          </a:prstGeom>
+          <a:blipFill>
+            <a:blip r:embed="rId3" cstate="print"/>
+            <a:stretch>
+              <a:fillRect/>
+            </a:stretch>
+          </a:blipFill>
+        </p:spPr>
+        <p:txBody>
+          <a:bodyPr wrap="square" lIns="0" tIns="0" rIns="0" bIns="0" rtlCol="0"/>
+          <a:lstStyle/>
+          <a:p>
+            <a:endParaRPr/>
+          </a:p>
+        </p:txBody>
+      </p:sp>
+      <p:sp>
+        <p:nvSpPr>
+          <p:cNvPr id="4" name="object 3">
+            <a:extLst>
+              <a:ext uri="{FF2B5EF4-FFF2-40B4-BE49-F238E27FC236}">
+                <a16:creationId xmlns:a16="http://schemas.microsoft.com/office/drawing/2014/main" id="{1ED9D45B-4B0D-FC76-3A8C-E89F6CD72254}"/>
+              </a:ext>
+            </a:extLst>
+          </p:cNvPr>
+          <p:cNvSpPr txBox="1">
+            <a:spLocks/>
+          </p:cNvSpPr>
+          <p:nvPr/>
+        </p:nvSpPr>
+        <p:spPr>
+          <a:xfrm>
+            <a:off x="533400" y="838200"/>
+            <a:ext cx="11621728" cy="3992760"/>
+          </a:xfrm>
+          <a:prstGeom prst="rect">
+            <a:avLst/>
+          </a:prstGeom>
+        </p:spPr>
+        <p:txBody>
+          <a:bodyPr vert="horz" wrap="square" lIns="0" tIns="12065" rIns="0" bIns="0" rtlCol="0">
+            <a:spAutoFit/>
+          </a:bodyPr>
+          <a:lstStyle>
+            <a:lvl1pPr>
+              <a:defRPr sz="6000" b="0" i="0">
+                <a:solidFill>
+                  <a:srgbClr val="E7E6E6"/>
+                </a:solidFill>
+                <a:latin typeface="Trebuchet MS"/>
+                <a:ea typeface="+mj-ea"/>
+                <a:cs typeface="Trebuchet MS"/>
+              </a:defRPr>
+            </a:lvl1pPr>
+          </a:lstStyle>
+          <a:p>
+            <a:pPr marL="527050" indent="-514350">
+              <a:spcBef>
+                <a:spcPts val="95"/>
+              </a:spcBef>
+              <a:buAutoNum type="arabicPeriod"/>
+            </a:pPr>
+            <a:r>
+              <a:rPr lang="en-US" sz="2800" kern="0" dirty="0">
+                <a:latin typeface="+mn-lt"/>
+                <a:cs typeface="Calibri Light" panose="020F0302020204030204" pitchFamily="34" charset="0"/>
+                <a:sym typeface="Wingdings" panose="05000000000000000000" pitchFamily="2" charset="2"/>
+              </a:rPr>
+              <a:t>We will need html tags such as </a:t>
+            </a:r>
+            <a:r>
+              <a:rPr lang="en-US" sz="2800" kern="0" dirty="0" err="1">
+                <a:latin typeface="+mn-lt"/>
+                <a:cs typeface="Calibri Light" panose="020F0302020204030204" pitchFamily="34" charset="0"/>
+                <a:sym typeface="Wingdings" panose="05000000000000000000" pitchFamily="2" charset="2"/>
+              </a:rPr>
+              <a:t>ul</a:t>
+            </a:r>
+            <a:r>
+              <a:rPr lang="en-US" sz="2800" kern="0" dirty="0">
+                <a:latin typeface="+mn-lt"/>
+                <a:cs typeface="Calibri Light" panose="020F0302020204030204" pitchFamily="34" charset="0"/>
+                <a:sym typeface="Wingdings" panose="05000000000000000000" pitchFamily="2" charset="2"/>
+              </a:rPr>
+              <a:t> , input , button</a:t>
+            </a:r>
+          </a:p>
+          <a:p>
+            <a:pPr marL="527050" indent="-514350">
+              <a:spcBef>
+                <a:spcPts val="95"/>
+              </a:spcBef>
+              <a:buAutoNum type="arabicPeriod"/>
+            </a:pPr>
+            <a:r>
+              <a:rPr lang="en-US" sz="2800" kern="0" dirty="0">
+                <a:latin typeface="+mn-lt"/>
+                <a:cs typeface="Calibri Light" panose="020F0302020204030204" pitchFamily="34" charset="0"/>
+                <a:sym typeface="Wingdings" panose="05000000000000000000" pitchFamily="2" charset="2"/>
+              </a:rPr>
+              <a:t>Get elements in JS for all tags</a:t>
+            </a:r>
+          </a:p>
+          <a:p>
+            <a:pPr marL="527050" indent="-514350">
+              <a:spcBef>
+                <a:spcPts val="95"/>
+              </a:spcBef>
+              <a:buAutoNum type="arabicPeriod"/>
+            </a:pPr>
+            <a:r>
+              <a:rPr lang="en-US" sz="2800" kern="0" dirty="0">
+                <a:latin typeface="+mn-lt"/>
+                <a:cs typeface="Calibri Light" panose="020F0302020204030204" pitchFamily="34" charset="0"/>
+                <a:sym typeface="Wingdings" panose="05000000000000000000" pitchFamily="2" charset="2"/>
+              </a:rPr>
+              <a:t>when click event in button then create li.</a:t>
+            </a:r>
+          </a:p>
+          <a:p>
+            <a:pPr marL="527050" indent="-514350">
+              <a:spcBef>
+                <a:spcPts val="95"/>
+              </a:spcBef>
+              <a:buAutoNum type="arabicPeriod"/>
+            </a:pPr>
+            <a:r>
+              <a:rPr lang="en-US" sz="2800" kern="0" dirty="0">
+                <a:latin typeface="+mn-lt"/>
+                <a:cs typeface="Calibri Light" panose="020F0302020204030204" pitchFamily="34" charset="0"/>
+                <a:sym typeface="Wingdings" panose="05000000000000000000" pitchFamily="2" charset="2"/>
+              </a:rPr>
+              <a:t>Insert input element value to it.</a:t>
+            </a:r>
+          </a:p>
+          <a:p>
+            <a:pPr marL="527050" indent="-514350">
+              <a:spcBef>
+                <a:spcPts val="95"/>
+              </a:spcBef>
+              <a:buAutoNum type="arabicPeriod"/>
+            </a:pPr>
+            <a:r>
+              <a:rPr lang="en-US" sz="2800" kern="0" dirty="0">
+                <a:latin typeface="+mn-lt"/>
+                <a:cs typeface="Calibri Light" panose="020F0302020204030204" pitchFamily="34" charset="0"/>
+                <a:sym typeface="Wingdings" panose="05000000000000000000" pitchFamily="2" charset="2"/>
+              </a:rPr>
+              <a:t>next clear the value .</a:t>
+            </a:r>
+          </a:p>
+          <a:p>
+            <a:pPr marL="527050" indent="-514350">
+              <a:spcBef>
+                <a:spcPts val="95"/>
+              </a:spcBef>
+              <a:buAutoNum type="arabicPeriod"/>
+            </a:pPr>
+            <a:r>
+              <a:rPr lang="en-US" sz="2800" kern="0" dirty="0" err="1">
+                <a:latin typeface="+mn-lt"/>
+                <a:cs typeface="Calibri Light" panose="020F0302020204030204" pitchFamily="34" charset="0"/>
+                <a:sym typeface="Wingdings" panose="05000000000000000000" pitchFamily="2" charset="2"/>
+              </a:rPr>
+              <a:t>appendChild</a:t>
+            </a:r>
+            <a:r>
+              <a:rPr lang="en-US" sz="2800" kern="0" dirty="0">
+                <a:latin typeface="+mn-lt"/>
+                <a:cs typeface="Calibri Light" panose="020F0302020204030204" pitchFamily="34" charset="0"/>
+                <a:sym typeface="Wingdings" panose="05000000000000000000" pitchFamily="2" charset="2"/>
+              </a:rPr>
+              <a:t> the created element into the </a:t>
+            </a:r>
+            <a:r>
+              <a:rPr lang="en-US" sz="2800" kern="0" dirty="0" err="1">
+                <a:latin typeface="+mn-lt"/>
+                <a:cs typeface="Calibri Light" panose="020F0302020204030204" pitchFamily="34" charset="0"/>
+                <a:sym typeface="Wingdings" panose="05000000000000000000" pitchFamily="2" charset="2"/>
+              </a:rPr>
+              <a:t>ul</a:t>
+            </a:r>
+            <a:r>
+              <a:rPr lang="en-US" sz="2800" kern="0" dirty="0">
+                <a:latin typeface="+mn-lt"/>
+                <a:cs typeface="Calibri Light" panose="020F0302020204030204" pitchFamily="34" charset="0"/>
+                <a:sym typeface="Wingdings" panose="05000000000000000000" pitchFamily="2" charset="2"/>
+              </a:rPr>
+              <a:t> </a:t>
+            </a:r>
+          </a:p>
+          <a:p>
+            <a:pPr marL="527050" indent="-514350">
+              <a:spcBef>
+                <a:spcPts val="95"/>
+              </a:spcBef>
+              <a:buAutoNum type="arabicPeriod"/>
+            </a:pPr>
+            <a:r>
+              <a:rPr lang="en-US" sz="2800" kern="0" dirty="0">
+                <a:latin typeface="+mn-lt"/>
+                <a:cs typeface="Calibri Light" panose="020F0302020204030204" pitchFamily="34" charset="0"/>
+                <a:sym typeface="Wingdings" panose="05000000000000000000" pitchFamily="2" charset="2"/>
+              </a:rPr>
+              <a:t>Add click to the created element to remove() it , when click over it.</a:t>
+            </a:r>
+          </a:p>
+          <a:p>
+            <a:pPr marL="527050" indent="-514350">
+              <a:spcBef>
+                <a:spcPts val="95"/>
+              </a:spcBef>
+              <a:buAutoNum type="arabicPeriod"/>
+            </a:pPr>
+            <a:endParaRPr lang="en-US" sz="2800" kern="0" dirty="0">
+              <a:latin typeface="+mn-lt"/>
+              <a:cs typeface="Calibri Light" panose="020F0302020204030204" pitchFamily="34" charset="0"/>
+              <a:sym typeface="Wingdings" panose="05000000000000000000" pitchFamily="2" charset="2"/>
+            </a:endParaRPr>
+          </a:p>
+          <a:p>
+            <a:pPr marL="12700">
+              <a:spcBef>
+                <a:spcPts val="95"/>
+              </a:spcBef>
+            </a:pPr>
+            <a:r>
+              <a:rPr lang="en-US" sz="2800" kern="0" dirty="0">
+                <a:latin typeface="+mn-lt"/>
+                <a:cs typeface="Calibri Light" panose="020F0302020204030204" pitchFamily="34" charset="0"/>
+                <a:sym typeface="Wingdings" panose="05000000000000000000" pitchFamily="2" charset="2"/>
+              </a:rPr>
+              <a:t>Add CSS to your heart’s content.</a:t>
+            </a:r>
+          </a:p>
+        </p:txBody>
+      </p:sp>
+    </p:spTree>
+    <p:extLst>
+      <p:ext uri="{BB962C8B-B14F-4D97-AF65-F5344CB8AC3E}">
+        <p14:creationId xmlns:p14="http://schemas.microsoft.com/office/powerpoint/2010/main" val="3058086588"/>
+      </p:ext>
+    </p:extLst>
+  </p:cSld>
+  <p:clrMapOvr>
+    <a:masterClrMapping/>
+  </p:clrMapOvr>
+</p:sld>
+</file>
+
+<file path=ppt/slides/slide46.xml><?xml version="1.0" encoding="utf-8"?>
+<p:sld xmlns:a="http://schemas.openxmlformats.org/drawingml/2006/main" xmlns:r="http://schemas.openxmlformats.org/officeDocument/2006/relationships" xmlns:p="http://schemas.openxmlformats.org/presentationml/2006/main">
+  <p:cSld>
+    <p:spTree>
+      <p:nvGrpSpPr>
+        <p:cNvPr id="1" name=""/>
+        <p:cNvGrpSpPr/>
+        <p:nvPr/>
+      </p:nvGrpSpPr>
+      <p:grpSpPr>
+        <a:xfrm>
+          <a:off x="0" y="0"/>
+          <a:ext cx="0" cy="0"/>
+          <a:chOff x="0" y="0"/>
+          <a:chExt cx="0" cy="0"/>
+        </a:xfrm>
+      </p:grpSpPr>
+      <p:sp>
+        <p:nvSpPr>
+          <p:cNvPr id="2" name="object 2"/>
+          <p:cNvSpPr/>
+          <p:nvPr/>
+        </p:nvSpPr>
+        <p:spPr>
+          <a:xfrm>
+            <a:off x="-36871" y="-36871"/>
+            <a:ext cx="12191999" cy="7118601"/>
+          </a:xfrm>
+          <a:prstGeom prst="rect">
+            <a:avLst/>
+          </a:prstGeom>
+          <a:blipFill>
+            <a:blip r:embed="rId2" cstate="print"/>
+            <a:stretch>
+              <a:fillRect/>
+            </a:stretch>
+          </a:blipFill>
+        </p:spPr>
+        <p:txBody>
+          <a:bodyPr wrap="square" lIns="0" tIns="0" rIns="0" bIns="0" rtlCol="0"/>
+          <a:lstStyle/>
+          <a:p>
+            <a:endParaRPr b="1" dirty="0">
+              <a:ln w="13462">
+                <a:solidFill>
+                  <a:schemeClr val="bg1"/>
+                </a:solidFill>
+                <a:prstDash val="solid"/>
+              </a:ln>
+              <a:solidFill>
+                <a:schemeClr val="tx1">
+                  <a:lumMod val="85000"/>
+                  <a:lumOff val="15000"/>
+                </a:schemeClr>
+              </a:solidFill>
+              <a:effectLst>
+                <a:outerShdw dist="38100" dir="2700000" algn="bl" rotWithShape="0">
+                  <a:schemeClr val="accent5"/>
+                </a:outerShdw>
+              </a:effectLst>
+            </a:endParaRPr>
+          </a:p>
+        </p:txBody>
+      </p:sp>
+      <p:sp>
+        <p:nvSpPr>
+          <p:cNvPr id="3" name="object 3"/>
+          <p:cNvSpPr txBox="1">
+            <a:spLocks noGrp="1"/>
+          </p:cNvSpPr>
+          <p:nvPr>
+            <p:ph type="title"/>
+          </p:nvPr>
+        </p:nvSpPr>
+        <p:spPr>
+          <a:xfrm>
+            <a:off x="481685" y="304800"/>
+            <a:ext cx="8967115" cy="566181"/>
+          </a:xfrm>
+          <a:prstGeom prst="rect">
+            <a:avLst/>
+          </a:prstGeom>
+        </p:spPr>
+        <p:txBody>
+          <a:bodyPr vert="horz" wrap="square" lIns="0" tIns="12065" rIns="0" bIns="0" rtlCol="0">
+            <a:spAutoFit/>
+          </a:bodyPr>
+          <a:lstStyle/>
+          <a:p>
+            <a:pPr marL="12700">
+              <a:spcBef>
+                <a:spcPts val="95"/>
+              </a:spcBef>
+            </a:pPr>
+            <a:r>
+              <a:rPr lang="en-US" sz="3600" kern="0" dirty="0">
+                <a:latin typeface="+mn-lt"/>
+                <a:cs typeface="Calibri Light" panose="020F0302020204030204" pitchFamily="34" charset="0"/>
+                <a:sym typeface="Wingdings" panose="05000000000000000000" pitchFamily="2" charset="2"/>
+              </a:rPr>
+              <a:t>Event Life Cycle</a:t>
+            </a:r>
+          </a:p>
+        </p:txBody>
+      </p:sp>
+      <p:sp>
+        <p:nvSpPr>
+          <p:cNvPr id="5" name="object 5"/>
+          <p:cNvSpPr/>
+          <p:nvPr/>
+        </p:nvSpPr>
+        <p:spPr>
+          <a:xfrm>
+            <a:off x="9816083" y="262127"/>
+            <a:ext cx="1976627" cy="822960"/>
+          </a:xfrm>
+          <a:prstGeom prst="rect">
+            <a:avLst/>
+          </a:prstGeom>
+          <a:blipFill>
+            <a:blip r:embed="rId3" cstate="print"/>
+            <a:stretch>
+              <a:fillRect/>
+            </a:stretch>
+          </a:blipFill>
+        </p:spPr>
+        <p:txBody>
+          <a:bodyPr wrap="square" lIns="0" tIns="0" rIns="0" bIns="0" rtlCol="0"/>
+          <a:lstStyle/>
+          <a:p>
+            <a:endParaRPr/>
+          </a:p>
+        </p:txBody>
+      </p:sp>
+      <p:sp>
+        <p:nvSpPr>
+          <p:cNvPr id="4" name="object 3">
+            <a:extLst>
+              <a:ext uri="{FF2B5EF4-FFF2-40B4-BE49-F238E27FC236}">
+                <a16:creationId xmlns:a16="http://schemas.microsoft.com/office/drawing/2014/main" id="{1ED9D45B-4B0D-FC76-3A8C-E89F6CD72254}"/>
+              </a:ext>
+            </a:extLst>
+          </p:cNvPr>
+          <p:cNvSpPr txBox="1">
+            <a:spLocks/>
+          </p:cNvSpPr>
+          <p:nvPr/>
+        </p:nvSpPr>
+        <p:spPr>
+          <a:xfrm>
+            <a:off x="533400" y="838200"/>
+            <a:ext cx="11621728" cy="5670142"/>
+          </a:xfrm>
+          <a:prstGeom prst="rect">
+            <a:avLst/>
+          </a:prstGeom>
+        </p:spPr>
+        <p:txBody>
+          <a:bodyPr vert="horz" wrap="square" lIns="0" tIns="12065" rIns="0" bIns="0" rtlCol="0">
+            <a:spAutoFit/>
+          </a:bodyPr>
+          <a:lstStyle>
+            <a:lvl1pPr>
+              <a:defRPr sz="6000" b="0" i="0">
+                <a:solidFill>
+                  <a:srgbClr val="E7E6E6"/>
+                </a:solidFill>
+                <a:latin typeface="Trebuchet MS"/>
+                <a:ea typeface="+mj-ea"/>
+                <a:cs typeface="Trebuchet MS"/>
+              </a:defRPr>
+            </a:lvl1pPr>
+          </a:lstStyle>
+          <a:p>
+            <a:pPr marL="527050" indent="-514350">
+              <a:spcBef>
+                <a:spcPts val="95"/>
+              </a:spcBef>
+              <a:buAutoNum type="arabicPeriod"/>
+            </a:pPr>
+            <a:r>
+              <a:rPr lang="en-US" sz="2800" kern="0" dirty="0">
+                <a:latin typeface="+mn-lt"/>
+                <a:cs typeface="Calibri Light" panose="020F0302020204030204" pitchFamily="34" charset="0"/>
+                <a:sym typeface="Wingdings" panose="05000000000000000000" pitchFamily="2" charset="2"/>
+              </a:rPr>
+              <a:t>The 3</a:t>
+            </a:r>
+            <a:r>
+              <a:rPr lang="en-US" sz="2800" kern="0" baseline="30000" dirty="0">
+                <a:latin typeface="+mn-lt"/>
+                <a:cs typeface="Calibri Light" panose="020F0302020204030204" pitchFamily="34" charset="0"/>
+                <a:sym typeface="Wingdings" panose="05000000000000000000" pitchFamily="2" charset="2"/>
+              </a:rPr>
+              <a:t>rd</a:t>
+            </a:r>
+            <a:r>
+              <a:rPr lang="en-US" sz="2800" kern="0" dirty="0">
+                <a:latin typeface="+mn-lt"/>
+                <a:cs typeface="Calibri Light" panose="020F0302020204030204" pitchFamily="34" charset="0"/>
+                <a:sym typeface="Wingdings" panose="05000000000000000000" pitchFamily="2" charset="2"/>
+              </a:rPr>
+              <a:t> parameter of </a:t>
+            </a:r>
+            <a:r>
+              <a:rPr lang="en-US" sz="2800" kern="0" dirty="0" err="1">
+                <a:latin typeface="+mn-lt"/>
+                <a:cs typeface="Calibri Light" panose="020F0302020204030204" pitchFamily="34" charset="0"/>
+                <a:sym typeface="Wingdings" panose="05000000000000000000" pitchFamily="2" charset="2"/>
+              </a:rPr>
+              <a:t>addEventListener</a:t>
+            </a:r>
+            <a:r>
+              <a:rPr lang="en-US" sz="2800" kern="0" dirty="0">
+                <a:latin typeface="+mn-lt"/>
+                <a:cs typeface="Calibri Light" panose="020F0302020204030204" pitchFamily="34" charset="0"/>
+                <a:sym typeface="Wingdings" panose="05000000000000000000" pitchFamily="2" charset="2"/>
+              </a:rPr>
+              <a:t> denotes propagation of events.</a:t>
+            </a:r>
+          </a:p>
+          <a:p>
+            <a:pPr marL="527050" indent="-514350">
+              <a:spcBef>
+                <a:spcPts val="95"/>
+              </a:spcBef>
+              <a:buAutoNum type="arabicPeriod"/>
+            </a:pPr>
+            <a:r>
+              <a:rPr lang="en-US" sz="2800" kern="0" dirty="0">
+                <a:latin typeface="+mn-lt"/>
+                <a:cs typeface="Calibri Light" panose="020F0302020204030204" pitchFamily="34" charset="0"/>
+                <a:sym typeface="Wingdings" panose="05000000000000000000" pitchFamily="2" charset="2"/>
+              </a:rPr>
+              <a:t>When child is clicked, first the child is registered then parent because of bubbling mode.</a:t>
+            </a:r>
+          </a:p>
+          <a:p>
+            <a:br>
+              <a:rPr lang="en-IN" sz="900" b="0" dirty="0">
+                <a:solidFill>
+                  <a:srgbClr val="D4D4D4"/>
+                </a:solidFill>
+                <a:effectLst/>
+                <a:latin typeface="Consolas" panose="020B0609020204030204" pitchFamily="49" charset="0"/>
+              </a:rPr>
+            </a:br>
+            <a:r>
+              <a:rPr lang="en-IN" sz="900" b="0" dirty="0">
+                <a:solidFill>
+                  <a:srgbClr val="D4D4D4"/>
+                </a:solidFill>
+                <a:effectLst/>
+                <a:latin typeface="Consolas" panose="020B0609020204030204" pitchFamily="49" charset="0"/>
+              </a:rPr>
+              <a:t>        </a:t>
+            </a:r>
+            <a:r>
+              <a:rPr lang="en-IN" sz="2000" b="0" dirty="0" err="1">
+                <a:solidFill>
+                  <a:schemeClr val="bg1"/>
+                </a:solidFill>
+                <a:effectLst/>
+                <a:latin typeface="Consolas" panose="020B0609020204030204" pitchFamily="49" charset="0"/>
+              </a:rPr>
+              <a:t>parent.addEventListener</a:t>
+            </a:r>
+            <a:r>
+              <a:rPr lang="en-IN" sz="2000" b="0" dirty="0">
+                <a:solidFill>
+                  <a:schemeClr val="bg1"/>
+                </a:solidFill>
+                <a:effectLst/>
+                <a:latin typeface="Consolas" panose="020B0609020204030204" pitchFamily="49" charset="0"/>
+              </a:rPr>
+              <a:t>('click',(e)=&gt;{</a:t>
+            </a:r>
+          </a:p>
+          <a:p>
+            <a:r>
+              <a:rPr lang="en-IN" sz="2000" dirty="0">
+                <a:solidFill>
+                  <a:schemeClr val="bg1"/>
+                </a:solidFill>
+                <a:latin typeface="Consolas" panose="020B0609020204030204" pitchFamily="49" charset="0"/>
+              </a:rPr>
+              <a:t>				</a:t>
+            </a:r>
+            <a:r>
+              <a:rPr lang="en-IN" sz="2000" b="0" dirty="0">
+                <a:solidFill>
+                  <a:schemeClr val="bg1"/>
+                </a:solidFill>
+                <a:effectLst/>
+                <a:latin typeface="Consolas" panose="020B0609020204030204" pitchFamily="49" charset="0"/>
+              </a:rPr>
+              <a:t>console.log("Parent is selected”);},false)</a:t>
+            </a:r>
+          </a:p>
+          <a:p>
+            <a:endParaRPr lang="en-IN" sz="2000" b="0" dirty="0">
+              <a:solidFill>
+                <a:schemeClr val="bg1"/>
+              </a:solidFill>
+              <a:effectLst/>
+              <a:latin typeface="Consolas" panose="020B0609020204030204" pitchFamily="49" charset="0"/>
+            </a:endParaRPr>
+          </a:p>
+          <a:p>
+            <a:pPr marL="12700">
+              <a:spcBef>
+                <a:spcPts val="95"/>
+              </a:spcBef>
+            </a:pPr>
+            <a:r>
+              <a:rPr lang="en-US" sz="2800" kern="0" dirty="0">
+                <a:latin typeface="+mn-lt"/>
+                <a:cs typeface="Calibri Light" panose="020F0302020204030204" pitchFamily="34" charset="0"/>
+                <a:sym typeface="Wingdings" panose="05000000000000000000" pitchFamily="2" charset="2"/>
+              </a:rPr>
+              <a:t>3. But if we make the  3</a:t>
+            </a:r>
+            <a:r>
+              <a:rPr lang="en-US" sz="2800" kern="0" baseline="30000" dirty="0">
+                <a:latin typeface="+mn-lt"/>
+                <a:cs typeface="Calibri Light" panose="020F0302020204030204" pitchFamily="34" charset="0"/>
+                <a:sym typeface="Wingdings" panose="05000000000000000000" pitchFamily="2" charset="2"/>
+              </a:rPr>
+              <a:t>rd</a:t>
+            </a:r>
+            <a:r>
+              <a:rPr lang="en-US" sz="2800" kern="0" dirty="0">
+                <a:latin typeface="+mn-lt"/>
+                <a:cs typeface="Calibri Light" panose="020F0302020204030204" pitchFamily="34" charset="0"/>
+                <a:sym typeface="Wingdings" panose="05000000000000000000" pitchFamily="2" charset="2"/>
+              </a:rPr>
+              <a:t> para true then it will capture parent first then child because of capturing mode.</a:t>
+            </a:r>
+          </a:p>
+          <a:p>
+            <a:br>
+              <a:rPr lang="en-IN" sz="1050" b="0" dirty="0">
+                <a:solidFill>
+                  <a:srgbClr val="D4D4D4"/>
+                </a:solidFill>
+                <a:effectLst/>
+                <a:latin typeface="Consolas" panose="020B0609020204030204" pitchFamily="49" charset="0"/>
+              </a:rPr>
+            </a:br>
+            <a:r>
+              <a:rPr lang="en-IN" sz="2000" b="0" dirty="0">
+                <a:solidFill>
+                  <a:srgbClr val="D4D4D4"/>
+                </a:solidFill>
+                <a:effectLst/>
+                <a:latin typeface="Consolas" panose="020B0609020204030204" pitchFamily="49" charset="0"/>
+              </a:rPr>
+              <a:t>        </a:t>
+            </a:r>
+            <a:r>
+              <a:rPr lang="en-IN" sz="2000" b="0" dirty="0" err="1">
+                <a:solidFill>
+                  <a:schemeClr val="bg1"/>
+                </a:solidFill>
+                <a:effectLst/>
+                <a:latin typeface="Consolas" panose="020B0609020204030204" pitchFamily="49" charset="0"/>
+              </a:rPr>
+              <a:t>parent.addEventListener</a:t>
+            </a:r>
+            <a:r>
+              <a:rPr lang="en-IN" sz="2000" b="0" dirty="0">
+                <a:solidFill>
+                  <a:schemeClr val="bg1"/>
+                </a:solidFill>
+                <a:effectLst/>
+                <a:latin typeface="Consolas" panose="020B0609020204030204" pitchFamily="49" charset="0"/>
+              </a:rPr>
+              <a:t>('click',(e)=&gt;{</a:t>
+            </a:r>
+          </a:p>
+          <a:p>
+            <a:r>
+              <a:rPr lang="en-IN" sz="2000" b="0" dirty="0">
+                <a:solidFill>
+                  <a:schemeClr val="bg1"/>
+                </a:solidFill>
+                <a:effectLst/>
+                <a:latin typeface="Consolas" panose="020B0609020204030204" pitchFamily="49" charset="0"/>
+              </a:rPr>
+              <a:t>            console.log("Parent is selected");</a:t>
+            </a:r>
+          </a:p>
+          <a:p>
+            <a:r>
+              <a:rPr lang="en-IN" sz="2000" b="0" dirty="0">
+                <a:solidFill>
+                  <a:schemeClr val="bg1"/>
+                </a:solidFill>
+                <a:effectLst/>
+                <a:latin typeface="Consolas" panose="020B0609020204030204" pitchFamily="49" charset="0"/>
+              </a:rPr>
+              <a:t>            </a:t>
+            </a:r>
+            <a:r>
+              <a:rPr lang="en-IN" sz="2000" b="0" dirty="0" err="1">
+                <a:solidFill>
+                  <a:schemeClr val="bg1"/>
+                </a:solidFill>
+                <a:effectLst/>
+                <a:latin typeface="Consolas" panose="020B0609020204030204" pitchFamily="49" charset="0"/>
+              </a:rPr>
+              <a:t>e.stopPropagation</a:t>
+            </a:r>
+            <a:r>
+              <a:rPr lang="en-IN" sz="2000" b="0" dirty="0">
+                <a:solidFill>
+                  <a:schemeClr val="bg1"/>
+                </a:solidFill>
+                <a:effectLst/>
+                <a:latin typeface="Consolas" panose="020B0609020204030204" pitchFamily="49" charset="0"/>
+              </a:rPr>
+              <a:t>();},true)</a:t>
+            </a:r>
+          </a:p>
+          <a:p>
+            <a:pPr marL="12700">
+              <a:spcBef>
+                <a:spcPts val="95"/>
+              </a:spcBef>
+            </a:pPr>
+            <a:r>
+              <a:rPr lang="en-US" sz="2800" kern="0" dirty="0">
+                <a:latin typeface="+mn-lt"/>
+                <a:cs typeface="Calibri Light" panose="020F0302020204030204" pitchFamily="34" charset="0"/>
+                <a:sym typeface="Wingdings" panose="05000000000000000000" pitchFamily="2" charset="2"/>
+              </a:rPr>
+              <a:t>we can also use event’s stop propagation for stopping the propagation of event.</a:t>
+            </a:r>
+          </a:p>
+          <a:p>
+            <a:pPr marL="12700">
+              <a:spcBef>
+                <a:spcPts val="95"/>
+              </a:spcBef>
+            </a:pPr>
+            <a:endParaRPr lang="en-US" sz="2800" kern="0" dirty="0">
+              <a:latin typeface="+mn-lt"/>
+              <a:cs typeface="Calibri Light" panose="020F0302020204030204" pitchFamily="34" charset="0"/>
+              <a:sym typeface="Wingdings" panose="05000000000000000000" pitchFamily="2" charset="2"/>
+            </a:endParaRPr>
+          </a:p>
+          <a:p>
+            <a:pPr marL="12700">
+              <a:spcBef>
+                <a:spcPts val="95"/>
+              </a:spcBef>
+            </a:pPr>
+            <a:endParaRPr lang="en-US" sz="2800" kern="0" dirty="0">
+              <a:latin typeface="+mn-lt"/>
+              <a:cs typeface="Calibri Light" panose="020F0302020204030204" pitchFamily="34" charset="0"/>
+              <a:sym typeface="Wingdings" panose="05000000000000000000" pitchFamily="2" charset="2"/>
+            </a:endParaRPr>
+          </a:p>
+        </p:txBody>
+      </p:sp>
+    </p:spTree>
+    <p:extLst>
+      <p:ext uri="{BB962C8B-B14F-4D97-AF65-F5344CB8AC3E}">
+        <p14:creationId xmlns:p14="http://schemas.microsoft.com/office/powerpoint/2010/main" val="1493172746"/>
+      </p:ext>
+    </p:extLst>
+  </p:cSld>
+  <p:clrMapOvr>
+    <a:masterClrMapping/>
+  </p:clrMapOvr>
+</p:sld>
+</file>
+
+<file path=ppt/slides/slide47.xml><?xml version="1.0" encoding="utf-8"?>
+<p:sld xmlns:a="http://schemas.openxmlformats.org/drawingml/2006/main" xmlns:r="http://schemas.openxmlformats.org/officeDocument/2006/relationships" xmlns:p="http://schemas.openxmlformats.org/presentationml/2006/main">
+  <p:cSld>
+    <p:spTree>
+      <p:nvGrpSpPr>
+        <p:cNvPr id="1" name=""/>
+        <p:cNvGrpSpPr/>
+        <p:nvPr/>
+      </p:nvGrpSpPr>
+      <p:grpSpPr>
+        <a:xfrm>
+          <a:off x="0" y="0"/>
+          <a:ext cx="0" cy="0"/>
+          <a:chOff x="0" y="0"/>
+          <a:chExt cx="0" cy="0"/>
+        </a:xfrm>
+      </p:grpSpPr>
+      <p:sp>
+        <p:nvSpPr>
+          <p:cNvPr id="2" name="object 2"/>
+          <p:cNvSpPr/>
+          <p:nvPr/>
+        </p:nvSpPr>
+        <p:spPr>
+          <a:xfrm>
+            <a:off x="-36871" y="-36871"/>
+            <a:ext cx="12191999" cy="7118601"/>
+          </a:xfrm>
+          <a:prstGeom prst="rect">
+            <a:avLst/>
+          </a:prstGeom>
+          <a:blipFill>
+            <a:blip r:embed="rId2" cstate="print"/>
+            <a:stretch>
+              <a:fillRect/>
+            </a:stretch>
+          </a:blipFill>
+        </p:spPr>
+        <p:txBody>
+          <a:bodyPr wrap="square" lIns="0" tIns="0" rIns="0" bIns="0" rtlCol="0"/>
+          <a:lstStyle/>
+          <a:p>
+            <a:endParaRPr b="1" dirty="0">
+              <a:ln w="13462">
+                <a:solidFill>
+                  <a:schemeClr val="bg1"/>
+                </a:solidFill>
+                <a:prstDash val="solid"/>
+              </a:ln>
+              <a:solidFill>
+                <a:schemeClr val="tx1">
+                  <a:lumMod val="85000"/>
+                  <a:lumOff val="15000"/>
+                </a:schemeClr>
+              </a:solidFill>
+              <a:effectLst>
+                <a:outerShdw dist="38100" dir="2700000" algn="bl" rotWithShape="0">
+                  <a:schemeClr val="accent5"/>
+                </a:outerShdw>
+              </a:effectLst>
+            </a:endParaRPr>
+          </a:p>
+        </p:txBody>
+      </p:sp>
+      <p:sp>
+        <p:nvSpPr>
+          <p:cNvPr id="3" name="object 3"/>
+          <p:cNvSpPr txBox="1">
+            <a:spLocks noGrp="1"/>
+          </p:cNvSpPr>
+          <p:nvPr>
+            <p:ph type="title"/>
+          </p:nvPr>
+        </p:nvSpPr>
+        <p:spPr>
+          <a:xfrm>
+            <a:off x="481685" y="304800"/>
+            <a:ext cx="8967115" cy="566181"/>
+          </a:xfrm>
+          <a:prstGeom prst="rect">
+            <a:avLst/>
+          </a:prstGeom>
+        </p:spPr>
+        <p:txBody>
+          <a:bodyPr vert="horz" wrap="square" lIns="0" tIns="12065" rIns="0" bIns="0" rtlCol="0">
+            <a:spAutoFit/>
+          </a:bodyPr>
+          <a:lstStyle/>
+          <a:p>
+            <a:pPr marL="12700">
+              <a:spcBef>
+                <a:spcPts val="95"/>
+              </a:spcBef>
+            </a:pPr>
+            <a:r>
+              <a:rPr lang="en-US" sz="3600" kern="0" dirty="0" err="1">
+                <a:latin typeface="+mn-lt"/>
+                <a:cs typeface="Calibri Light" panose="020F0302020204030204" pitchFamily="34" charset="0"/>
+                <a:sym typeface="Wingdings" panose="05000000000000000000" pitchFamily="2" charset="2"/>
+              </a:rPr>
+              <a:t>JQuery</a:t>
+            </a:r>
+            <a:endParaRPr lang="en-US" sz="3600" kern="0" dirty="0">
+              <a:latin typeface="+mn-lt"/>
+              <a:cs typeface="Calibri Light" panose="020F0302020204030204" pitchFamily="34" charset="0"/>
+              <a:sym typeface="Wingdings" panose="05000000000000000000" pitchFamily="2" charset="2"/>
+            </a:endParaRPr>
+          </a:p>
+        </p:txBody>
+      </p:sp>
+      <p:sp>
+        <p:nvSpPr>
+          <p:cNvPr id="5" name="object 5"/>
+          <p:cNvSpPr/>
+          <p:nvPr/>
+        </p:nvSpPr>
+        <p:spPr>
+          <a:xfrm>
+            <a:off x="9816083" y="262127"/>
+            <a:ext cx="1976627" cy="822960"/>
+          </a:xfrm>
+          <a:prstGeom prst="rect">
+            <a:avLst/>
+          </a:prstGeom>
+          <a:blipFill>
+            <a:blip r:embed="rId3" cstate="print"/>
+            <a:stretch>
+              <a:fillRect/>
+            </a:stretch>
+          </a:blipFill>
+        </p:spPr>
+        <p:txBody>
+          <a:bodyPr wrap="square" lIns="0" tIns="0" rIns="0" bIns="0" rtlCol="0"/>
+          <a:lstStyle/>
+          <a:p>
+            <a:endParaRPr/>
+          </a:p>
+        </p:txBody>
+      </p:sp>
+      <p:sp>
+        <p:nvSpPr>
+          <p:cNvPr id="4" name="object 3">
+            <a:extLst>
+              <a:ext uri="{FF2B5EF4-FFF2-40B4-BE49-F238E27FC236}">
+                <a16:creationId xmlns:a16="http://schemas.microsoft.com/office/drawing/2014/main" id="{1ED9D45B-4B0D-FC76-3A8C-E89F6CD72254}"/>
+              </a:ext>
+            </a:extLst>
+          </p:cNvPr>
+          <p:cNvSpPr txBox="1">
+            <a:spLocks/>
+          </p:cNvSpPr>
+          <p:nvPr/>
+        </p:nvSpPr>
+        <p:spPr>
+          <a:xfrm>
+            <a:off x="533400" y="838200"/>
+            <a:ext cx="11621728" cy="5508559"/>
+          </a:xfrm>
+          <a:prstGeom prst="rect">
+            <a:avLst/>
+          </a:prstGeom>
+        </p:spPr>
+        <p:txBody>
+          <a:bodyPr vert="horz" wrap="square" lIns="0" tIns="12065" rIns="0" bIns="0" rtlCol="0">
+            <a:spAutoFit/>
+          </a:bodyPr>
+          <a:lstStyle>
+            <a:lvl1pPr>
+              <a:defRPr sz="6000" b="0" i="0">
+                <a:solidFill>
+                  <a:srgbClr val="E7E6E6"/>
+                </a:solidFill>
+                <a:latin typeface="Trebuchet MS"/>
+                <a:ea typeface="+mj-ea"/>
+                <a:cs typeface="Trebuchet MS"/>
+              </a:defRPr>
+            </a:lvl1pPr>
+          </a:lstStyle>
+          <a:p>
+            <a:pPr marL="12700">
+              <a:spcBef>
+                <a:spcPts val="95"/>
+              </a:spcBef>
+            </a:pPr>
+            <a:r>
+              <a:rPr lang="en-US" sz="2800" kern="0" dirty="0" err="1">
+                <a:latin typeface="+mn-lt"/>
+                <a:cs typeface="Calibri Light" panose="020F0302020204030204" pitchFamily="34" charset="0"/>
+                <a:sym typeface="Wingdings" panose="05000000000000000000" pitchFamily="2" charset="2"/>
+              </a:rPr>
+              <a:t>JQuery</a:t>
+            </a:r>
+            <a:r>
+              <a:rPr lang="en-US" sz="2800" kern="0" dirty="0">
+                <a:latin typeface="+mn-lt"/>
+                <a:cs typeface="Calibri Light" panose="020F0302020204030204" pitchFamily="34" charset="0"/>
+                <a:sym typeface="Wingdings" panose="05000000000000000000" pitchFamily="2" charset="2"/>
+              </a:rPr>
+              <a:t> is a JS library.</a:t>
+            </a:r>
+          </a:p>
+          <a:p>
+            <a:pPr marL="12700">
+              <a:spcBef>
+                <a:spcPts val="95"/>
+              </a:spcBef>
+            </a:pPr>
+            <a:r>
+              <a:rPr lang="en-US" sz="2800" kern="0" dirty="0">
+                <a:latin typeface="+mn-lt"/>
+                <a:cs typeface="Calibri Light" panose="020F0302020204030204" pitchFamily="34" charset="0"/>
+                <a:sym typeface="Wingdings" panose="05000000000000000000" pitchFamily="2" charset="2"/>
+              </a:rPr>
+              <a:t>Use jQuery by downloading the codes and including it in jQuery.js</a:t>
+            </a:r>
+          </a:p>
+          <a:p>
+            <a:pPr marL="12700">
+              <a:spcBef>
+                <a:spcPts val="95"/>
+              </a:spcBef>
+            </a:pPr>
+            <a:r>
+              <a:rPr lang="en-US" sz="2800" kern="0" dirty="0">
+                <a:latin typeface="+mn-lt"/>
+                <a:cs typeface="Calibri Light" panose="020F0302020204030204" pitchFamily="34" charset="0"/>
+                <a:sym typeface="Wingdings" panose="05000000000000000000" pitchFamily="2" charset="2"/>
+              </a:rPr>
+              <a:t>1. $  selector .(same as </a:t>
+            </a:r>
+            <a:r>
+              <a:rPr lang="en-US" sz="2800" kern="0" dirty="0" err="1">
+                <a:latin typeface="+mn-lt"/>
+                <a:cs typeface="Calibri Light" panose="020F0302020204030204" pitchFamily="34" charset="0"/>
+                <a:sym typeface="Wingdings" panose="05000000000000000000" pitchFamily="2" charset="2"/>
+              </a:rPr>
+              <a:t>querySelectorAll</a:t>
+            </a:r>
+            <a:r>
+              <a:rPr lang="en-US" sz="2800" kern="0" dirty="0">
+                <a:latin typeface="+mn-lt"/>
+                <a:cs typeface="Calibri Light" panose="020F0302020204030204" pitchFamily="34" charset="0"/>
+                <a:sym typeface="Wingdings" panose="05000000000000000000" pitchFamily="2" charset="2"/>
+              </a:rPr>
+              <a:t>)</a:t>
+            </a:r>
+          </a:p>
+          <a:p>
+            <a:pPr marL="12700">
+              <a:spcBef>
+                <a:spcPts val="95"/>
+              </a:spcBef>
+            </a:pPr>
+            <a:r>
+              <a:rPr lang="en-US" sz="2800" kern="0" dirty="0">
+                <a:latin typeface="+mn-lt"/>
+                <a:cs typeface="Calibri Light" panose="020F0302020204030204" pitchFamily="34" charset="0"/>
+                <a:sym typeface="Wingdings" panose="05000000000000000000" pitchFamily="2" charset="2"/>
+              </a:rPr>
+              <a:t>2. to use style use $(‘h1’).</a:t>
+            </a:r>
+            <a:r>
+              <a:rPr lang="en-US" sz="2800" kern="0" dirty="0" err="1">
+                <a:latin typeface="+mn-lt"/>
+                <a:cs typeface="Calibri Light" panose="020F0302020204030204" pitchFamily="34" charset="0"/>
+                <a:sym typeface="Wingdings" panose="05000000000000000000" pitchFamily="2" charset="2"/>
+              </a:rPr>
+              <a:t>css</a:t>
+            </a:r>
+            <a:r>
+              <a:rPr lang="en-US" sz="2800" kern="0" dirty="0">
+                <a:latin typeface="+mn-lt"/>
+                <a:cs typeface="Calibri Light" panose="020F0302020204030204" pitchFamily="34" charset="0"/>
+                <a:sym typeface="Wingdings" panose="05000000000000000000" pitchFamily="2" charset="2"/>
+              </a:rPr>
+              <a:t>(‘background-color’, ‘red’);</a:t>
+            </a:r>
+          </a:p>
+          <a:p>
+            <a:pPr marL="12700">
+              <a:spcBef>
+                <a:spcPts val="95"/>
+              </a:spcBef>
+            </a:pPr>
+            <a:r>
+              <a:rPr lang="en-US" sz="2800" kern="0" dirty="0">
+                <a:latin typeface="+mn-lt"/>
+                <a:cs typeface="Calibri Light" panose="020F0302020204030204" pitchFamily="34" charset="0"/>
+                <a:sym typeface="Wingdings" panose="05000000000000000000" pitchFamily="2" charset="2"/>
+              </a:rPr>
+              <a:t>3. to use multiple styles we will use object and for properties we use CamelCase. ex-</a:t>
+            </a:r>
+            <a:r>
+              <a:rPr lang="en-US" sz="2800" kern="0" dirty="0" err="1">
+                <a:latin typeface="+mn-lt"/>
+                <a:cs typeface="Calibri Light" panose="020F0302020204030204" pitchFamily="34" charset="0"/>
+                <a:sym typeface="Wingdings" panose="05000000000000000000" pitchFamily="2" charset="2"/>
+              </a:rPr>
+              <a:t>backgroundColor</a:t>
+            </a:r>
+            <a:r>
+              <a:rPr lang="en-US" sz="2800" kern="0" dirty="0">
+                <a:latin typeface="+mn-lt"/>
+                <a:cs typeface="Calibri Light" panose="020F0302020204030204" pitchFamily="34" charset="0"/>
+                <a:sym typeface="Wingdings" panose="05000000000000000000" pitchFamily="2" charset="2"/>
+              </a:rPr>
+              <a:t> : ‘plum’</a:t>
+            </a:r>
+          </a:p>
+          <a:p>
+            <a:pPr marL="12700">
+              <a:spcBef>
+                <a:spcPts val="95"/>
+              </a:spcBef>
+            </a:pPr>
+            <a:r>
+              <a:rPr lang="en-US" sz="2800" kern="0" dirty="0">
+                <a:latin typeface="+mn-lt"/>
+                <a:cs typeface="Calibri Light" panose="020F0302020204030204" pitchFamily="34" charset="0"/>
+                <a:sym typeface="Wingdings" panose="05000000000000000000" pitchFamily="2" charset="2"/>
+              </a:rPr>
+              <a:t>4. to use </a:t>
+            </a:r>
+            <a:r>
+              <a:rPr lang="en-US" sz="2800" kern="0" dirty="0" err="1">
+                <a:latin typeface="+mn-lt"/>
+                <a:cs typeface="Calibri Light" panose="020F0302020204030204" pitchFamily="34" charset="0"/>
+                <a:sym typeface="Wingdings" panose="05000000000000000000" pitchFamily="2" charset="2"/>
+              </a:rPr>
+              <a:t>innerText</a:t>
+            </a:r>
+            <a:r>
+              <a:rPr lang="en-US" sz="2800" kern="0" dirty="0">
+                <a:latin typeface="+mn-lt"/>
+                <a:cs typeface="Calibri Light" panose="020F0302020204030204" pitchFamily="34" charset="0"/>
+                <a:sym typeface="Wingdings" panose="05000000000000000000" pitchFamily="2" charset="2"/>
+              </a:rPr>
+              <a:t> </a:t>
+            </a:r>
+            <a:r>
+              <a:rPr lang="en-US" sz="2000" kern="0" dirty="0">
+                <a:latin typeface="Consolas" panose="020B0609020204030204" pitchFamily="49" charset="0"/>
+                <a:cs typeface="Calibri Light" panose="020F0302020204030204" pitchFamily="34" charset="0"/>
+                <a:sym typeface="Wingdings" panose="05000000000000000000" pitchFamily="2" charset="2"/>
+              </a:rPr>
+              <a:t>= </a:t>
+            </a:r>
+            <a:r>
+              <a:rPr lang="en-US" sz="2800" kern="0" dirty="0">
+                <a:latin typeface="+mn-lt"/>
+                <a:cs typeface="Calibri Light" panose="020F0302020204030204" pitchFamily="34" charset="0"/>
+                <a:sym typeface="Wingdings" panose="05000000000000000000" pitchFamily="2" charset="2"/>
+              </a:rPr>
+              <a:t> </a:t>
+            </a:r>
+            <a:r>
+              <a:rPr lang="en-US" sz="2000" kern="0" dirty="0">
+                <a:latin typeface="Consolas" panose="020B0609020204030204" pitchFamily="49" charset="0"/>
+                <a:cs typeface="Calibri Light" panose="020F0302020204030204" pitchFamily="34" charset="0"/>
+                <a:sym typeface="Wingdings" panose="05000000000000000000" pitchFamily="2" charset="2"/>
+              </a:rPr>
+              <a:t>$(‘h1’).text()//output</a:t>
+            </a:r>
+            <a:r>
+              <a:rPr lang="en-US" sz="2000" kern="0" dirty="0">
+                <a:latin typeface="+mn-lt"/>
+                <a:cs typeface="Calibri Light" panose="020F0302020204030204" pitchFamily="34" charset="0"/>
+                <a:sym typeface="Wingdings" panose="05000000000000000000" pitchFamily="2" charset="2"/>
+              </a:rPr>
+              <a:t>, </a:t>
+            </a:r>
+            <a:r>
+              <a:rPr lang="en-US" sz="2000" kern="0" dirty="0">
+                <a:latin typeface="Consolas" panose="020B0609020204030204" pitchFamily="49" charset="0"/>
+                <a:cs typeface="Calibri Light" panose="020F0302020204030204" pitchFamily="34" charset="0"/>
+                <a:sym typeface="Wingdings" panose="05000000000000000000" pitchFamily="2" charset="2"/>
+              </a:rPr>
+              <a:t> $(‘h1’).text(‘new Text’)//input</a:t>
+            </a:r>
+          </a:p>
+          <a:p>
+            <a:pPr marL="12700">
+              <a:spcBef>
+                <a:spcPts val="95"/>
+              </a:spcBef>
+            </a:pPr>
+            <a:r>
+              <a:rPr lang="en-US" sz="2800" kern="0" dirty="0">
+                <a:latin typeface="+mn-lt"/>
+                <a:cs typeface="Calibri Light" panose="020F0302020204030204" pitchFamily="34" charset="0"/>
+                <a:sym typeface="Wingdings" panose="05000000000000000000" pitchFamily="2" charset="2"/>
+              </a:rPr>
+              <a:t>5. to use </a:t>
+            </a:r>
+            <a:r>
+              <a:rPr lang="en-US" sz="2800" kern="0" dirty="0" err="1">
+                <a:latin typeface="+mn-lt"/>
+                <a:cs typeface="Calibri Light" panose="020F0302020204030204" pitchFamily="34" charset="0"/>
+                <a:sym typeface="Wingdings" panose="05000000000000000000" pitchFamily="2" charset="2"/>
+              </a:rPr>
+              <a:t>innerHTML</a:t>
+            </a:r>
+            <a:r>
+              <a:rPr lang="en-US" sz="2000" kern="0" dirty="0">
+                <a:latin typeface="Consolas" panose="020B0609020204030204" pitchFamily="49" charset="0"/>
+                <a:cs typeface="Calibri Light" panose="020F0302020204030204" pitchFamily="34" charset="0"/>
+                <a:sym typeface="Wingdings" panose="05000000000000000000" pitchFamily="2" charset="2"/>
+              </a:rPr>
+              <a:t>= </a:t>
+            </a:r>
+            <a:r>
+              <a:rPr lang="en-US" sz="2800" kern="0" dirty="0">
+                <a:latin typeface="+mn-lt"/>
+                <a:cs typeface="Calibri Light" panose="020F0302020204030204" pitchFamily="34" charset="0"/>
+                <a:sym typeface="Wingdings" panose="05000000000000000000" pitchFamily="2" charset="2"/>
+              </a:rPr>
+              <a:t> </a:t>
+            </a:r>
+            <a:r>
+              <a:rPr lang="en-US" sz="2000" kern="0" dirty="0">
+                <a:latin typeface="Consolas" panose="020B0609020204030204" pitchFamily="49" charset="0"/>
+                <a:cs typeface="Calibri Light" panose="020F0302020204030204" pitchFamily="34" charset="0"/>
+                <a:sym typeface="Wingdings" panose="05000000000000000000" pitchFamily="2" charset="2"/>
+              </a:rPr>
+              <a:t>$(‘h1’).html(‘&lt;h2&gt;new Text&lt;/h2&gt;’)//input</a:t>
+            </a:r>
+            <a:endParaRPr lang="en-US" sz="2800" kern="0" dirty="0">
+              <a:latin typeface="Consolas" panose="020B0609020204030204" pitchFamily="49" charset="0"/>
+              <a:cs typeface="Calibri Light" panose="020F0302020204030204" pitchFamily="34" charset="0"/>
+              <a:sym typeface="Wingdings" panose="05000000000000000000" pitchFamily="2" charset="2"/>
+            </a:endParaRPr>
+          </a:p>
+          <a:p>
+            <a:pPr marL="12700">
+              <a:spcBef>
+                <a:spcPts val="95"/>
+              </a:spcBef>
+            </a:pPr>
+            <a:r>
+              <a:rPr lang="en-US" sz="2800" kern="0" dirty="0">
+                <a:latin typeface="+mn-lt"/>
+                <a:cs typeface="Calibri Light" panose="020F0302020204030204" pitchFamily="34" charset="0"/>
+                <a:sym typeface="Wingdings" panose="05000000000000000000" pitchFamily="2" charset="2"/>
+              </a:rPr>
+              <a:t>6. to use attribute</a:t>
+            </a:r>
+            <a:r>
+              <a:rPr lang="en-US" sz="2000" kern="0" dirty="0">
+                <a:latin typeface="Consolas" panose="020B0609020204030204" pitchFamily="49" charset="0"/>
+                <a:cs typeface="Calibri Light" panose="020F0302020204030204" pitchFamily="34" charset="0"/>
+                <a:sym typeface="Wingdings" panose="05000000000000000000" pitchFamily="2" charset="2"/>
+              </a:rPr>
+              <a:t>= </a:t>
+            </a:r>
+            <a:r>
+              <a:rPr lang="en-US" sz="2800" kern="0" dirty="0">
+                <a:latin typeface="+mn-lt"/>
+                <a:cs typeface="Calibri Light" panose="020F0302020204030204" pitchFamily="34" charset="0"/>
+                <a:sym typeface="Wingdings" panose="05000000000000000000" pitchFamily="2" charset="2"/>
+              </a:rPr>
+              <a:t> </a:t>
+            </a:r>
+            <a:r>
+              <a:rPr lang="en-US" sz="2000" kern="0" dirty="0">
+                <a:latin typeface="Consolas" panose="020B0609020204030204" pitchFamily="49" charset="0"/>
+                <a:cs typeface="Calibri Light" panose="020F0302020204030204" pitchFamily="34" charset="0"/>
+                <a:sym typeface="Wingdings" panose="05000000000000000000" pitchFamily="2" charset="2"/>
+              </a:rPr>
+              <a:t>$(‘a’).</a:t>
+            </a:r>
+            <a:r>
+              <a:rPr lang="en-US" sz="2000" kern="0" dirty="0" err="1">
+                <a:latin typeface="Consolas" panose="020B0609020204030204" pitchFamily="49" charset="0"/>
+                <a:cs typeface="Calibri Light" panose="020F0302020204030204" pitchFamily="34" charset="0"/>
+                <a:sym typeface="Wingdings" panose="05000000000000000000" pitchFamily="2" charset="2"/>
+              </a:rPr>
+              <a:t>attr</a:t>
+            </a:r>
+            <a:r>
+              <a:rPr lang="en-US" sz="2000" kern="0" dirty="0">
+                <a:latin typeface="Consolas" panose="020B0609020204030204" pitchFamily="49" charset="0"/>
+                <a:cs typeface="Calibri Light" panose="020F0302020204030204" pitchFamily="34" charset="0"/>
+                <a:sym typeface="Wingdings" panose="05000000000000000000" pitchFamily="2" charset="2"/>
+              </a:rPr>
+              <a:t>(‘</a:t>
+            </a:r>
+            <a:r>
+              <a:rPr lang="en-US" sz="2000" kern="0" dirty="0" err="1">
+                <a:latin typeface="Consolas" panose="020B0609020204030204" pitchFamily="49" charset="0"/>
+                <a:cs typeface="Calibri Light" panose="020F0302020204030204" pitchFamily="34" charset="0"/>
+                <a:sym typeface="Wingdings" panose="05000000000000000000" pitchFamily="2" charset="2"/>
+              </a:rPr>
+              <a:t>href</a:t>
+            </a:r>
+            <a:r>
+              <a:rPr lang="en-US" sz="2000" kern="0" dirty="0">
+                <a:latin typeface="Consolas" panose="020B0609020204030204" pitchFamily="49" charset="0"/>
+                <a:cs typeface="Calibri Light" panose="020F0302020204030204" pitchFamily="34" charset="0"/>
+                <a:sym typeface="Wingdings" panose="05000000000000000000" pitchFamily="2" charset="2"/>
+              </a:rPr>
+              <a:t>’)//get</a:t>
+            </a:r>
+          </a:p>
+          <a:p>
+            <a:pPr marL="12700">
+              <a:spcBef>
+                <a:spcPts val="95"/>
+              </a:spcBef>
+            </a:pPr>
+            <a:r>
+              <a:rPr lang="en-US" sz="2000" kern="0" dirty="0">
+                <a:latin typeface="Consolas" panose="020B0609020204030204" pitchFamily="49" charset="0"/>
+                <a:cs typeface="Calibri Light" panose="020F0302020204030204" pitchFamily="34" charset="0"/>
+                <a:sym typeface="Wingdings" panose="05000000000000000000" pitchFamily="2" charset="2"/>
+              </a:rPr>
+              <a:t>			 $(‘a’).</a:t>
+            </a:r>
+            <a:r>
+              <a:rPr lang="en-US" sz="2000" kern="0" dirty="0" err="1">
+                <a:latin typeface="Consolas" panose="020B0609020204030204" pitchFamily="49" charset="0"/>
+                <a:cs typeface="Calibri Light" panose="020F0302020204030204" pitchFamily="34" charset="0"/>
+                <a:sym typeface="Wingdings" panose="05000000000000000000" pitchFamily="2" charset="2"/>
+              </a:rPr>
+              <a:t>attr</a:t>
+            </a:r>
+            <a:r>
+              <a:rPr lang="en-US" sz="2000" kern="0" dirty="0">
+                <a:latin typeface="Consolas" panose="020B0609020204030204" pitchFamily="49" charset="0"/>
+                <a:cs typeface="Calibri Light" panose="020F0302020204030204" pitchFamily="34" charset="0"/>
+                <a:sym typeface="Wingdings" panose="05000000000000000000" pitchFamily="2" charset="2"/>
+              </a:rPr>
+              <a:t>(‘</a:t>
+            </a:r>
+            <a:r>
+              <a:rPr lang="en-US" sz="2000" kern="0" dirty="0" err="1">
+                <a:latin typeface="Consolas" panose="020B0609020204030204" pitchFamily="49" charset="0"/>
+                <a:cs typeface="Calibri Light" panose="020F0302020204030204" pitchFamily="34" charset="0"/>
+                <a:sym typeface="Wingdings" panose="05000000000000000000" pitchFamily="2" charset="2"/>
+              </a:rPr>
+              <a:t>href</a:t>
+            </a:r>
+            <a:r>
+              <a:rPr lang="en-US" sz="2000" kern="0" dirty="0">
+                <a:latin typeface="Consolas" panose="020B0609020204030204" pitchFamily="49" charset="0"/>
+                <a:cs typeface="Calibri Light" panose="020F0302020204030204" pitchFamily="34" charset="0"/>
+                <a:sym typeface="Wingdings" panose="05000000000000000000" pitchFamily="2" charset="2"/>
+              </a:rPr>
+              <a:t>’, ‘www.google.com’ )//set</a:t>
+            </a:r>
+            <a:endParaRPr lang="en-US" sz="2800" kern="0" dirty="0">
+              <a:latin typeface="Consolas" panose="020B0609020204030204" pitchFamily="49" charset="0"/>
+              <a:cs typeface="Calibri Light" panose="020F0302020204030204" pitchFamily="34" charset="0"/>
+              <a:sym typeface="Wingdings" panose="05000000000000000000" pitchFamily="2" charset="2"/>
+            </a:endParaRPr>
+          </a:p>
+          <a:p>
+            <a:pPr marL="12700">
+              <a:spcBef>
+                <a:spcPts val="95"/>
+              </a:spcBef>
+            </a:pPr>
+            <a:endParaRPr lang="en-US" sz="2800" kern="0" dirty="0">
+              <a:latin typeface="Consolas" panose="020B0609020204030204" pitchFamily="49" charset="0"/>
+              <a:cs typeface="Calibri Light" panose="020F0302020204030204" pitchFamily="34" charset="0"/>
+              <a:sym typeface="Wingdings" panose="05000000000000000000" pitchFamily="2" charset="2"/>
+            </a:endParaRPr>
+          </a:p>
+          <a:p>
+            <a:pPr marL="12700">
+              <a:spcBef>
+                <a:spcPts val="95"/>
+              </a:spcBef>
+            </a:pPr>
+            <a:r>
+              <a:rPr lang="en-US" sz="2800" kern="0" dirty="0">
+                <a:latin typeface="+mn-lt"/>
+                <a:cs typeface="Calibri Light" panose="020F0302020204030204" pitchFamily="34" charset="0"/>
+                <a:sym typeface="Wingdings" panose="05000000000000000000" pitchFamily="2" charset="2"/>
+              </a:rPr>
+              <a:t>7. to use input value </a:t>
+            </a:r>
+            <a:r>
+              <a:rPr lang="en-US" sz="2000" kern="0" dirty="0">
+                <a:latin typeface="Consolas" panose="020B0609020204030204" pitchFamily="49" charset="0"/>
+                <a:cs typeface="Calibri Light" panose="020F0302020204030204" pitchFamily="34" charset="0"/>
+                <a:sym typeface="Wingdings" panose="05000000000000000000" pitchFamily="2" charset="2"/>
+              </a:rPr>
+              <a:t>= </a:t>
+            </a:r>
+            <a:r>
+              <a:rPr lang="en-US" sz="2800" kern="0" dirty="0">
+                <a:latin typeface="+mn-lt"/>
+                <a:cs typeface="Calibri Light" panose="020F0302020204030204" pitchFamily="34" charset="0"/>
+                <a:sym typeface="Wingdings" panose="05000000000000000000" pitchFamily="2" charset="2"/>
+              </a:rPr>
+              <a:t> 	</a:t>
+            </a:r>
+            <a:r>
+              <a:rPr lang="en-US" sz="2000" kern="0" dirty="0">
+                <a:latin typeface="Consolas" panose="020B0609020204030204" pitchFamily="49" charset="0"/>
+                <a:cs typeface="Calibri Light" panose="020F0302020204030204" pitchFamily="34" charset="0"/>
+                <a:sym typeface="Wingdings" panose="05000000000000000000" pitchFamily="2" charset="2"/>
+              </a:rPr>
+              <a:t>$(‘input’).</a:t>
+            </a:r>
+            <a:r>
+              <a:rPr lang="en-US" sz="2000" kern="0" dirty="0" err="1">
+                <a:latin typeface="Consolas" panose="020B0609020204030204" pitchFamily="49" charset="0"/>
+                <a:cs typeface="Calibri Light" panose="020F0302020204030204" pitchFamily="34" charset="0"/>
+                <a:sym typeface="Wingdings" panose="05000000000000000000" pitchFamily="2" charset="2"/>
+              </a:rPr>
+              <a:t>val</a:t>
+            </a:r>
+            <a:r>
+              <a:rPr lang="en-US" sz="2000" kern="0" dirty="0">
+                <a:latin typeface="Consolas" panose="020B0609020204030204" pitchFamily="49" charset="0"/>
+                <a:cs typeface="Calibri Light" panose="020F0302020204030204" pitchFamily="34" charset="0"/>
+                <a:sym typeface="Wingdings" panose="05000000000000000000" pitchFamily="2" charset="2"/>
+              </a:rPr>
+              <a:t>()//get</a:t>
+            </a:r>
+          </a:p>
+          <a:p>
+            <a:pPr marL="12700">
+              <a:spcBef>
+                <a:spcPts val="95"/>
+              </a:spcBef>
+            </a:pPr>
+            <a:r>
+              <a:rPr lang="en-US" sz="2000" kern="0" dirty="0">
+                <a:latin typeface="Consolas" panose="020B0609020204030204" pitchFamily="49" charset="0"/>
+                <a:cs typeface="Calibri Light" panose="020F0302020204030204" pitchFamily="34" charset="0"/>
+                <a:sym typeface="Wingdings" panose="05000000000000000000" pitchFamily="2" charset="2"/>
+              </a:rPr>
+              <a:t>				$(‘input’).</a:t>
+            </a:r>
+            <a:r>
+              <a:rPr lang="en-US" sz="2000" kern="0" dirty="0" err="1">
+                <a:latin typeface="Consolas" panose="020B0609020204030204" pitchFamily="49" charset="0"/>
+                <a:cs typeface="Calibri Light" panose="020F0302020204030204" pitchFamily="34" charset="0"/>
+                <a:sym typeface="Wingdings" panose="05000000000000000000" pitchFamily="2" charset="2"/>
+              </a:rPr>
+              <a:t>val</a:t>
+            </a:r>
+            <a:r>
+              <a:rPr lang="en-US" sz="2000" kern="0" dirty="0">
+                <a:latin typeface="Consolas" panose="020B0609020204030204" pitchFamily="49" charset="0"/>
+                <a:cs typeface="Calibri Light" panose="020F0302020204030204" pitchFamily="34" charset="0"/>
+                <a:sym typeface="Wingdings" panose="05000000000000000000" pitchFamily="2" charset="2"/>
+              </a:rPr>
+              <a:t>(‘some value’)//set</a:t>
+            </a:r>
+            <a:endParaRPr lang="en-US" sz="2800" kern="0" dirty="0">
+              <a:latin typeface="Consolas" panose="020B0609020204030204" pitchFamily="49" charset="0"/>
+              <a:cs typeface="Calibri Light" panose="020F0302020204030204" pitchFamily="34" charset="0"/>
+              <a:sym typeface="Wingdings" panose="05000000000000000000" pitchFamily="2" charset="2"/>
+            </a:endParaRPr>
+          </a:p>
+        </p:txBody>
+      </p:sp>
+    </p:spTree>
+    <p:extLst>
+      <p:ext uri="{BB962C8B-B14F-4D97-AF65-F5344CB8AC3E}">
+        <p14:creationId xmlns:p14="http://schemas.microsoft.com/office/powerpoint/2010/main" val="3770203744"/>
       </p:ext>
     </p:extLst>
   </p:cSld>

</xml_diff>